<commit_message>
Fixes to COMP270 wk 7 slides
</commit_message>
<xml_diff>
--- a/COMP270/07/2019-20-COMP270-07-lecture-materials.pptx
+++ b/COMP270/07/2019-20-COMP270-07-lecture-materials.pptx
@@ -236,7 +236,7 @@
           <a:p>
             <a:fld id="{4929A4FD-FAFB-4CDA-9DC5-D20CA18269A9}" type="datetimeFigureOut">
               <a:rPr lang="en-US" smtClean="0"/>
-              <a:t>11/2/2019</a:t>
+              <a:t>11/4/2019</a:t>
             </a:fld>
             <a:endParaRPr lang="en-US" dirty="0"/>
           </a:p>
@@ -413,7 +413,7 @@
           <a:p>
             <a:fld id="{CB91E35E-F34C-4F0E-B8A1-D9F5F49CB3AD}" type="datetimeFigureOut">
               <a:rPr lang="en-US" smtClean="0"/>
-              <a:t>11/2/2019</a:t>
+              <a:t>11/3/2019</a:t>
             </a:fld>
             <a:endParaRPr lang="en-US" dirty="0"/>
           </a:p>
@@ -914,7 +914,7 @@
             <a:fld id="{B61BEF0D-F0BB-DE4B-95CE-6DB70DBA9567}" type="datetimeFigureOut">
               <a:rPr lang="en-US" smtClean="0"/>
               <a:pPr/>
-              <a:t>11/2/2019</a:t>
+              <a:t>11/3/2019</a:t>
             </a:fld>
             <a:endParaRPr lang="en-US" dirty="0"/>
           </a:p>
@@ -1116,7 +1116,7 @@
             <a:fld id="{B61BEF0D-F0BB-DE4B-95CE-6DB70DBA9567}" type="datetimeFigureOut">
               <a:rPr lang="en-US" smtClean="0"/>
               <a:pPr/>
-              <a:t>11/2/2019</a:t>
+              <a:t>11/3/2019</a:t>
             </a:fld>
             <a:endParaRPr lang="en-US" dirty="0"/>
           </a:p>
@@ -1328,7 +1328,7 @@
             <a:fld id="{B61BEF0D-F0BB-DE4B-95CE-6DB70DBA9567}" type="datetimeFigureOut">
               <a:rPr lang="en-US" smtClean="0"/>
               <a:pPr/>
-              <a:t>11/2/2019</a:t>
+              <a:t>11/3/2019</a:t>
             </a:fld>
             <a:endParaRPr lang="en-US" dirty="0"/>
           </a:p>
@@ -1530,7 +1530,7 @@
             <a:fld id="{B61BEF0D-F0BB-DE4B-95CE-6DB70DBA9567}" type="datetimeFigureOut">
               <a:rPr lang="en-US" smtClean="0"/>
               <a:pPr/>
-              <a:t>11/2/2019</a:t>
+              <a:t>11/3/2019</a:t>
             </a:fld>
             <a:endParaRPr lang="en-US" dirty="0"/>
           </a:p>
@@ -1808,7 +1808,7 @@
             <a:fld id="{B61BEF0D-F0BB-DE4B-95CE-6DB70DBA9567}" type="datetimeFigureOut">
               <a:rPr lang="en-US" smtClean="0"/>
               <a:pPr/>
-              <a:t>11/2/2019</a:t>
+              <a:t>11/3/2019</a:t>
             </a:fld>
             <a:endParaRPr lang="en-US" dirty="0"/>
           </a:p>
@@ -2078,7 +2078,7 @@
             <a:fld id="{B61BEF0D-F0BB-DE4B-95CE-6DB70DBA9567}" type="datetimeFigureOut">
               <a:rPr lang="en-US" smtClean="0"/>
               <a:pPr/>
-              <a:t>11/2/2019</a:t>
+              <a:t>11/3/2019</a:t>
             </a:fld>
             <a:endParaRPr lang="en-US" dirty="0"/>
           </a:p>
@@ -2495,7 +2495,7 @@
             <a:fld id="{B61BEF0D-F0BB-DE4B-95CE-6DB70DBA9567}" type="datetimeFigureOut">
               <a:rPr lang="en-US" smtClean="0"/>
               <a:pPr/>
-              <a:t>11/2/2019</a:t>
+              <a:t>11/3/2019</a:t>
             </a:fld>
             <a:endParaRPr lang="en-US" dirty="0"/>
           </a:p>
@@ -2639,7 +2639,7 @@
             <a:fld id="{B61BEF0D-F0BB-DE4B-95CE-6DB70DBA9567}" type="datetimeFigureOut">
               <a:rPr lang="en-US" smtClean="0"/>
               <a:pPr/>
-              <a:t>11/2/2019</a:t>
+              <a:t>11/3/2019</a:t>
             </a:fld>
             <a:endParaRPr lang="en-US" dirty="0"/>
           </a:p>
@@ -2754,7 +2754,7 @@
             <a:fld id="{B61BEF0D-F0BB-DE4B-95CE-6DB70DBA9567}" type="datetimeFigureOut">
               <a:rPr lang="en-US" smtClean="0"/>
               <a:pPr/>
-              <a:t>11/2/2019</a:t>
+              <a:t>11/3/2019</a:t>
             </a:fld>
             <a:endParaRPr lang="en-US" dirty="0"/>
           </a:p>
@@ -3069,7 +3069,7 @@
             <a:fld id="{B61BEF0D-F0BB-DE4B-95CE-6DB70DBA9567}" type="datetimeFigureOut">
               <a:rPr lang="en-US" smtClean="0"/>
               <a:pPr/>
-              <a:t>11/2/2019</a:t>
+              <a:t>11/3/2019</a:t>
             </a:fld>
             <a:endParaRPr lang="en-US" dirty="0"/>
           </a:p>
@@ -3360,7 +3360,7 @@
             <a:fld id="{B61BEF0D-F0BB-DE4B-95CE-6DB70DBA9567}" type="datetimeFigureOut">
               <a:rPr lang="en-US" smtClean="0"/>
               <a:pPr/>
-              <a:t>11/2/2019</a:t>
+              <a:t>11/3/2019</a:t>
             </a:fld>
             <a:endParaRPr lang="en-US" dirty="0"/>
           </a:p>
@@ -3605,7 +3605,7 @@
             <a:fld id="{B61BEF0D-F0BB-DE4B-95CE-6DB70DBA9567}" type="datetimeFigureOut">
               <a:rPr lang="en-US" smtClean="0"/>
               <a:pPr/>
-              <a:t>11/2/2019</a:t>
+              <a:t>11/3/2019</a:t>
             </a:fld>
             <a:endParaRPr lang="en-US" dirty="0"/>
           </a:p>
@@ -4480,8 +4480,8 @@
           </a:fontRef>
         </p:style>
       </p:cxnSp>
-      <mc:AlternateContent xmlns:mc="http://schemas.openxmlformats.org/markup-compatibility/2006">
-        <mc:Choice xmlns:a14="http://schemas.microsoft.com/office/drawing/2010/main" Requires="a14">
+      <mc:AlternateContent xmlns:mc="http://schemas.openxmlformats.org/markup-compatibility/2006" xmlns:a14="http://schemas.microsoft.com/office/drawing/2010/main">
+        <mc:Choice Requires="a14">
           <p:sp>
             <p:nvSpPr>
               <p:cNvPr id="31" name="Content Placeholder 2">
@@ -5056,13 +5056,7 @@
                       <a:rPr lang="en-GB" sz="2400" b="0" i="1" smtClean="0">
                         <a:latin typeface="Cambria Math" panose="02040503050406030204" pitchFamily="18" charset="0"/>
                       </a:rPr>
-                      <m:t>=</m:t>
-                    </m:r>
-                    <m:r>
-                      <a:rPr lang="en-GB" sz="2400" b="0" i="1" smtClean="0">
-                        <a:latin typeface="Cambria Math" panose="02040503050406030204" pitchFamily="18" charset="0"/>
-                      </a:rPr>
-                      <m:t>−</m:t>
+                      <m:t>=−</m:t>
                     </m:r>
                     <m:d>
                       <m:dPr>
@@ -5913,7 +5907,7 @@
             </p:txBody>
           </p:sp>
         </mc:Choice>
-        <mc:Fallback>
+        <mc:Fallback xmlns="">
           <p:sp>
             <p:nvSpPr>
               <p:cNvPr id="31" name="Content Placeholder 2">
@@ -6628,8 +6622,8 @@
           </a:fontRef>
         </p:style>
       </p:cxnSp>
-      <mc:AlternateContent xmlns:mc="http://schemas.openxmlformats.org/markup-compatibility/2006">
-        <mc:Choice xmlns:a14="http://schemas.microsoft.com/office/drawing/2010/main" Requires="a14">
+      <mc:AlternateContent xmlns:mc="http://schemas.openxmlformats.org/markup-compatibility/2006" xmlns:a14="http://schemas.microsoft.com/office/drawing/2010/main">
+        <mc:Choice Requires="a14">
           <p:sp>
             <p:nvSpPr>
               <p:cNvPr id="31" name="Content Placeholder 2">
@@ -6801,7 +6795,7 @@
             </p:txBody>
           </p:sp>
         </mc:Choice>
-        <mc:Fallback>
+        <mc:Fallback xmlns="">
           <p:sp>
             <p:nvSpPr>
               <p:cNvPr id="31" name="Content Placeholder 2">
@@ -6865,8 +6859,8 @@
             <a:chExt cx="2737094" cy="993141"/>
           </a:xfrm>
         </p:grpSpPr>
-        <mc:AlternateContent xmlns:mc="http://schemas.openxmlformats.org/markup-compatibility/2006">
-          <mc:Choice xmlns:a14="http://schemas.microsoft.com/office/drawing/2010/main" Requires="a14">
+        <mc:AlternateContent xmlns:mc="http://schemas.openxmlformats.org/markup-compatibility/2006" xmlns:a14="http://schemas.microsoft.com/office/drawing/2010/main">
+          <mc:Choice Requires="a14">
             <p:sp>
               <p:nvSpPr>
                 <p:cNvPr id="15" name="TextBox 14">
@@ -6895,6 +6889,7 @@
                 </a:bodyPr>
                 <a:lstStyle/>
                 <a:p>
+                  <a:pPr/>
                   <a14:m>
                     <m:oMathPara xmlns:m="http://schemas.openxmlformats.org/officeDocument/2006/math">
                       <m:oMathParaPr>
@@ -6925,7 +6920,7 @@
               </p:txBody>
             </p:sp>
           </mc:Choice>
-          <mc:Fallback>
+          <mc:Fallback xmlns="">
             <p:sp>
               <p:nvSpPr>
                 <p:cNvPr id="15" name="TextBox 14">
@@ -7014,8 +7009,8 @@
             </a:fontRef>
           </p:style>
         </p:cxnSp>
-        <mc:AlternateContent xmlns:mc="http://schemas.openxmlformats.org/markup-compatibility/2006">
-          <mc:Choice xmlns:a14="http://schemas.microsoft.com/office/drawing/2010/main" Requires="a14">
+        <mc:AlternateContent xmlns:mc="http://schemas.openxmlformats.org/markup-compatibility/2006" xmlns:a14="http://schemas.microsoft.com/office/drawing/2010/main">
+          <mc:Choice Requires="a14">
             <p:sp>
               <p:nvSpPr>
                 <p:cNvPr id="17" name="TextBox 16">
@@ -7044,6 +7039,7 @@
                 </a:bodyPr>
                 <a:lstStyle/>
                 <a:p>
+                  <a:pPr/>
                   <a14:m>
                     <m:oMathPara xmlns:m="http://schemas.openxmlformats.org/officeDocument/2006/math">
                       <m:oMathParaPr>
@@ -7074,7 +7070,7 @@
               </p:txBody>
             </p:sp>
           </mc:Choice>
-          <mc:Fallback>
+          <mc:Fallback xmlns="">
             <p:sp>
               <p:nvSpPr>
                 <p:cNvPr id="17" name="TextBox 16">
@@ -7119,8 +7115,8 @@
             </p:sp>
           </mc:Fallback>
         </mc:AlternateContent>
-        <mc:AlternateContent xmlns:mc="http://schemas.openxmlformats.org/markup-compatibility/2006">
-          <mc:Choice xmlns:a14="http://schemas.microsoft.com/office/drawing/2010/main" Requires="a14">
+        <mc:AlternateContent xmlns:mc="http://schemas.openxmlformats.org/markup-compatibility/2006" xmlns:a14="http://schemas.microsoft.com/office/drawing/2010/main">
+          <mc:Choice Requires="a14">
             <p:sp>
               <p:nvSpPr>
                 <p:cNvPr id="20" name="TextBox 19">
@@ -7149,6 +7145,7 @@
                 </a:bodyPr>
                 <a:lstStyle/>
                 <a:p>
+                  <a:pPr/>
                   <a14:m>
                     <m:oMathPara xmlns:m="http://schemas.openxmlformats.org/officeDocument/2006/math">
                       <m:oMathParaPr>
@@ -7179,7 +7176,7 @@
               </p:txBody>
             </p:sp>
           </mc:Choice>
-          <mc:Fallback>
+          <mc:Fallback xmlns="">
             <p:sp>
               <p:nvSpPr>
                 <p:cNvPr id="20" name="TextBox 19">
@@ -7380,8 +7377,8 @@
             </a:fontRef>
           </p:style>
         </p:cxnSp>
-        <mc:AlternateContent xmlns:mc="http://schemas.openxmlformats.org/markup-compatibility/2006">
-          <mc:Choice xmlns:a14="http://schemas.microsoft.com/office/drawing/2010/main" Requires="a14">
+        <mc:AlternateContent xmlns:mc="http://schemas.openxmlformats.org/markup-compatibility/2006" xmlns:a14="http://schemas.microsoft.com/office/drawing/2010/main">
+          <mc:Choice Requires="a14">
             <p:sp>
               <p:nvSpPr>
                 <p:cNvPr id="26" name="TextBox 25">
@@ -7410,6 +7407,7 @@
                 </a:bodyPr>
                 <a:lstStyle/>
                 <a:p>
+                  <a:pPr/>
                   <a14:m>
                     <m:oMathPara xmlns:m="http://schemas.openxmlformats.org/officeDocument/2006/math">
                       <m:oMathParaPr>
@@ -7444,7 +7442,7 @@
               </p:txBody>
             </p:sp>
           </mc:Choice>
-          <mc:Fallback>
+          <mc:Fallback xmlns="">
             <p:sp>
               <p:nvSpPr>
                 <p:cNvPr id="26" name="TextBox 25">
@@ -7935,200 +7933,8 @@
                 </a14:m>
                 <a:r>
                   <a:rPr lang="en-GB" sz="2400" dirty="0"/>
-                  <a:t> define on a plane</a:t>
+                  <a:t> define a plane</a:t>
                 </a:r>
-              </a:p>
-              <a:p>
-                <a:r>
-                  <a:rPr lang="en-GB" sz="2400" dirty="0"/>
-                  <a:t>Therefore, any point </a:t>
-                </a:r>
-                <a14:m>
-                  <m:oMath xmlns:m="http://schemas.openxmlformats.org/officeDocument/2006/math">
-                    <m:r>
-                      <a:rPr lang="en-GB" sz="2400" b="1" i="1" smtClean="0">
-                        <a:latin typeface="Cambria Math" panose="02040503050406030204" pitchFamily="18" charset="0"/>
-                      </a:rPr>
-                      <m:t>𝒙</m:t>
-                    </m:r>
-                  </m:oMath>
-                </a14:m>
-                <a:r>
-                  <a:rPr lang="en-GB" sz="2400" dirty="0"/>
-                  <a:t> lying on the plane can be expressed as a linear combination of the two vectors, starting from any point </a:t>
-                </a:r>
-                <a14:m>
-                  <m:oMath xmlns:m="http://schemas.openxmlformats.org/officeDocument/2006/math">
-                    <m:r>
-                      <a:rPr lang="en-GB" sz="2400" b="1" i="1" smtClean="0">
-                        <a:latin typeface="Cambria Math" panose="02040503050406030204" pitchFamily="18" charset="0"/>
-                      </a:rPr>
-                      <m:t>𝒑</m:t>
-                    </m:r>
-                  </m:oMath>
-                </a14:m>
-                <a:r>
-                  <a:rPr lang="en-GB" sz="2400" dirty="0"/>
-                  <a:t> on the plane:</a:t>
-                </a:r>
-              </a:p>
-              <a:p>
-                <a:pPr marL="0" indent="0">
-                  <a:buNone/>
-                </a:pPr>
-                <a:endParaRPr lang="en-GB" sz="2400" b="1" i="1" dirty="0">
-                  <a:latin typeface="Cambria Math" panose="02040503050406030204" pitchFamily="18" charset="0"/>
-                </a:endParaRPr>
-              </a:p>
-              <a:p>
-                <a:pPr marL="0" indent="0">
-                  <a:buNone/>
-                </a:pPr>
-                <a14:m>
-                  <m:oMathPara xmlns:m="http://schemas.openxmlformats.org/officeDocument/2006/math">
-                    <m:oMathParaPr>
-                      <m:jc m:val="centerGroup"/>
-                    </m:oMathParaPr>
-                    <m:oMath xmlns:m="http://schemas.openxmlformats.org/officeDocument/2006/math">
-                      <m:r>
-                        <a:rPr lang="en-GB" sz="2400" b="1" i="1" smtClean="0">
-                          <a:solidFill>
-                            <a:schemeClr val="accent6"/>
-                          </a:solidFill>
-                          <a:latin typeface="Cambria Math" panose="02040503050406030204" pitchFamily="18" charset="0"/>
-                        </a:rPr>
-                        <m:t>𝒙</m:t>
-                      </m:r>
-                      <m:r>
-                        <a:rPr lang="en-GB" sz="2400" b="0" i="1" smtClean="0">
-                          <a:solidFill>
-                            <a:schemeClr val="accent6"/>
-                          </a:solidFill>
-                          <a:latin typeface="Cambria Math" panose="02040503050406030204" pitchFamily="18" charset="0"/>
-                        </a:rPr>
-                        <m:t>=</m:t>
-                      </m:r>
-                      <m:r>
-                        <a:rPr lang="en-GB" sz="2400" b="1" i="1" smtClean="0">
-                          <a:solidFill>
-                            <a:schemeClr val="accent6"/>
-                          </a:solidFill>
-                          <a:latin typeface="Cambria Math" panose="02040503050406030204" pitchFamily="18" charset="0"/>
-                        </a:rPr>
-                        <m:t>𝒑</m:t>
-                      </m:r>
-                      <m:r>
-                        <a:rPr lang="en-GB" sz="2400" b="0" i="1" smtClean="0">
-                          <a:solidFill>
-                            <a:schemeClr val="accent6"/>
-                          </a:solidFill>
-                          <a:latin typeface="Cambria Math" panose="02040503050406030204" pitchFamily="18" charset="0"/>
-                        </a:rPr>
-                        <m:t>+</m:t>
-                      </m:r>
-                      <m:r>
-                        <a:rPr lang="en-GB" sz="2400" b="0" i="1" smtClean="0">
-                          <a:solidFill>
-                            <a:schemeClr val="accent6"/>
-                          </a:solidFill>
-                          <a:latin typeface="Cambria Math" panose="02040503050406030204" pitchFamily="18" charset="0"/>
-                        </a:rPr>
-                        <m:t>𝑠</m:t>
-                      </m:r>
-                      <m:sSub>
-                        <m:sSubPr>
-                          <m:ctrlPr>
-                            <a:rPr lang="en-GB" sz="2400" b="0" i="1" smtClean="0">
-                              <a:solidFill>
-                                <a:schemeClr val="accent6"/>
-                              </a:solidFill>
-                              <a:latin typeface="Cambria Math" panose="02040503050406030204" pitchFamily="18" charset="0"/>
-                            </a:rPr>
-                          </m:ctrlPr>
-                        </m:sSubPr>
-                        <m:e>
-                          <m:r>
-                            <a:rPr lang="en-GB" sz="2400" b="1" i="1" smtClean="0">
-                              <a:solidFill>
-                                <a:schemeClr val="accent6"/>
-                              </a:solidFill>
-                              <a:latin typeface="Cambria Math" panose="02040503050406030204" pitchFamily="18" charset="0"/>
-                            </a:rPr>
-                            <m:t>𝒗</m:t>
-                          </m:r>
-                        </m:e>
-                        <m:sub>
-                          <m:r>
-                            <a:rPr lang="en-GB" sz="2400" b="0" i="1" smtClean="0">
-                              <a:solidFill>
-                                <a:schemeClr val="accent6"/>
-                              </a:solidFill>
-                              <a:latin typeface="Cambria Math" panose="02040503050406030204" pitchFamily="18" charset="0"/>
-                            </a:rPr>
-                            <m:t>1</m:t>
-                          </m:r>
-                        </m:sub>
-                      </m:sSub>
-                      <m:r>
-                        <a:rPr lang="en-GB" sz="2400" b="0" i="1" smtClean="0">
-                          <a:solidFill>
-                            <a:schemeClr val="accent6"/>
-                          </a:solidFill>
-                          <a:latin typeface="Cambria Math" panose="02040503050406030204" pitchFamily="18" charset="0"/>
-                        </a:rPr>
-                        <m:t>+</m:t>
-                      </m:r>
-                      <m:r>
-                        <a:rPr lang="en-GB" sz="2400" b="0" i="1" smtClean="0">
-                          <a:solidFill>
-                            <a:schemeClr val="accent6"/>
-                          </a:solidFill>
-                          <a:latin typeface="Cambria Math" panose="02040503050406030204" pitchFamily="18" charset="0"/>
-                        </a:rPr>
-                        <m:t>𝑡</m:t>
-                      </m:r>
-                      <m:sSub>
-                        <m:sSubPr>
-                          <m:ctrlPr>
-                            <a:rPr lang="en-GB" sz="2400" b="0" i="1" smtClean="0">
-                              <a:solidFill>
-                                <a:schemeClr val="accent6"/>
-                              </a:solidFill>
-                              <a:latin typeface="Cambria Math" panose="02040503050406030204" pitchFamily="18" charset="0"/>
-                            </a:rPr>
-                          </m:ctrlPr>
-                        </m:sSubPr>
-                        <m:e>
-                          <m:r>
-                            <a:rPr lang="en-GB" sz="2400" b="1" i="1" smtClean="0">
-                              <a:solidFill>
-                                <a:schemeClr val="accent6"/>
-                              </a:solidFill>
-                              <a:latin typeface="Cambria Math" panose="02040503050406030204" pitchFamily="18" charset="0"/>
-                            </a:rPr>
-                            <m:t>𝒗</m:t>
-                          </m:r>
-                        </m:e>
-                        <m:sub>
-                          <m:r>
-                            <a:rPr lang="en-GB" sz="2400" b="0" i="1" smtClean="0">
-                              <a:solidFill>
-                                <a:schemeClr val="accent6"/>
-                              </a:solidFill>
-                              <a:latin typeface="Cambria Math" panose="02040503050406030204" pitchFamily="18" charset="0"/>
-                            </a:rPr>
-                            <m:t>2</m:t>
-                          </m:r>
-                        </m:sub>
-                      </m:sSub>
-                    </m:oMath>
-                  </m:oMathPara>
-                </a14:m>
-                <a:endParaRPr lang="en-GB" sz="2400" b="1" dirty="0">
-                  <a:solidFill>
-                    <a:schemeClr val="accent6"/>
-                  </a:solidFill>
-                </a:endParaRPr>
               </a:p>
             </p:txBody>
           </p:sp>
@@ -8177,144 +7983,12 @@
           </p:sp>
         </mc:Fallback>
       </mc:AlternateContent>
-      <mc:AlternateContent xmlns:mc="http://schemas.openxmlformats.org/markup-compatibility/2006">
-        <mc:Choice xmlns:a14="http://schemas.microsoft.com/office/drawing/2010/main" Requires="a14">
-          <p:sp>
-            <p:nvSpPr>
-              <p:cNvPr id="21" name="TextBox 20">
-                <a:extLst>
-                  <a:ext uri="{FF2B5EF4-FFF2-40B4-BE49-F238E27FC236}">
-                    <a16:creationId xmlns:a16="http://schemas.microsoft.com/office/drawing/2014/main" id="{9626CE76-FF4D-4B22-8B49-E73EE41B3572}"/>
-                  </a:ext>
-                </a:extLst>
-              </p:cNvPr>
-              <p:cNvSpPr txBox="1"/>
-              <p:nvPr/>
-            </p:nvSpPr>
-            <p:spPr>
-              <a:xfrm>
-                <a:off x="3882867" y="5898182"/>
-                <a:ext cx="694258" cy="400110"/>
-              </a:xfrm>
-              <a:prstGeom prst="rect">
-                <a:avLst/>
-              </a:prstGeom>
-              <a:noFill/>
-            </p:spPr>
-            <p:txBody>
-              <a:bodyPr wrap="square" rtlCol="0">
-                <a:spAutoFit/>
-              </a:bodyPr>
-              <a:lstStyle/>
-              <a:p>
-                <a14:m>
-                  <m:oMathPara xmlns:m="http://schemas.openxmlformats.org/officeDocument/2006/math">
-                    <m:oMathParaPr>
-                      <m:jc m:val="centerGroup"/>
-                    </m:oMathParaPr>
-                    <m:oMath xmlns:m="http://schemas.openxmlformats.org/officeDocument/2006/math">
-                      <m:sSub>
-                        <m:sSubPr>
-                          <m:ctrlPr>
-                            <a:rPr lang="en-GB" sz="2000" b="1" i="1" smtClean="0">
-                              <a:solidFill>
-                                <a:schemeClr val="accent2"/>
-                              </a:solidFill>
-                              <a:latin typeface="Cambria Math" panose="02040503050406030204" pitchFamily="18" charset="0"/>
-                              <a:cs typeface="Times New Roman" panose="02020603050405020304" pitchFamily="18" charset="0"/>
-                            </a:rPr>
-                          </m:ctrlPr>
-                        </m:sSubPr>
-                        <m:e>
-                          <m:r>
-                            <a:rPr lang="en-GB" sz="2000" b="1" i="1" smtClean="0">
-                              <a:solidFill>
-                                <a:schemeClr val="accent2"/>
-                              </a:solidFill>
-                              <a:latin typeface="Cambria Math" panose="02040503050406030204" pitchFamily="18" charset="0"/>
-                              <a:cs typeface="Times New Roman" panose="02020603050405020304" pitchFamily="18" charset="0"/>
-                            </a:rPr>
-                            <m:t>𝒗</m:t>
-                          </m:r>
-                        </m:e>
-                        <m:sub>
-                          <m:r>
-                            <a:rPr lang="en-GB" sz="2000" b="1" i="1" smtClean="0">
-                              <a:solidFill>
-                                <a:schemeClr val="accent2"/>
-                              </a:solidFill>
-                              <a:latin typeface="Cambria Math" panose="02040503050406030204" pitchFamily="18" charset="0"/>
-                              <a:cs typeface="Times New Roman" panose="02020603050405020304" pitchFamily="18" charset="0"/>
-                            </a:rPr>
-                            <m:t>𝟏</m:t>
-                          </m:r>
-                        </m:sub>
-                      </m:sSub>
-                    </m:oMath>
-                  </m:oMathPara>
-                </a14:m>
-                <a:endParaRPr lang="en-GB" sz="2000" b="1" dirty="0">
-                  <a:solidFill>
-                    <a:schemeClr val="accent2"/>
-                  </a:solidFill>
-                  <a:latin typeface="Times New Roman" panose="02020603050405020304" pitchFamily="18" charset="0"/>
-                  <a:cs typeface="Times New Roman" panose="02020603050405020304" pitchFamily="18" charset="0"/>
-                </a:endParaRPr>
-              </a:p>
-            </p:txBody>
-          </p:sp>
-        </mc:Choice>
-        <mc:Fallback>
-          <p:sp>
-            <p:nvSpPr>
-              <p:cNvPr id="21" name="TextBox 20">
-                <a:extLst>
-                  <a:ext uri="{FF2B5EF4-FFF2-40B4-BE49-F238E27FC236}">
-                    <a16:creationId xmlns:a16="http://schemas.microsoft.com/office/drawing/2014/main" id="{9626CE76-FF4D-4B22-8B49-E73EE41B3572}"/>
-                  </a:ext>
-                </a:extLst>
-              </p:cNvPr>
-              <p:cNvSpPr txBox="1">
-                <a:spLocks noRot="1" noChangeAspect="1" noMove="1" noResize="1" noEditPoints="1" noAdjustHandles="1" noChangeArrowheads="1" noChangeShapeType="1" noTextEdit="1"/>
-              </p:cNvSpPr>
-              <p:nvPr/>
-            </p:nvSpPr>
-            <p:spPr>
-              <a:xfrm>
-                <a:off x="3882867" y="5898182"/>
-                <a:ext cx="694258" cy="400110"/>
-              </a:xfrm>
-              <a:prstGeom prst="rect">
-                <a:avLst/>
-              </a:prstGeom>
-              <a:blipFill>
-                <a:blip r:embed="rId3"/>
-                <a:stretch>
-                  <a:fillRect b="-3077"/>
-                </a:stretch>
-              </a:blipFill>
-            </p:spPr>
-            <p:txBody>
-              <a:bodyPr/>
-              <a:lstStyle/>
-              <a:p>
-                <a:r>
-                  <a:rPr lang="en-GB">
-                    <a:noFill/>
-                  </a:rPr>
-                  <a:t> </a:t>
-                </a:r>
-              </a:p>
-            </p:txBody>
-          </p:sp>
-        </mc:Fallback>
-      </mc:AlternateContent>
       <p:grpSp>
         <p:nvGrpSpPr>
-          <p:cNvPr id="19" name="Group 18">
+          <p:cNvPr id="5" name="Group 4">
             <a:extLst>
               <a:ext uri="{FF2B5EF4-FFF2-40B4-BE49-F238E27FC236}">
-                <a16:creationId xmlns:a16="http://schemas.microsoft.com/office/drawing/2014/main" id="{3B08E13E-B94C-40CF-8FEE-C73894E16370}"/>
+                <a16:creationId xmlns:a16="http://schemas.microsoft.com/office/drawing/2014/main" id="{5E324414-8E2A-46E6-9316-DA81ADEFC347}"/>
               </a:ext>
             </a:extLst>
           </p:cNvPr>
@@ -8324,133 +7998,19 @@
         <p:grpSpPr>
           <a:xfrm>
             <a:off x="1591939" y="4284340"/>
-            <a:ext cx="2535659" cy="1865332"/>
-            <a:chOff x="1776921" y="4450245"/>
-            <a:chExt cx="2535659" cy="1865332"/>
+            <a:ext cx="2985186" cy="2013952"/>
+            <a:chOff x="1591939" y="4284340"/>
+            <a:chExt cx="2985186" cy="2013952"/>
           </a:xfrm>
         </p:grpSpPr>
-        <p:sp>
-          <p:nvSpPr>
-            <p:cNvPr id="6" name="Parallelogram 5">
-              <a:extLst>
-                <a:ext uri="{FF2B5EF4-FFF2-40B4-BE49-F238E27FC236}">
-                  <a16:creationId xmlns:a16="http://schemas.microsoft.com/office/drawing/2014/main" id="{0EE04EEE-F7EF-4192-A452-8A18529DD8FF}"/>
-                </a:ext>
-              </a:extLst>
-            </p:cNvPr>
-            <p:cNvSpPr/>
-            <p:nvPr/>
-          </p:nvSpPr>
-          <p:spPr>
-            <a:xfrm rot="1688054">
-              <a:off x="1776921" y="4952631"/>
-              <a:ext cx="2353347" cy="1362946"/>
-            </a:xfrm>
-            <a:prstGeom prst="parallelogram">
-              <a:avLst>
-                <a:gd name="adj" fmla="val 51342"/>
-              </a:avLst>
-            </a:prstGeom>
-            <a:solidFill>
-              <a:srgbClr val="4472C4">
-                <a:alpha val="20000"/>
-              </a:srgbClr>
-            </a:solidFill>
-            <a:ln>
-              <a:solidFill>
-                <a:srgbClr val="2F528F">
-                  <a:alpha val="30196"/>
-                </a:srgbClr>
-              </a:solidFill>
-            </a:ln>
-          </p:spPr>
-          <p:style>
-            <a:lnRef idx="2">
-              <a:schemeClr val="accent1">
-                <a:shade val="50000"/>
-              </a:schemeClr>
-            </a:lnRef>
-            <a:fillRef idx="1">
-              <a:schemeClr val="accent1"/>
-            </a:fillRef>
-            <a:effectRef idx="0">
-              <a:schemeClr val="accent1"/>
-            </a:effectRef>
-            <a:fontRef idx="minor">
-              <a:schemeClr val="lt1"/>
-            </a:fontRef>
-          </p:style>
-          <p:txBody>
-            <a:bodyPr rtlCol="0" anchor="ctr"/>
-            <a:lstStyle/>
-            <a:p>
-              <a:pPr algn="ctr"/>
-              <a:endParaRPr lang="en-GB" dirty="0"/>
-            </a:p>
-          </p:txBody>
-        </p:sp>
-        <p:sp>
-          <p:nvSpPr>
-            <p:cNvPr id="9" name="Oval 8">
-              <a:extLst>
-                <a:ext uri="{FF2B5EF4-FFF2-40B4-BE49-F238E27FC236}">
-                  <a16:creationId xmlns:a16="http://schemas.microsoft.com/office/drawing/2014/main" id="{D6CD6FB7-0475-4EDE-B2D1-ACFA073648D1}"/>
-                </a:ext>
-              </a:extLst>
-            </p:cNvPr>
-            <p:cNvSpPr/>
-            <p:nvPr/>
-          </p:nvSpPr>
-          <p:spPr>
-            <a:xfrm>
-              <a:off x="2583605" y="5457521"/>
-              <a:ext cx="45719" cy="45719"/>
-            </a:xfrm>
-            <a:prstGeom prst="ellipse">
-              <a:avLst/>
-            </a:prstGeom>
-            <a:solidFill>
-              <a:schemeClr val="accent4"/>
-            </a:solidFill>
-            <a:ln>
-              <a:solidFill>
-                <a:schemeClr val="accent4"/>
-              </a:solidFill>
-            </a:ln>
-          </p:spPr>
-          <p:style>
-            <a:lnRef idx="2">
-              <a:schemeClr val="accent1">
-                <a:shade val="50000"/>
-              </a:schemeClr>
-            </a:lnRef>
-            <a:fillRef idx="1">
-              <a:schemeClr val="accent1"/>
-            </a:fillRef>
-            <a:effectRef idx="0">
-              <a:schemeClr val="accent1"/>
-            </a:effectRef>
-            <a:fontRef idx="minor">
-              <a:schemeClr val="lt1"/>
-            </a:fontRef>
-          </p:style>
-          <p:txBody>
-            <a:bodyPr rtlCol="0" anchor="ctr"/>
-            <a:lstStyle/>
-            <a:p>
-              <a:pPr algn="ctr"/>
-              <a:endParaRPr lang="en-GB"/>
-            </a:p>
-          </p:txBody>
-        </p:sp>
         <mc:AlternateContent xmlns:mc="http://schemas.openxmlformats.org/markup-compatibility/2006">
           <mc:Choice xmlns:a14="http://schemas.microsoft.com/office/drawing/2010/main" Requires="a14">
             <p:sp>
               <p:nvSpPr>
-                <p:cNvPr id="10" name="TextBox 9">
+                <p:cNvPr id="21" name="TextBox 20">
                   <a:extLst>
                     <a:ext uri="{FF2B5EF4-FFF2-40B4-BE49-F238E27FC236}">
-                      <a16:creationId xmlns:a16="http://schemas.microsoft.com/office/drawing/2014/main" id="{45E3DCEC-29F2-4316-9A48-D2639EDCDDC7}"/>
+                      <a16:creationId xmlns:a16="http://schemas.microsoft.com/office/drawing/2014/main" id="{9626CE76-FF4D-4B22-8B49-E73EE41B3572}"/>
                     </a:ext>
                   </a:extLst>
                 </p:cNvPr>
@@ -8459,7 +8019,7 @@
               </p:nvSpPr>
               <p:spPr>
                 <a:xfrm>
-                  <a:off x="2062112" y="5404795"/>
+                  <a:off x="3882867" y="5898182"/>
                   <a:ext cx="694258" cy="400110"/>
                 </a:xfrm>
                 <a:prstGeom prst="rect">
@@ -8473,28 +8033,56 @@
                 </a:bodyPr>
                 <a:lstStyle/>
                 <a:p>
+                  <a:pPr/>
                   <a14:m>
                     <m:oMathPara xmlns:m="http://schemas.openxmlformats.org/officeDocument/2006/math">
                       <m:oMathParaPr>
                         <m:jc m:val="centerGroup"/>
                       </m:oMathParaPr>
                       <m:oMath xmlns:m="http://schemas.openxmlformats.org/officeDocument/2006/math">
-                        <m:r>
-                          <a:rPr lang="en-GB" sz="2000" b="1" i="1" smtClean="0">
-                            <a:solidFill>
-                              <a:schemeClr val="accent4"/>
-                            </a:solidFill>
-                            <a:latin typeface="Cambria Math" panose="02040503050406030204" pitchFamily="18" charset="0"/>
-                            <a:cs typeface="Times New Roman" panose="02020603050405020304" pitchFamily="18" charset="0"/>
-                          </a:rPr>
-                          <m:t>𝒑</m:t>
-                        </m:r>
+                        <m:sSub>
+                          <m:sSubPr>
+                            <m:ctrlPr>
+                              <a:rPr lang="en-GB" sz="2000" b="1" i="1" smtClean="0">
+                                <a:solidFill>
+                                  <a:schemeClr val="accent2"/>
+                                </a:solidFill>
+                                <a:latin typeface="Cambria Math" panose="02040503050406030204" pitchFamily="18" charset="0"/>
+                                <a:cs typeface="Times New Roman" panose="02020603050405020304" pitchFamily="18" charset="0"/>
+                              </a:rPr>
+                            </m:ctrlPr>
+                          </m:sSubPr>
+                          <m:e>
+                            <m:r>
+                              <a:rPr lang="en-GB" sz="2000" b="1" i="1" smtClean="0">
+                                <a:solidFill>
+                                  <a:schemeClr val="accent2"/>
+                                </a:solidFill>
+                                <a:latin typeface="Cambria Math" panose="02040503050406030204" pitchFamily="18" charset="0"/>
+                                <a:cs typeface="Times New Roman" panose="02020603050405020304" pitchFamily="18" charset="0"/>
+                              </a:rPr>
+                              <m:t>𝒗</m:t>
+                            </m:r>
+                          </m:e>
+                          <m:sub>
+                            <m:r>
+                              <a:rPr lang="en-GB" sz="2000" b="1" i="1" smtClean="0">
+                                <a:solidFill>
+                                  <a:schemeClr val="accent2"/>
+                                </a:solidFill>
+                                <a:latin typeface="Cambria Math" panose="02040503050406030204" pitchFamily="18" charset="0"/>
+                                <a:cs typeface="Times New Roman" panose="02020603050405020304" pitchFamily="18" charset="0"/>
+                              </a:rPr>
+                              <m:t>𝟏</m:t>
+                            </m:r>
+                          </m:sub>
+                        </m:sSub>
                       </m:oMath>
                     </m:oMathPara>
                   </a14:m>
                   <a:endParaRPr lang="en-GB" sz="2000" b="1" dirty="0">
                     <a:solidFill>
-                      <a:schemeClr val="accent4"/>
+                      <a:schemeClr val="accent2"/>
                     </a:solidFill>
                     <a:latin typeface="Times New Roman" panose="02020603050405020304" pitchFamily="18" charset="0"/>
                     <a:cs typeface="Times New Roman" panose="02020603050405020304" pitchFamily="18" charset="0"/>
@@ -8506,10 +8094,10 @@
           <mc:Fallback>
             <p:sp>
               <p:nvSpPr>
-                <p:cNvPr id="10" name="TextBox 9">
+                <p:cNvPr id="21" name="TextBox 20">
                   <a:extLst>
                     <a:ext uri="{FF2B5EF4-FFF2-40B4-BE49-F238E27FC236}">
-                      <a16:creationId xmlns:a16="http://schemas.microsoft.com/office/drawing/2014/main" id="{45E3DCEC-29F2-4316-9A48-D2639EDCDDC7}"/>
+                      <a16:creationId xmlns:a16="http://schemas.microsoft.com/office/drawing/2014/main" id="{9626CE76-FF4D-4B22-8B49-E73EE41B3572}"/>
                     </a:ext>
                   </a:extLst>
                 </p:cNvPr>
@@ -8520,393 +8108,14 @@
               </p:nvSpPr>
               <p:spPr>
                 <a:xfrm>
-                  <a:off x="2062112" y="5404795"/>
+                  <a:off x="3882867" y="5898182"/>
                   <a:ext cx="694258" cy="400110"/>
                 </a:xfrm>
                 <a:prstGeom prst="rect">
                   <a:avLst/>
                 </a:prstGeom>
                 <a:blipFill>
-                  <a:blip r:embed="rId4"/>
-                  <a:stretch>
-                    <a:fillRect b="-9091"/>
-                  </a:stretch>
-                </a:blipFill>
-              </p:spPr>
-              <p:txBody>
-                <a:bodyPr/>
-                <a:lstStyle/>
-                <a:p>
-                  <a:r>
-                    <a:rPr lang="en-GB">
-                      <a:noFill/>
-                    </a:rPr>
-                    <a:t> </a:t>
-                  </a:r>
-                </a:p>
-              </p:txBody>
-            </p:sp>
-          </mc:Fallback>
-        </mc:AlternateContent>
-        <mc:AlternateContent xmlns:mc="http://schemas.openxmlformats.org/markup-compatibility/2006">
-          <mc:Choice xmlns:a14="http://schemas.microsoft.com/office/drawing/2010/main" Requires="a14">
-            <p:sp>
-              <p:nvSpPr>
-                <p:cNvPr id="12" name="TextBox 11">
-                  <a:extLst>
-                    <a:ext uri="{FF2B5EF4-FFF2-40B4-BE49-F238E27FC236}">
-                      <a16:creationId xmlns:a16="http://schemas.microsoft.com/office/drawing/2014/main" id="{044C33F9-E5C5-4FA1-A514-8729C4BA45B5}"/>
-                    </a:ext>
-                  </a:extLst>
-                </p:cNvPr>
-                <p:cNvSpPr txBox="1"/>
-                <p:nvPr/>
-              </p:nvSpPr>
-              <p:spPr>
-                <a:xfrm>
-                  <a:off x="3569891" y="5250465"/>
-                  <a:ext cx="694258" cy="400110"/>
-                </a:xfrm>
-                <a:prstGeom prst="rect">
-                  <a:avLst/>
-                </a:prstGeom>
-                <a:noFill/>
-              </p:spPr>
-              <p:txBody>
-                <a:bodyPr wrap="square" rtlCol="0">
-                  <a:spAutoFit/>
-                </a:bodyPr>
-                <a:lstStyle/>
-                <a:p>
-                  <a14:m>
-                    <m:oMathPara xmlns:m="http://schemas.openxmlformats.org/officeDocument/2006/math">
-                      <m:oMathParaPr>
-                        <m:jc m:val="centerGroup"/>
-                      </m:oMathParaPr>
-                      <m:oMath xmlns:m="http://schemas.openxmlformats.org/officeDocument/2006/math">
-                        <m:r>
-                          <a:rPr lang="en-GB" sz="2000" b="1" i="1" smtClean="0">
-                            <a:solidFill>
-                              <a:schemeClr val="accent6"/>
-                            </a:solidFill>
-                            <a:latin typeface="Cambria Math" panose="02040503050406030204" pitchFamily="18" charset="0"/>
-                            <a:cs typeface="Times New Roman" panose="02020603050405020304" pitchFamily="18" charset="0"/>
-                          </a:rPr>
-                          <m:t>𝒙</m:t>
-                        </m:r>
-                      </m:oMath>
-                    </m:oMathPara>
-                  </a14:m>
-                  <a:endParaRPr lang="en-GB" sz="2000" b="1" dirty="0">
-                    <a:solidFill>
-                      <a:schemeClr val="accent6"/>
-                    </a:solidFill>
-                    <a:latin typeface="Times New Roman" panose="02020603050405020304" pitchFamily="18" charset="0"/>
-                    <a:cs typeface="Times New Roman" panose="02020603050405020304" pitchFamily="18" charset="0"/>
-                  </a:endParaRPr>
-                </a:p>
-              </p:txBody>
-            </p:sp>
-          </mc:Choice>
-          <mc:Fallback>
-            <p:sp>
-              <p:nvSpPr>
-                <p:cNvPr id="12" name="TextBox 11">
-                  <a:extLst>
-                    <a:ext uri="{FF2B5EF4-FFF2-40B4-BE49-F238E27FC236}">
-                      <a16:creationId xmlns:a16="http://schemas.microsoft.com/office/drawing/2014/main" id="{044C33F9-E5C5-4FA1-A514-8729C4BA45B5}"/>
-                    </a:ext>
-                  </a:extLst>
-                </p:cNvPr>
-                <p:cNvSpPr txBox="1">
-                  <a:spLocks noRot="1" noChangeAspect="1" noMove="1" noResize="1" noEditPoints="1" noAdjustHandles="1" noChangeArrowheads="1" noChangeShapeType="1" noTextEdit="1"/>
-                </p:cNvSpPr>
-                <p:nvPr/>
-              </p:nvSpPr>
-              <p:spPr>
-                <a:xfrm>
-                  <a:off x="3569891" y="5250465"/>
-                  <a:ext cx="694258" cy="400110"/>
-                </a:xfrm>
-                <a:prstGeom prst="rect">
-                  <a:avLst/>
-                </a:prstGeom>
-                <a:blipFill>
-                  <a:blip r:embed="rId5"/>
-                  <a:stretch>
-                    <a:fillRect/>
-                  </a:stretch>
-                </a:blipFill>
-              </p:spPr>
-              <p:txBody>
-                <a:bodyPr/>
-                <a:lstStyle/>
-                <a:p>
-                  <a:r>
-                    <a:rPr lang="en-GB">
-                      <a:noFill/>
-                    </a:rPr>
-                    <a:t> </a:t>
-                  </a:r>
-                </a:p>
-              </p:txBody>
-            </p:sp>
-          </mc:Fallback>
-        </mc:AlternateContent>
-        <p:sp>
-          <p:nvSpPr>
-            <p:cNvPr id="13" name="Oval 12">
-              <a:extLst>
-                <a:ext uri="{FF2B5EF4-FFF2-40B4-BE49-F238E27FC236}">
-                  <a16:creationId xmlns:a16="http://schemas.microsoft.com/office/drawing/2014/main" id="{88DAE091-2EAD-4AA1-86E6-5C34C8BEFEB1}"/>
-                </a:ext>
-              </a:extLst>
-            </p:cNvPr>
-            <p:cNvSpPr/>
-            <p:nvPr/>
-          </p:nvSpPr>
-          <p:spPr>
-            <a:xfrm>
-              <a:off x="3882559" y="5611244"/>
-              <a:ext cx="45719" cy="45719"/>
-            </a:xfrm>
-            <a:prstGeom prst="ellipse">
-              <a:avLst/>
-            </a:prstGeom>
-            <a:solidFill>
-              <a:schemeClr val="accent6"/>
-            </a:solidFill>
-            <a:ln>
-              <a:solidFill>
-                <a:schemeClr val="accent6"/>
-              </a:solidFill>
-            </a:ln>
-          </p:spPr>
-          <p:style>
-            <a:lnRef idx="2">
-              <a:schemeClr val="accent1">
-                <a:shade val="50000"/>
-              </a:schemeClr>
-            </a:lnRef>
-            <a:fillRef idx="1">
-              <a:schemeClr val="accent1"/>
-            </a:fillRef>
-            <a:effectRef idx="0">
-              <a:schemeClr val="accent1"/>
-            </a:effectRef>
-            <a:fontRef idx="minor">
-              <a:schemeClr val="lt1"/>
-            </a:fontRef>
-          </p:style>
-          <p:txBody>
-            <a:bodyPr rtlCol="0" anchor="ctr"/>
-            <a:lstStyle/>
-            <a:p>
-              <a:pPr algn="ctr"/>
-              <a:endParaRPr lang="en-GB"/>
-            </a:p>
-          </p:txBody>
-        </p:sp>
-        <p:cxnSp>
-          <p:nvCxnSpPr>
-            <p:cNvPr id="4" name="Straight Arrow Connector 3">
-              <a:extLst>
-                <a:ext uri="{FF2B5EF4-FFF2-40B4-BE49-F238E27FC236}">
-                  <a16:creationId xmlns:a16="http://schemas.microsoft.com/office/drawing/2014/main" id="{34FC0E3A-7ECE-4EF0-BC8A-46BAA3813D58}"/>
-                </a:ext>
-              </a:extLst>
-            </p:cNvPr>
-            <p:cNvCxnSpPr>
-              <a:cxnSpLocks/>
-            </p:cNvCxnSpPr>
-            <p:nvPr/>
-          </p:nvCxnSpPr>
-          <p:spPr>
-            <a:xfrm>
-              <a:off x="2606464" y="5480380"/>
-              <a:ext cx="1706116" cy="583707"/>
-            </a:xfrm>
-            <a:prstGeom prst="straightConnector1">
-              <a:avLst/>
-            </a:prstGeom>
-            <a:ln>
-              <a:solidFill>
-                <a:schemeClr val="accent2"/>
-              </a:solidFill>
-              <a:tailEnd type="triangle"/>
-            </a:ln>
-          </p:spPr>
-          <p:style>
-            <a:lnRef idx="1">
-              <a:schemeClr val="accent1"/>
-            </a:lnRef>
-            <a:fillRef idx="0">
-              <a:schemeClr val="accent1"/>
-            </a:fillRef>
-            <a:effectRef idx="0">
-              <a:schemeClr val="accent1"/>
-            </a:effectRef>
-            <a:fontRef idx="minor">
-              <a:schemeClr val="tx1"/>
-            </a:fontRef>
-          </p:style>
-        </p:cxnSp>
-        <p:cxnSp>
-          <p:nvCxnSpPr>
-            <p:cNvPr id="18" name="Straight Arrow Connector 17">
-              <a:extLst>
-                <a:ext uri="{FF2B5EF4-FFF2-40B4-BE49-F238E27FC236}">
-                  <a16:creationId xmlns:a16="http://schemas.microsoft.com/office/drawing/2014/main" id="{C25BD068-3D0C-4247-8EEE-5F4418F3F242}"/>
-                </a:ext>
-              </a:extLst>
-            </p:cNvPr>
-            <p:cNvCxnSpPr>
-              <a:cxnSpLocks/>
-            </p:cNvCxnSpPr>
-            <p:nvPr/>
-          </p:nvCxnSpPr>
-          <p:spPr>
-            <a:xfrm flipV="1">
-              <a:off x="2647597" y="4876980"/>
-              <a:ext cx="1325462" cy="614082"/>
-            </a:xfrm>
-            <a:prstGeom prst="straightConnector1">
-              <a:avLst/>
-            </a:prstGeom>
-            <a:ln>
-              <a:solidFill>
-                <a:srgbClr val="7030A0"/>
-              </a:solidFill>
-              <a:tailEnd type="triangle"/>
-            </a:ln>
-          </p:spPr>
-          <p:style>
-            <a:lnRef idx="1">
-              <a:schemeClr val="accent1"/>
-            </a:lnRef>
-            <a:fillRef idx="0">
-              <a:schemeClr val="accent1"/>
-            </a:fillRef>
-            <a:effectRef idx="0">
-              <a:schemeClr val="accent1"/>
-            </a:effectRef>
-            <a:fontRef idx="minor">
-              <a:schemeClr val="tx1"/>
-            </a:fontRef>
-          </p:style>
-        </p:cxnSp>
-        <mc:AlternateContent xmlns:mc="http://schemas.openxmlformats.org/markup-compatibility/2006">
-          <mc:Choice xmlns:a14="http://schemas.microsoft.com/office/drawing/2010/main" Requires="a14">
-            <p:sp>
-              <p:nvSpPr>
-                <p:cNvPr id="22" name="TextBox 21">
-                  <a:extLst>
-                    <a:ext uri="{FF2B5EF4-FFF2-40B4-BE49-F238E27FC236}">
-                      <a16:creationId xmlns:a16="http://schemas.microsoft.com/office/drawing/2014/main" id="{26D3E8E9-555B-4442-920F-FB024B40DC6A}"/>
-                    </a:ext>
-                  </a:extLst>
-                </p:cNvPr>
-                <p:cNvSpPr txBox="1"/>
-                <p:nvPr/>
-              </p:nvSpPr>
-              <p:spPr>
-                <a:xfrm>
-                  <a:off x="3535430" y="4450245"/>
-                  <a:ext cx="694258" cy="400110"/>
-                </a:xfrm>
-                <a:prstGeom prst="rect">
-                  <a:avLst/>
-                </a:prstGeom>
-                <a:noFill/>
-              </p:spPr>
-              <p:txBody>
-                <a:bodyPr wrap="square" rtlCol="0">
-                  <a:spAutoFit/>
-                </a:bodyPr>
-                <a:lstStyle/>
-                <a:p>
-                  <a14:m>
-                    <m:oMathPara xmlns:m="http://schemas.openxmlformats.org/officeDocument/2006/math">
-                      <m:oMathParaPr>
-                        <m:jc m:val="centerGroup"/>
-                      </m:oMathParaPr>
-                      <m:oMath xmlns:m="http://schemas.openxmlformats.org/officeDocument/2006/math">
-                        <m:sSub>
-                          <m:sSubPr>
-                            <m:ctrlPr>
-                              <a:rPr lang="en-GB" sz="2000" b="1" i="1" smtClean="0">
-                                <a:solidFill>
-                                  <a:srgbClr val="7030A0"/>
-                                </a:solidFill>
-                                <a:latin typeface="Cambria Math" panose="02040503050406030204" pitchFamily="18" charset="0"/>
-                                <a:cs typeface="Times New Roman" panose="02020603050405020304" pitchFamily="18" charset="0"/>
-                              </a:rPr>
-                            </m:ctrlPr>
-                          </m:sSubPr>
-                          <m:e>
-                            <m:r>
-                              <a:rPr lang="en-GB" sz="2000" b="1" i="1" smtClean="0">
-                                <a:solidFill>
-                                  <a:srgbClr val="7030A0"/>
-                                </a:solidFill>
-                                <a:latin typeface="Cambria Math" panose="02040503050406030204" pitchFamily="18" charset="0"/>
-                                <a:cs typeface="Times New Roman" panose="02020603050405020304" pitchFamily="18" charset="0"/>
-                              </a:rPr>
-                              <m:t>𝒗</m:t>
-                            </m:r>
-                          </m:e>
-                          <m:sub>
-                            <m:r>
-                              <a:rPr lang="en-GB" sz="2000" b="1" i="1" smtClean="0">
-                                <a:solidFill>
-                                  <a:srgbClr val="7030A0"/>
-                                </a:solidFill>
-                                <a:latin typeface="Cambria Math" panose="02040503050406030204" pitchFamily="18" charset="0"/>
-                                <a:cs typeface="Times New Roman" panose="02020603050405020304" pitchFamily="18" charset="0"/>
-                              </a:rPr>
-                              <m:t>𝟐</m:t>
-                            </m:r>
-                          </m:sub>
-                        </m:sSub>
-                      </m:oMath>
-                    </m:oMathPara>
-                  </a14:m>
-                  <a:endParaRPr lang="en-GB" sz="2000" b="1" dirty="0">
-                    <a:solidFill>
-                      <a:srgbClr val="7030A0"/>
-                    </a:solidFill>
-                    <a:latin typeface="Times New Roman" panose="02020603050405020304" pitchFamily="18" charset="0"/>
-                    <a:cs typeface="Times New Roman" panose="02020603050405020304" pitchFamily="18" charset="0"/>
-                  </a:endParaRPr>
-                </a:p>
-              </p:txBody>
-            </p:sp>
-          </mc:Choice>
-          <mc:Fallback>
-            <p:sp>
-              <p:nvSpPr>
-                <p:cNvPr id="22" name="TextBox 21">
-                  <a:extLst>
-                    <a:ext uri="{FF2B5EF4-FFF2-40B4-BE49-F238E27FC236}">
-                      <a16:creationId xmlns:a16="http://schemas.microsoft.com/office/drawing/2014/main" id="{26D3E8E9-555B-4442-920F-FB024B40DC6A}"/>
-                    </a:ext>
-                  </a:extLst>
-                </p:cNvPr>
-                <p:cNvSpPr txBox="1">
-                  <a:spLocks noRot="1" noChangeAspect="1" noMove="1" noResize="1" noEditPoints="1" noAdjustHandles="1" noChangeArrowheads="1" noChangeShapeType="1" noTextEdit="1"/>
-                </p:cNvSpPr>
-                <p:nvPr/>
-              </p:nvSpPr>
-              <p:spPr>
-                <a:xfrm>
-                  <a:off x="3535430" y="4450245"/>
-                  <a:ext cx="694258" cy="400110"/>
-                </a:xfrm>
-                <a:prstGeom prst="rect">
-                  <a:avLst/>
-                </a:prstGeom>
-                <a:blipFill>
-                  <a:blip r:embed="rId6"/>
+                  <a:blip r:embed="rId3"/>
                   <a:stretch>
                     <a:fillRect b="-3077"/>
                   </a:stretch>
@@ -8927,134 +8136,1229 @@
             </p:sp>
           </mc:Fallback>
         </mc:AlternateContent>
+        <p:grpSp>
+          <p:nvGrpSpPr>
+            <p:cNvPr id="19" name="Group 18">
+              <a:extLst>
+                <a:ext uri="{FF2B5EF4-FFF2-40B4-BE49-F238E27FC236}">
+                  <a16:creationId xmlns:a16="http://schemas.microsoft.com/office/drawing/2014/main" id="{3B08E13E-B94C-40CF-8FEE-C73894E16370}"/>
+                </a:ext>
+              </a:extLst>
+            </p:cNvPr>
+            <p:cNvGrpSpPr/>
+            <p:nvPr/>
+          </p:nvGrpSpPr>
+          <p:grpSpPr>
+            <a:xfrm>
+              <a:off x="1591939" y="4284340"/>
+              <a:ext cx="2535659" cy="1865332"/>
+              <a:chOff x="1776921" y="4450245"/>
+              <a:chExt cx="2535659" cy="1865332"/>
+            </a:xfrm>
+          </p:grpSpPr>
+          <p:sp>
+            <p:nvSpPr>
+              <p:cNvPr id="6" name="Parallelogram 5">
+                <a:extLst>
+                  <a:ext uri="{FF2B5EF4-FFF2-40B4-BE49-F238E27FC236}">
+                    <a16:creationId xmlns:a16="http://schemas.microsoft.com/office/drawing/2014/main" id="{0EE04EEE-F7EF-4192-A452-8A18529DD8FF}"/>
+                  </a:ext>
+                </a:extLst>
+              </p:cNvPr>
+              <p:cNvSpPr/>
+              <p:nvPr/>
+            </p:nvSpPr>
+            <p:spPr>
+              <a:xfrm rot="1688054">
+                <a:off x="1776921" y="4952631"/>
+                <a:ext cx="2353347" cy="1362946"/>
+              </a:xfrm>
+              <a:prstGeom prst="parallelogram">
+                <a:avLst>
+                  <a:gd name="adj" fmla="val 51342"/>
+                </a:avLst>
+              </a:prstGeom>
+              <a:solidFill>
+                <a:srgbClr val="4472C4">
+                  <a:alpha val="20000"/>
+                </a:srgbClr>
+              </a:solidFill>
+              <a:ln>
+                <a:solidFill>
+                  <a:srgbClr val="2F528F">
+                    <a:alpha val="30196"/>
+                  </a:srgbClr>
+                </a:solidFill>
+              </a:ln>
+            </p:spPr>
+            <p:style>
+              <a:lnRef idx="2">
+                <a:schemeClr val="accent1">
+                  <a:shade val="50000"/>
+                </a:schemeClr>
+              </a:lnRef>
+              <a:fillRef idx="1">
+                <a:schemeClr val="accent1"/>
+              </a:fillRef>
+              <a:effectRef idx="0">
+                <a:schemeClr val="accent1"/>
+              </a:effectRef>
+              <a:fontRef idx="minor">
+                <a:schemeClr val="lt1"/>
+              </a:fontRef>
+            </p:style>
+            <p:txBody>
+              <a:bodyPr rtlCol="0" anchor="ctr"/>
+              <a:lstStyle/>
+              <a:p>
+                <a:pPr algn="ctr"/>
+                <a:endParaRPr lang="en-GB" dirty="0"/>
+              </a:p>
+            </p:txBody>
+          </p:sp>
+          <p:sp>
+            <p:nvSpPr>
+              <p:cNvPr id="9" name="Oval 8">
+                <a:extLst>
+                  <a:ext uri="{FF2B5EF4-FFF2-40B4-BE49-F238E27FC236}">
+                    <a16:creationId xmlns:a16="http://schemas.microsoft.com/office/drawing/2014/main" id="{D6CD6FB7-0475-4EDE-B2D1-ACFA073648D1}"/>
+                  </a:ext>
+                </a:extLst>
+              </p:cNvPr>
+              <p:cNvSpPr/>
+              <p:nvPr/>
+            </p:nvSpPr>
+            <p:spPr>
+              <a:xfrm>
+                <a:off x="2583605" y="5457521"/>
+                <a:ext cx="45719" cy="45719"/>
+              </a:xfrm>
+              <a:prstGeom prst="ellipse">
+                <a:avLst/>
+              </a:prstGeom>
+              <a:solidFill>
+                <a:schemeClr val="accent4"/>
+              </a:solidFill>
+              <a:ln>
+                <a:solidFill>
+                  <a:schemeClr val="accent4"/>
+                </a:solidFill>
+              </a:ln>
+            </p:spPr>
+            <p:style>
+              <a:lnRef idx="2">
+                <a:schemeClr val="accent1">
+                  <a:shade val="50000"/>
+                </a:schemeClr>
+              </a:lnRef>
+              <a:fillRef idx="1">
+                <a:schemeClr val="accent1"/>
+              </a:fillRef>
+              <a:effectRef idx="0">
+                <a:schemeClr val="accent1"/>
+              </a:effectRef>
+              <a:fontRef idx="minor">
+                <a:schemeClr val="lt1"/>
+              </a:fontRef>
+            </p:style>
+            <p:txBody>
+              <a:bodyPr rtlCol="0" anchor="ctr"/>
+              <a:lstStyle/>
+              <a:p>
+                <a:pPr algn="ctr"/>
+                <a:endParaRPr lang="en-GB"/>
+              </a:p>
+            </p:txBody>
+          </p:sp>
+          <mc:AlternateContent xmlns:mc="http://schemas.openxmlformats.org/markup-compatibility/2006" xmlns:a14="http://schemas.microsoft.com/office/drawing/2010/main">
+            <mc:Choice Requires="a14">
+              <p:sp>
+                <p:nvSpPr>
+                  <p:cNvPr id="10" name="TextBox 9">
+                    <a:extLst>
+                      <a:ext uri="{FF2B5EF4-FFF2-40B4-BE49-F238E27FC236}">
+                        <a16:creationId xmlns:a16="http://schemas.microsoft.com/office/drawing/2014/main" id="{45E3DCEC-29F2-4316-9A48-D2639EDCDDC7}"/>
+                      </a:ext>
+                    </a:extLst>
+                  </p:cNvPr>
+                  <p:cNvSpPr txBox="1"/>
+                  <p:nvPr/>
+                </p:nvSpPr>
+                <p:spPr>
+                  <a:xfrm>
+                    <a:off x="2062112" y="5404795"/>
+                    <a:ext cx="694258" cy="400110"/>
+                  </a:xfrm>
+                  <a:prstGeom prst="rect">
+                    <a:avLst/>
+                  </a:prstGeom>
+                  <a:noFill/>
+                </p:spPr>
+                <p:txBody>
+                  <a:bodyPr wrap="square" rtlCol="0">
+                    <a:spAutoFit/>
+                  </a:bodyPr>
+                  <a:lstStyle/>
+                  <a:p>
+                    <a:pPr/>
+                    <a14:m>
+                      <m:oMathPara xmlns:m="http://schemas.openxmlformats.org/officeDocument/2006/math">
+                        <m:oMathParaPr>
+                          <m:jc m:val="centerGroup"/>
+                        </m:oMathParaPr>
+                        <m:oMath xmlns:m="http://schemas.openxmlformats.org/officeDocument/2006/math">
+                          <m:r>
+                            <a:rPr lang="en-GB" sz="2000" b="1" i="1" smtClean="0">
+                              <a:solidFill>
+                                <a:schemeClr val="accent4"/>
+                              </a:solidFill>
+                              <a:latin typeface="Cambria Math" panose="02040503050406030204" pitchFamily="18" charset="0"/>
+                              <a:cs typeface="Times New Roman" panose="02020603050405020304" pitchFamily="18" charset="0"/>
+                            </a:rPr>
+                            <m:t>𝒑</m:t>
+                          </m:r>
+                        </m:oMath>
+                      </m:oMathPara>
+                    </a14:m>
+                    <a:endParaRPr lang="en-GB" sz="2000" b="1" dirty="0">
+                      <a:solidFill>
+                        <a:schemeClr val="accent4"/>
+                      </a:solidFill>
+                      <a:latin typeface="Times New Roman" panose="02020603050405020304" pitchFamily="18" charset="0"/>
+                      <a:cs typeface="Times New Roman" panose="02020603050405020304" pitchFamily="18" charset="0"/>
+                    </a:endParaRPr>
+                  </a:p>
+                </p:txBody>
+              </p:sp>
+            </mc:Choice>
+            <mc:Fallback xmlns="">
+              <p:sp>
+                <p:nvSpPr>
+                  <p:cNvPr id="10" name="TextBox 9">
+                    <a:extLst>
+                      <a:ext uri="{FF2B5EF4-FFF2-40B4-BE49-F238E27FC236}">
+                        <a16:creationId xmlns:a16="http://schemas.microsoft.com/office/drawing/2014/main" id="{45E3DCEC-29F2-4316-9A48-D2639EDCDDC7}"/>
+                      </a:ext>
+                    </a:extLst>
+                  </p:cNvPr>
+                  <p:cNvSpPr txBox="1">
+                    <a:spLocks noRot="1" noChangeAspect="1" noMove="1" noResize="1" noEditPoints="1" noAdjustHandles="1" noChangeArrowheads="1" noChangeShapeType="1" noTextEdit="1"/>
+                  </p:cNvSpPr>
+                  <p:nvPr/>
+                </p:nvSpPr>
+                <p:spPr>
+                  <a:xfrm>
+                    <a:off x="2062112" y="5404795"/>
+                    <a:ext cx="694258" cy="400110"/>
+                  </a:xfrm>
+                  <a:prstGeom prst="rect">
+                    <a:avLst/>
+                  </a:prstGeom>
+                  <a:blipFill>
+                    <a:blip r:embed="rId4"/>
+                    <a:stretch>
+                      <a:fillRect b="-9091"/>
+                    </a:stretch>
+                  </a:blipFill>
+                </p:spPr>
+                <p:txBody>
+                  <a:bodyPr/>
+                  <a:lstStyle/>
+                  <a:p>
+                    <a:r>
+                      <a:rPr lang="en-GB">
+                        <a:noFill/>
+                      </a:rPr>
+                      <a:t> </a:t>
+                    </a:r>
+                  </a:p>
+                </p:txBody>
+              </p:sp>
+            </mc:Fallback>
+          </mc:AlternateContent>
+          <mc:AlternateContent xmlns:mc="http://schemas.openxmlformats.org/markup-compatibility/2006" xmlns:a14="http://schemas.microsoft.com/office/drawing/2010/main">
+            <mc:Choice Requires="a14">
+              <p:sp>
+                <p:nvSpPr>
+                  <p:cNvPr id="12" name="TextBox 11">
+                    <a:extLst>
+                      <a:ext uri="{FF2B5EF4-FFF2-40B4-BE49-F238E27FC236}">
+                        <a16:creationId xmlns:a16="http://schemas.microsoft.com/office/drawing/2014/main" id="{044C33F9-E5C5-4FA1-A514-8729C4BA45B5}"/>
+                      </a:ext>
+                    </a:extLst>
+                  </p:cNvPr>
+                  <p:cNvSpPr txBox="1"/>
+                  <p:nvPr/>
+                </p:nvSpPr>
+                <p:spPr>
+                  <a:xfrm>
+                    <a:off x="3569891" y="5250465"/>
+                    <a:ext cx="694258" cy="400110"/>
+                  </a:xfrm>
+                  <a:prstGeom prst="rect">
+                    <a:avLst/>
+                  </a:prstGeom>
+                  <a:noFill/>
+                </p:spPr>
+                <p:txBody>
+                  <a:bodyPr wrap="square" rtlCol="0">
+                    <a:spAutoFit/>
+                  </a:bodyPr>
+                  <a:lstStyle/>
+                  <a:p>
+                    <a:pPr/>
+                    <a14:m>
+                      <m:oMathPara xmlns:m="http://schemas.openxmlformats.org/officeDocument/2006/math">
+                        <m:oMathParaPr>
+                          <m:jc m:val="centerGroup"/>
+                        </m:oMathParaPr>
+                        <m:oMath xmlns:m="http://schemas.openxmlformats.org/officeDocument/2006/math">
+                          <m:r>
+                            <a:rPr lang="en-GB" sz="2000" b="1" i="1" smtClean="0">
+                              <a:solidFill>
+                                <a:schemeClr val="accent6"/>
+                              </a:solidFill>
+                              <a:latin typeface="Cambria Math" panose="02040503050406030204" pitchFamily="18" charset="0"/>
+                              <a:cs typeface="Times New Roman" panose="02020603050405020304" pitchFamily="18" charset="0"/>
+                            </a:rPr>
+                            <m:t>𝒙</m:t>
+                          </m:r>
+                        </m:oMath>
+                      </m:oMathPara>
+                    </a14:m>
+                    <a:endParaRPr lang="en-GB" sz="2000" b="1" dirty="0">
+                      <a:solidFill>
+                        <a:schemeClr val="accent6"/>
+                      </a:solidFill>
+                      <a:latin typeface="Times New Roman" panose="02020603050405020304" pitchFamily="18" charset="0"/>
+                      <a:cs typeface="Times New Roman" panose="02020603050405020304" pitchFamily="18" charset="0"/>
+                    </a:endParaRPr>
+                  </a:p>
+                </p:txBody>
+              </p:sp>
+            </mc:Choice>
+            <mc:Fallback xmlns="">
+              <p:sp>
+                <p:nvSpPr>
+                  <p:cNvPr id="12" name="TextBox 11">
+                    <a:extLst>
+                      <a:ext uri="{FF2B5EF4-FFF2-40B4-BE49-F238E27FC236}">
+                        <a16:creationId xmlns:a16="http://schemas.microsoft.com/office/drawing/2014/main" id="{044C33F9-E5C5-4FA1-A514-8729C4BA45B5}"/>
+                      </a:ext>
+                    </a:extLst>
+                  </p:cNvPr>
+                  <p:cNvSpPr txBox="1">
+                    <a:spLocks noRot="1" noChangeAspect="1" noMove="1" noResize="1" noEditPoints="1" noAdjustHandles="1" noChangeArrowheads="1" noChangeShapeType="1" noTextEdit="1"/>
+                  </p:cNvSpPr>
+                  <p:nvPr/>
+                </p:nvSpPr>
+                <p:spPr>
+                  <a:xfrm>
+                    <a:off x="3569891" y="5250465"/>
+                    <a:ext cx="694258" cy="400110"/>
+                  </a:xfrm>
+                  <a:prstGeom prst="rect">
+                    <a:avLst/>
+                  </a:prstGeom>
+                  <a:blipFill>
+                    <a:blip r:embed="rId5"/>
+                    <a:stretch>
+                      <a:fillRect/>
+                    </a:stretch>
+                  </a:blipFill>
+                </p:spPr>
+                <p:txBody>
+                  <a:bodyPr/>
+                  <a:lstStyle/>
+                  <a:p>
+                    <a:r>
+                      <a:rPr lang="en-GB">
+                        <a:noFill/>
+                      </a:rPr>
+                      <a:t> </a:t>
+                    </a:r>
+                  </a:p>
+                </p:txBody>
+              </p:sp>
+            </mc:Fallback>
+          </mc:AlternateContent>
+          <p:sp>
+            <p:nvSpPr>
+              <p:cNvPr id="13" name="Oval 12">
+                <a:extLst>
+                  <a:ext uri="{FF2B5EF4-FFF2-40B4-BE49-F238E27FC236}">
+                    <a16:creationId xmlns:a16="http://schemas.microsoft.com/office/drawing/2014/main" id="{88DAE091-2EAD-4AA1-86E6-5C34C8BEFEB1}"/>
+                  </a:ext>
+                </a:extLst>
+              </p:cNvPr>
+              <p:cNvSpPr/>
+              <p:nvPr/>
+            </p:nvSpPr>
+            <p:spPr>
+              <a:xfrm>
+                <a:off x="3882559" y="5611244"/>
+                <a:ext cx="45719" cy="45719"/>
+              </a:xfrm>
+              <a:prstGeom prst="ellipse">
+                <a:avLst/>
+              </a:prstGeom>
+              <a:solidFill>
+                <a:schemeClr val="accent6"/>
+              </a:solidFill>
+              <a:ln>
+                <a:solidFill>
+                  <a:schemeClr val="accent6"/>
+                </a:solidFill>
+              </a:ln>
+            </p:spPr>
+            <p:style>
+              <a:lnRef idx="2">
+                <a:schemeClr val="accent1">
+                  <a:shade val="50000"/>
+                </a:schemeClr>
+              </a:lnRef>
+              <a:fillRef idx="1">
+                <a:schemeClr val="accent1"/>
+              </a:fillRef>
+              <a:effectRef idx="0">
+                <a:schemeClr val="accent1"/>
+              </a:effectRef>
+              <a:fontRef idx="minor">
+                <a:schemeClr val="lt1"/>
+              </a:fontRef>
+            </p:style>
+            <p:txBody>
+              <a:bodyPr rtlCol="0" anchor="ctr"/>
+              <a:lstStyle/>
+              <a:p>
+                <a:pPr algn="ctr"/>
+                <a:endParaRPr lang="en-GB"/>
+              </a:p>
+            </p:txBody>
+          </p:sp>
+          <p:cxnSp>
+            <p:nvCxnSpPr>
+              <p:cNvPr id="4" name="Straight Arrow Connector 3">
+                <a:extLst>
+                  <a:ext uri="{FF2B5EF4-FFF2-40B4-BE49-F238E27FC236}">
+                    <a16:creationId xmlns:a16="http://schemas.microsoft.com/office/drawing/2014/main" id="{34FC0E3A-7ECE-4EF0-BC8A-46BAA3813D58}"/>
+                  </a:ext>
+                </a:extLst>
+              </p:cNvPr>
+              <p:cNvCxnSpPr>
+                <a:cxnSpLocks/>
+              </p:cNvCxnSpPr>
+              <p:nvPr/>
+            </p:nvCxnSpPr>
+            <p:spPr>
+              <a:xfrm>
+                <a:off x="2606464" y="5480380"/>
+                <a:ext cx="1706116" cy="583707"/>
+              </a:xfrm>
+              <a:prstGeom prst="straightConnector1">
+                <a:avLst/>
+              </a:prstGeom>
+              <a:ln>
+                <a:solidFill>
+                  <a:schemeClr val="accent2"/>
+                </a:solidFill>
+                <a:tailEnd type="triangle"/>
+              </a:ln>
+            </p:spPr>
+            <p:style>
+              <a:lnRef idx="1">
+                <a:schemeClr val="accent1"/>
+              </a:lnRef>
+              <a:fillRef idx="0">
+                <a:schemeClr val="accent1"/>
+              </a:fillRef>
+              <a:effectRef idx="0">
+                <a:schemeClr val="accent1"/>
+              </a:effectRef>
+              <a:fontRef idx="minor">
+                <a:schemeClr val="tx1"/>
+              </a:fontRef>
+            </p:style>
+          </p:cxnSp>
+          <p:cxnSp>
+            <p:nvCxnSpPr>
+              <p:cNvPr id="18" name="Straight Arrow Connector 17">
+                <a:extLst>
+                  <a:ext uri="{FF2B5EF4-FFF2-40B4-BE49-F238E27FC236}">
+                    <a16:creationId xmlns:a16="http://schemas.microsoft.com/office/drawing/2014/main" id="{C25BD068-3D0C-4247-8EEE-5F4418F3F242}"/>
+                  </a:ext>
+                </a:extLst>
+              </p:cNvPr>
+              <p:cNvCxnSpPr>
+                <a:cxnSpLocks/>
+              </p:cNvCxnSpPr>
+              <p:nvPr/>
+            </p:nvCxnSpPr>
+            <p:spPr>
+              <a:xfrm flipV="1">
+                <a:off x="2606464" y="4876980"/>
+                <a:ext cx="1366595" cy="580541"/>
+              </a:xfrm>
+              <a:prstGeom prst="straightConnector1">
+                <a:avLst/>
+              </a:prstGeom>
+              <a:ln>
+                <a:solidFill>
+                  <a:srgbClr val="7030A0"/>
+                </a:solidFill>
+                <a:tailEnd type="triangle"/>
+              </a:ln>
+            </p:spPr>
+            <p:style>
+              <a:lnRef idx="1">
+                <a:schemeClr val="accent1"/>
+              </a:lnRef>
+              <a:fillRef idx="0">
+                <a:schemeClr val="accent1"/>
+              </a:fillRef>
+              <a:effectRef idx="0">
+                <a:schemeClr val="accent1"/>
+              </a:effectRef>
+              <a:fontRef idx="minor">
+                <a:schemeClr val="tx1"/>
+              </a:fontRef>
+            </p:style>
+          </p:cxnSp>
+          <mc:AlternateContent xmlns:mc="http://schemas.openxmlformats.org/markup-compatibility/2006" xmlns:a14="http://schemas.microsoft.com/office/drawing/2010/main">
+            <mc:Choice Requires="a14">
+              <p:sp>
+                <p:nvSpPr>
+                  <p:cNvPr id="22" name="TextBox 21">
+                    <a:extLst>
+                      <a:ext uri="{FF2B5EF4-FFF2-40B4-BE49-F238E27FC236}">
+                        <a16:creationId xmlns:a16="http://schemas.microsoft.com/office/drawing/2014/main" id="{26D3E8E9-555B-4442-920F-FB024B40DC6A}"/>
+                      </a:ext>
+                    </a:extLst>
+                  </p:cNvPr>
+                  <p:cNvSpPr txBox="1"/>
+                  <p:nvPr/>
+                </p:nvSpPr>
+                <p:spPr>
+                  <a:xfrm>
+                    <a:off x="3535430" y="4450245"/>
+                    <a:ext cx="694258" cy="400110"/>
+                  </a:xfrm>
+                  <a:prstGeom prst="rect">
+                    <a:avLst/>
+                  </a:prstGeom>
+                  <a:noFill/>
+                </p:spPr>
+                <p:txBody>
+                  <a:bodyPr wrap="square" rtlCol="0">
+                    <a:spAutoFit/>
+                  </a:bodyPr>
+                  <a:lstStyle/>
+                  <a:p>
+                    <a:pPr/>
+                    <a14:m>
+                      <m:oMathPara xmlns:m="http://schemas.openxmlformats.org/officeDocument/2006/math">
+                        <m:oMathParaPr>
+                          <m:jc m:val="centerGroup"/>
+                        </m:oMathParaPr>
+                        <m:oMath xmlns:m="http://schemas.openxmlformats.org/officeDocument/2006/math">
+                          <m:sSub>
+                            <m:sSubPr>
+                              <m:ctrlPr>
+                                <a:rPr lang="en-GB" sz="2000" b="1" i="1" smtClean="0">
+                                  <a:solidFill>
+                                    <a:srgbClr val="7030A0"/>
+                                  </a:solidFill>
+                                  <a:latin typeface="Cambria Math" panose="02040503050406030204" pitchFamily="18" charset="0"/>
+                                  <a:cs typeface="Times New Roman" panose="02020603050405020304" pitchFamily="18" charset="0"/>
+                                </a:rPr>
+                              </m:ctrlPr>
+                            </m:sSubPr>
+                            <m:e>
+                              <m:r>
+                                <a:rPr lang="en-GB" sz="2000" b="1" i="1" smtClean="0">
+                                  <a:solidFill>
+                                    <a:srgbClr val="7030A0"/>
+                                  </a:solidFill>
+                                  <a:latin typeface="Cambria Math" panose="02040503050406030204" pitchFamily="18" charset="0"/>
+                                  <a:cs typeface="Times New Roman" panose="02020603050405020304" pitchFamily="18" charset="0"/>
+                                </a:rPr>
+                                <m:t>𝒗</m:t>
+                              </m:r>
+                            </m:e>
+                            <m:sub>
+                              <m:r>
+                                <a:rPr lang="en-GB" sz="2000" b="1" i="1" smtClean="0">
+                                  <a:solidFill>
+                                    <a:srgbClr val="7030A0"/>
+                                  </a:solidFill>
+                                  <a:latin typeface="Cambria Math" panose="02040503050406030204" pitchFamily="18" charset="0"/>
+                                  <a:cs typeface="Times New Roman" panose="02020603050405020304" pitchFamily="18" charset="0"/>
+                                </a:rPr>
+                                <m:t>𝟐</m:t>
+                              </m:r>
+                            </m:sub>
+                          </m:sSub>
+                        </m:oMath>
+                      </m:oMathPara>
+                    </a14:m>
+                    <a:endParaRPr lang="en-GB" sz="2000" b="1" dirty="0">
+                      <a:solidFill>
+                        <a:srgbClr val="7030A0"/>
+                      </a:solidFill>
+                      <a:latin typeface="Times New Roman" panose="02020603050405020304" pitchFamily="18" charset="0"/>
+                      <a:cs typeface="Times New Roman" panose="02020603050405020304" pitchFamily="18" charset="0"/>
+                    </a:endParaRPr>
+                  </a:p>
+                </p:txBody>
+              </p:sp>
+            </mc:Choice>
+            <mc:Fallback xmlns="">
+              <p:sp>
+                <p:nvSpPr>
+                  <p:cNvPr id="22" name="TextBox 21">
+                    <a:extLst>
+                      <a:ext uri="{FF2B5EF4-FFF2-40B4-BE49-F238E27FC236}">
+                        <a16:creationId xmlns:a16="http://schemas.microsoft.com/office/drawing/2014/main" id="{26D3E8E9-555B-4442-920F-FB024B40DC6A}"/>
+                      </a:ext>
+                    </a:extLst>
+                  </p:cNvPr>
+                  <p:cNvSpPr txBox="1">
+                    <a:spLocks noRot="1" noChangeAspect="1" noMove="1" noResize="1" noEditPoints="1" noAdjustHandles="1" noChangeArrowheads="1" noChangeShapeType="1" noTextEdit="1"/>
+                  </p:cNvSpPr>
+                  <p:nvPr/>
+                </p:nvSpPr>
+                <p:spPr>
+                  <a:xfrm>
+                    <a:off x="3535430" y="4450245"/>
+                    <a:ext cx="694258" cy="400110"/>
+                  </a:xfrm>
+                  <a:prstGeom prst="rect">
+                    <a:avLst/>
+                  </a:prstGeom>
+                  <a:blipFill>
+                    <a:blip r:embed="rId6"/>
+                    <a:stretch>
+                      <a:fillRect b="-3077"/>
+                    </a:stretch>
+                  </a:blipFill>
+                </p:spPr>
+                <p:txBody>
+                  <a:bodyPr/>
+                  <a:lstStyle/>
+                  <a:p>
+                    <a:r>
+                      <a:rPr lang="en-GB">
+                        <a:noFill/>
+                      </a:rPr>
+                      <a:t> </a:t>
+                    </a:r>
+                  </a:p>
+                </p:txBody>
+              </p:sp>
+            </mc:Fallback>
+          </mc:AlternateContent>
+        </p:grpSp>
       </p:grpSp>
-      <p:cxnSp>
-        <p:nvCxnSpPr>
-          <p:cNvPr id="37" name="Straight Arrow Connector 36">
+      <p:grpSp>
+        <p:nvGrpSpPr>
+          <p:cNvPr id="7" name="Group 6">
             <a:extLst>
               <a:ext uri="{FF2B5EF4-FFF2-40B4-BE49-F238E27FC236}">
-                <a16:creationId xmlns:a16="http://schemas.microsoft.com/office/drawing/2014/main" id="{0A2CDEDD-1C4E-4F14-A316-D460E585C32F}"/>
+                <a16:creationId xmlns:a16="http://schemas.microsoft.com/office/drawing/2014/main" id="{275856A4-C0B6-4293-8A01-B705FBA6EE2B}"/>
               </a:ext>
             </a:extLst>
           </p:cNvPr>
-          <p:cNvCxnSpPr>
-            <a:cxnSpLocks/>
-          </p:cNvCxnSpPr>
+          <p:cNvGrpSpPr/>
           <p:nvPr/>
-        </p:nvCxnSpPr>
-        <p:spPr>
+        </p:nvGrpSpPr>
+        <p:grpSpPr>
           <a:xfrm>
-            <a:off x="2789871" y="5162288"/>
-            <a:ext cx="942167" cy="322382"/>
+            <a:off x="2789871" y="4963793"/>
+            <a:ext cx="1343356" cy="858296"/>
+            <a:chOff x="2789871" y="4963793"/>
+            <a:chExt cx="1343356" cy="858296"/>
           </a:xfrm>
-          <a:prstGeom prst="straightConnector1">
-            <a:avLst/>
-          </a:prstGeom>
-          <a:ln>
-            <a:solidFill>
-              <a:schemeClr val="bg1">
-                <a:lumMod val="50000"/>
-              </a:schemeClr>
-            </a:solidFill>
-            <a:prstDash val="dash"/>
-            <a:headEnd type="arrow" w="med" len="med"/>
-            <a:tailEnd type="arrow" w="med" len="med"/>
-          </a:ln>
-        </p:spPr>
-        <p:style>
-          <a:lnRef idx="1">
-            <a:schemeClr val="accent1"/>
-          </a:lnRef>
-          <a:fillRef idx="0">
-            <a:schemeClr val="accent1"/>
-          </a:fillRef>
-          <a:effectRef idx="0">
-            <a:schemeClr val="accent1"/>
-          </a:effectRef>
-          <a:fontRef idx="minor">
-            <a:schemeClr val="tx1"/>
-          </a:fontRef>
-        </p:style>
-      </p:cxnSp>
-      <p:cxnSp>
-        <p:nvCxnSpPr>
-          <p:cNvPr id="39" name="Straight Arrow Connector 38">
-            <a:extLst>
-              <a:ext uri="{FF2B5EF4-FFF2-40B4-BE49-F238E27FC236}">
-                <a16:creationId xmlns:a16="http://schemas.microsoft.com/office/drawing/2014/main" id="{780E6F0D-A49F-4CDA-8338-D4940DAD72AF}"/>
-              </a:ext>
-            </a:extLst>
-          </p:cNvPr>
-          <p:cNvCxnSpPr>
-            <a:cxnSpLocks/>
-            <a:endCxn id="13" idx="3"/>
-          </p:cNvCxnSpPr>
-          <p:nvPr/>
-        </p:nvCxnSpPr>
-        <p:spPr>
-          <a:xfrm flipV="1">
-            <a:off x="3358056" y="5484363"/>
-            <a:ext cx="346216" cy="158882"/>
-          </a:xfrm>
-          <a:prstGeom prst="straightConnector1">
-            <a:avLst/>
-          </a:prstGeom>
-          <a:ln>
-            <a:solidFill>
-              <a:schemeClr val="bg1">
-                <a:lumMod val="50000"/>
-              </a:schemeClr>
-            </a:solidFill>
-            <a:prstDash val="dash"/>
-            <a:headEnd type="arrow" w="med" len="med"/>
-            <a:tailEnd type="arrow" w="med" len="med"/>
-          </a:ln>
-        </p:spPr>
-        <p:style>
-          <a:lnRef idx="1">
-            <a:schemeClr val="accent1"/>
-          </a:lnRef>
-          <a:fillRef idx="0">
-            <a:schemeClr val="accent1"/>
-          </a:fillRef>
-          <a:effectRef idx="0">
-            <a:schemeClr val="accent1"/>
-          </a:effectRef>
-          <a:fontRef idx="minor">
-            <a:schemeClr val="tx1"/>
-          </a:fontRef>
-        </p:style>
-      </p:cxnSp>
+        </p:grpSpPr>
+        <p:cxnSp>
+          <p:nvCxnSpPr>
+            <p:cNvPr id="39" name="Straight Arrow Connector 38">
+              <a:extLst>
+                <a:ext uri="{FF2B5EF4-FFF2-40B4-BE49-F238E27FC236}">
+                  <a16:creationId xmlns:a16="http://schemas.microsoft.com/office/drawing/2014/main" id="{780E6F0D-A49F-4CDA-8338-D4940DAD72AF}"/>
+                </a:ext>
+              </a:extLst>
+            </p:cNvPr>
+            <p:cNvCxnSpPr>
+              <a:cxnSpLocks/>
+              <a:endCxn id="13" idx="3"/>
+            </p:cNvCxnSpPr>
+            <p:nvPr/>
+          </p:nvCxnSpPr>
+          <p:spPr>
+            <a:xfrm flipV="1">
+              <a:off x="3358056" y="5484363"/>
+              <a:ext cx="346216" cy="158882"/>
+            </a:xfrm>
+            <a:prstGeom prst="straightConnector1">
+              <a:avLst/>
+            </a:prstGeom>
+            <a:ln>
+              <a:solidFill>
+                <a:schemeClr val="bg1">
+                  <a:lumMod val="50000"/>
+                </a:schemeClr>
+              </a:solidFill>
+              <a:prstDash val="dash"/>
+              <a:headEnd type="arrow" w="med" len="med"/>
+              <a:tailEnd type="arrow" w="med" len="med"/>
+            </a:ln>
+          </p:spPr>
+          <p:style>
+            <a:lnRef idx="1">
+              <a:schemeClr val="accent1"/>
+            </a:lnRef>
+            <a:fillRef idx="0">
+              <a:schemeClr val="accent1"/>
+            </a:fillRef>
+            <a:effectRef idx="0">
+              <a:schemeClr val="accent1"/>
+            </a:effectRef>
+            <a:fontRef idx="minor">
+              <a:schemeClr val="tx1"/>
+            </a:fontRef>
+          </p:style>
+        </p:cxnSp>
+        <p:grpSp>
+          <p:nvGrpSpPr>
+            <p:cNvPr id="3" name="Group 2">
+              <a:extLst>
+                <a:ext uri="{FF2B5EF4-FFF2-40B4-BE49-F238E27FC236}">
+                  <a16:creationId xmlns:a16="http://schemas.microsoft.com/office/drawing/2014/main" id="{4E27208D-FEF3-4D83-BFBE-7823A05EE6A4}"/>
+                </a:ext>
+              </a:extLst>
+            </p:cNvPr>
+            <p:cNvGrpSpPr/>
+            <p:nvPr/>
+          </p:nvGrpSpPr>
+          <p:grpSpPr>
+            <a:xfrm>
+              <a:off x="2789871" y="4963793"/>
+              <a:ext cx="1343356" cy="858296"/>
+              <a:chOff x="2789871" y="4963793"/>
+              <a:chExt cx="1343356" cy="858296"/>
+            </a:xfrm>
+          </p:grpSpPr>
+          <p:cxnSp>
+            <p:nvCxnSpPr>
+              <p:cNvPr id="37" name="Straight Arrow Connector 36">
+                <a:extLst>
+                  <a:ext uri="{FF2B5EF4-FFF2-40B4-BE49-F238E27FC236}">
+                    <a16:creationId xmlns:a16="http://schemas.microsoft.com/office/drawing/2014/main" id="{0A2CDEDD-1C4E-4F14-A316-D460E585C32F}"/>
+                  </a:ext>
+                </a:extLst>
+              </p:cNvPr>
+              <p:cNvCxnSpPr>
+                <a:cxnSpLocks/>
+              </p:cNvCxnSpPr>
+              <p:nvPr/>
+            </p:nvCxnSpPr>
+            <p:spPr>
+              <a:xfrm>
+                <a:off x="2789871" y="5162288"/>
+                <a:ext cx="942167" cy="322382"/>
+              </a:xfrm>
+              <a:prstGeom prst="straightConnector1">
+                <a:avLst/>
+              </a:prstGeom>
+              <a:ln>
+                <a:solidFill>
+                  <a:schemeClr val="bg1">
+                    <a:lumMod val="50000"/>
+                  </a:schemeClr>
+                </a:solidFill>
+                <a:prstDash val="dash"/>
+                <a:headEnd type="arrow" w="med" len="med"/>
+                <a:tailEnd type="arrow" w="med" len="med"/>
+              </a:ln>
+            </p:spPr>
+            <p:style>
+              <a:lnRef idx="1">
+                <a:schemeClr val="accent1"/>
+              </a:lnRef>
+              <a:fillRef idx="0">
+                <a:schemeClr val="accent1"/>
+              </a:fillRef>
+              <a:effectRef idx="0">
+                <a:schemeClr val="accent1"/>
+              </a:effectRef>
+              <a:fontRef idx="minor">
+                <a:schemeClr val="tx1"/>
+              </a:fontRef>
+            </p:style>
+          </p:cxnSp>
+          <mc:AlternateContent xmlns:mc="http://schemas.openxmlformats.org/markup-compatibility/2006">
+            <mc:Choice xmlns:a14="http://schemas.microsoft.com/office/drawing/2010/main" Requires="a14">
+              <p:sp>
+                <p:nvSpPr>
+                  <p:cNvPr id="42" name="TextBox 41">
+                    <a:extLst>
+                      <a:ext uri="{FF2B5EF4-FFF2-40B4-BE49-F238E27FC236}">
+                        <a16:creationId xmlns:a16="http://schemas.microsoft.com/office/drawing/2014/main" id="{A7F6C982-9EC1-46A1-867E-ED0F4D20E2C8}"/>
+                      </a:ext>
+                    </a:extLst>
+                  </p:cNvPr>
+                  <p:cNvSpPr txBox="1"/>
+                  <p:nvPr/>
+                </p:nvSpPr>
+                <p:spPr>
+                  <a:xfrm>
+                    <a:off x="3438969" y="5421979"/>
+                    <a:ext cx="694258" cy="400110"/>
+                  </a:xfrm>
+                  <a:prstGeom prst="rect">
+                    <a:avLst/>
+                  </a:prstGeom>
+                  <a:noFill/>
+                </p:spPr>
+                <p:txBody>
+                  <a:bodyPr wrap="square" rtlCol="0">
+                    <a:spAutoFit/>
+                  </a:bodyPr>
+                  <a:lstStyle/>
+                  <a:p>
+                    <a:pPr/>
+                    <a14:m>
+                      <m:oMathPara xmlns:m="http://schemas.openxmlformats.org/officeDocument/2006/math">
+                        <m:oMathParaPr>
+                          <m:jc m:val="centerGroup"/>
+                        </m:oMathParaPr>
+                        <m:oMath xmlns:m="http://schemas.openxmlformats.org/officeDocument/2006/math">
+                          <m:r>
+                            <a:rPr lang="en-GB" sz="2000" b="0" i="1" smtClean="0">
+                              <a:solidFill>
+                                <a:schemeClr val="bg1">
+                                  <a:lumMod val="50000"/>
+                                </a:schemeClr>
+                              </a:solidFill>
+                              <a:latin typeface="Cambria Math" panose="02040503050406030204" pitchFamily="18" charset="0"/>
+                              <a:cs typeface="Times New Roman" panose="02020603050405020304" pitchFamily="18" charset="0"/>
+                            </a:rPr>
+                            <m:t>𝑡</m:t>
+                          </m:r>
+                        </m:oMath>
+                      </m:oMathPara>
+                    </a14:m>
+                    <a:endParaRPr lang="en-GB" sz="2000" dirty="0">
+                      <a:solidFill>
+                        <a:schemeClr val="bg1">
+                          <a:lumMod val="50000"/>
+                        </a:schemeClr>
+                      </a:solidFill>
+                      <a:latin typeface="Times New Roman" panose="02020603050405020304" pitchFamily="18" charset="0"/>
+                      <a:cs typeface="Times New Roman" panose="02020603050405020304" pitchFamily="18" charset="0"/>
+                    </a:endParaRPr>
+                  </a:p>
+                </p:txBody>
+              </p:sp>
+            </mc:Choice>
+            <mc:Fallback>
+              <p:sp>
+                <p:nvSpPr>
+                  <p:cNvPr id="42" name="TextBox 41">
+                    <a:extLst>
+                      <a:ext uri="{FF2B5EF4-FFF2-40B4-BE49-F238E27FC236}">
+                        <a16:creationId xmlns:a16="http://schemas.microsoft.com/office/drawing/2014/main" id="{A7F6C982-9EC1-46A1-867E-ED0F4D20E2C8}"/>
+                      </a:ext>
+                    </a:extLst>
+                  </p:cNvPr>
+                  <p:cNvSpPr txBox="1">
+                    <a:spLocks noRot="1" noChangeAspect="1" noMove="1" noResize="1" noEditPoints="1" noAdjustHandles="1" noChangeArrowheads="1" noChangeShapeType="1" noTextEdit="1"/>
+                  </p:cNvSpPr>
+                  <p:nvPr/>
+                </p:nvSpPr>
+                <p:spPr>
+                  <a:xfrm>
+                    <a:off x="3438969" y="5421979"/>
+                    <a:ext cx="694258" cy="400110"/>
+                  </a:xfrm>
+                  <a:prstGeom prst="rect">
+                    <a:avLst/>
+                  </a:prstGeom>
+                  <a:blipFill>
+                    <a:blip r:embed="rId7"/>
+                    <a:stretch>
+                      <a:fillRect/>
+                    </a:stretch>
+                  </a:blipFill>
+                </p:spPr>
+                <p:txBody>
+                  <a:bodyPr/>
+                  <a:lstStyle/>
+                  <a:p>
+                    <a:r>
+                      <a:rPr lang="en-GB">
+                        <a:noFill/>
+                      </a:rPr>
+                      <a:t> </a:t>
+                    </a:r>
+                  </a:p>
+                </p:txBody>
+              </p:sp>
+            </mc:Fallback>
+          </mc:AlternateContent>
+          <mc:AlternateContent xmlns:mc="http://schemas.openxmlformats.org/markup-compatibility/2006">
+            <mc:Choice xmlns:a14="http://schemas.microsoft.com/office/drawing/2010/main" Requires="a14">
+              <p:sp>
+                <p:nvSpPr>
+                  <p:cNvPr id="43" name="TextBox 42">
+                    <a:extLst>
+                      <a:ext uri="{FF2B5EF4-FFF2-40B4-BE49-F238E27FC236}">
+                        <a16:creationId xmlns:a16="http://schemas.microsoft.com/office/drawing/2014/main" id="{8696B85C-DFE3-4602-8E40-59D749C7EC1D}"/>
+                      </a:ext>
+                    </a:extLst>
+                  </p:cNvPr>
+                  <p:cNvSpPr txBox="1"/>
+                  <p:nvPr/>
+                </p:nvSpPr>
+                <p:spPr>
+                  <a:xfrm>
+                    <a:off x="3032151" y="4963793"/>
+                    <a:ext cx="694258" cy="400110"/>
+                  </a:xfrm>
+                  <a:prstGeom prst="rect">
+                    <a:avLst/>
+                  </a:prstGeom>
+                  <a:noFill/>
+                </p:spPr>
+                <p:txBody>
+                  <a:bodyPr wrap="square" rtlCol="0">
+                    <a:spAutoFit/>
+                  </a:bodyPr>
+                  <a:lstStyle/>
+                  <a:p>
+                    <a:pPr/>
+                    <a14:m>
+                      <m:oMathPara xmlns:m="http://schemas.openxmlformats.org/officeDocument/2006/math">
+                        <m:oMathParaPr>
+                          <m:jc m:val="centerGroup"/>
+                        </m:oMathParaPr>
+                        <m:oMath xmlns:m="http://schemas.openxmlformats.org/officeDocument/2006/math">
+                          <m:r>
+                            <a:rPr lang="en-GB" sz="2000" b="0" i="1" smtClean="0">
+                              <a:solidFill>
+                                <a:schemeClr val="bg1">
+                                  <a:lumMod val="50000"/>
+                                </a:schemeClr>
+                              </a:solidFill>
+                              <a:latin typeface="Cambria Math" panose="02040503050406030204" pitchFamily="18" charset="0"/>
+                              <a:cs typeface="Times New Roman" panose="02020603050405020304" pitchFamily="18" charset="0"/>
+                            </a:rPr>
+                            <m:t>𝑠</m:t>
+                          </m:r>
+                        </m:oMath>
+                      </m:oMathPara>
+                    </a14:m>
+                    <a:endParaRPr lang="en-GB" sz="2000" dirty="0">
+                      <a:solidFill>
+                        <a:schemeClr val="bg1">
+                          <a:lumMod val="50000"/>
+                        </a:schemeClr>
+                      </a:solidFill>
+                      <a:latin typeface="Times New Roman" panose="02020603050405020304" pitchFamily="18" charset="0"/>
+                      <a:cs typeface="Times New Roman" panose="02020603050405020304" pitchFamily="18" charset="0"/>
+                    </a:endParaRPr>
+                  </a:p>
+                </p:txBody>
+              </p:sp>
+            </mc:Choice>
+            <mc:Fallback>
+              <p:sp>
+                <p:nvSpPr>
+                  <p:cNvPr id="43" name="TextBox 42">
+                    <a:extLst>
+                      <a:ext uri="{FF2B5EF4-FFF2-40B4-BE49-F238E27FC236}">
+                        <a16:creationId xmlns:a16="http://schemas.microsoft.com/office/drawing/2014/main" id="{8696B85C-DFE3-4602-8E40-59D749C7EC1D}"/>
+                      </a:ext>
+                    </a:extLst>
+                  </p:cNvPr>
+                  <p:cNvSpPr txBox="1">
+                    <a:spLocks noRot="1" noChangeAspect="1" noMove="1" noResize="1" noEditPoints="1" noAdjustHandles="1" noChangeArrowheads="1" noChangeShapeType="1" noTextEdit="1"/>
+                  </p:cNvSpPr>
+                  <p:nvPr/>
+                </p:nvSpPr>
+                <p:spPr>
+                  <a:xfrm>
+                    <a:off x="3032151" y="4963793"/>
+                    <a:ext cx="694258" cy="400110"/>
+                  </a:xfrm>
+                  <a:prstGeom prst="rect">
+                    <a:avLst/>
+                  </a:prstGeom>
+                  <a:blipFill>
+                    <a:blip r:embed="rId8"/>
+                    <a:stretch>
+                      <a:fillRect/>
+                    </a:stretch>
+                  </a:blipFill>
+                </p:spPr>
+                <p:txBody>
+                  <a:bodyPr/>
+                  <a:lstStyle/>
+                  <a:p>
+                    <a:r>
+                      <a:rPr lang="en-GB">
+                        <a:noFill/>
+                      </a:rPr>
+                      <a:t> </a:t>
+                    </a:r>
+                  </a:p>
+                </p:txBody>
+              </p:sp>
+            </mc:Fallback>
+          </mc:AlternateContent>
+        </p:grpSp>
+      </p:grpSp>
       <mc:AlternateContent xmlns:mc="http://schemas.openxmlformats.org/markup-compatibility/2006">
         <mc:Choice xmlns:a14="http://schemas.microsoft.com/office/drawing/2010/main" Requires="a14">
           <p:sp>
             <p:nvSpPr>
-              <p:cNvPr id="42" name="TextBox 41">
+              <p:cNvPr id="23" name="Content Placeholder 2">
                 <a:extLst>
                   <a:ext uri="{FF2B5EF4-FFF2-40B4-BE49-F238E27FC236}">
-                    <a16:creationId xmlns:a16="http://schemas.microsoft.com/office/drawing/2014/main" id="{A7F6C982-9EC1-46A1-867E-ED0F4D20E2C8}"/>
+                    <a16:creationId xmlns:a16="http://schemas.microsoft.com/office/drawing/2014/main" id="{C081B814-94AA-4CAC-8512-61AAE6CBB083}"/>
                   </a:ext>
                 </a:extLst>
               </p:cNvPr>
-              <p:cNvSpPr txBox="1"/>
+              <p:cNvSpPr txBox="1">
+                <a:spLocks/>
+              </p:cNvSpPr>
               <p:nvPr/>
             </p:nvSpPr>
             <p:spPr>
               <a:xfrm>
-                <a:off x="3438969" y="5421979"/>
-                <a:ext cx="694258" cy="400110"/>
+                <a:off x="957288" y="3132679"/>
+                <a:ext cx="10277423" cy="3215749"/>
               </a:xfrm>
               <a:prstGeom prst="rect">
                 <a:avLst/>
               </a:prstGeom>
-              <a:noFill/>
             </p:spPr>
             <p:txBody>
-              <a:bodyPr wrap="square" rtlCol="0">
-                <a:spAutoFit/>
+              <a:bodyPr vert="horz" lIns="91440" tIns="45720" rIns="91440" bIns="45720" rtlCol="0">
+                <a:normAutofit/>
               </a:bodyPr>
-              <a:lstStyle/>
+              <a:lstStyle>
+                <a:lvl1pPr marL="228600" indent="-228600" algn="l" defTabSz="914400" rtl="0" eaLnBrk="1" latinLnBrk="0" hangingPunct="1">
+                  <a:lnSpc>
+                    <a:spcPct val="90000"/>
+                  </a:lnSpc>
+                  <a:spcBef>
+                    <a:spcPts val="1000"/>
+                  </a:spcBef>
+                  <a:buFont typeface="Arial" panose="020B0604020202020204" pitchFamily="34" charset="0"/>
+                  <a:buChar char="•"/>
+                  <a:defRPr sz="2800" kern="1200">
+                    <a:solidFill>
+                      <a:schemeClr val="tx1"/>
+                    </a:solidFill>
+                    <a:latin typeface="+mn-lt"/>
+                    <a:ea typeface="+mn-ea"/>
+                    <a:cs typeface="+mn-cs"/>
+                  </a:defRPr>
+                </a:lvl1pPr>
+                <a:lvl2pPr marL="685800" indent="-228600" algn="l" defTabSz="914400" rtl="0" eaLnBrk="1" latinLnBrk="0" hangingPunct="1">
+                  <a:lnSpc>
+                    <a:spcPct val="90000"/>
+                  </a:lnSpc>
+                  <a:spcBef>
+                    <a:spcPts val="500"/>
+                  </a:spcBef>
+                  <a:buFont typeface="Arial" panose="020B0604020202020204" pitchFamily="34" charset="0"/>
+                  <a:buChar char="•"/>
+                  <a:defRPr sz="2400" kern="1200">
+                    <a:solidFill>
+                      <a:schemeClr val="tx1"/>
+                    </a:solidFill>
+                    <a:latin typeface="+mn-lt"/>
+                    <a:ea typeface="+mn-ea"/>
+                    <a:cs typeface="+mn-cs"/>
+                  </a:defRPr>
+                </a:lvl2pPr>
+                <a:lvl3pPr marL="1143000" indent="-228600" algn="l" defTabSz="914400" rtl="0" eaLnBrk="1" latinLnBrk="0" hangingPunct="1">
+                  <a:lnSpc>
+                    <a:spcPct val="90000"/>
+                  </a:lnSpc>
+                  <a:spcBef>
+                    <a:spcPts val="500"/>
+                  </a:spcBef>
+                  <a:buFont typeface="Arial" panose="020B0604020202020204" pitchFamily="34" charset="0"/>
+                  <a:buChar char="•"/>
+                  <a:defRPr sz="2000" kern="1200">
+                    <a:solidFill>
+                      <a:schemeClr val="tx1"/>
+                    </a:solidFill>
+                    <a:latin typeface="+mn-lt"/>
+                    <a:ea typeface="+mn-ea"/>
+                    <a:cs typeface="+mn-cs"/>
+                  </a:defRPr>
+                </a:lvl3pPr>
+                <a:lvl4pPr marL="1600200" indent="-228600" algn="l" defTabSz="914400" rtl="0" eaLnBrk="1" latinLnBrk="0" hangingPunct="1">
+                  <a:lnSpc>
+                    <a:spcPct val="90000"/>
+                  </a:lnSpc>
+                  <a:spcBef>
+                    <a:spcPts val="500"/>
+                  </a:spcBef>
+                  <a:buFont typeface="Arial" panose="020B0604020202020204" pitchFamily="34" charset="0"/>
+                  <a:buChar char="•"/>
+                  <a:defRPr sz="1800" kern="1200">
+                    <a:solidFill>
+                      <a:schemeClr val="tx1"/>
+                    </a:solidFill>
+                    <a:latin typeface="+mn-lt"/>
+                    <a:ea typeface="+mn-ea"/>
+                    <a:cs typeface="+mn-cs"/>
+                  </a:defRPr>
+                </a:lvl4pPr>
+                <a:lvl5pPr marL="2057400" indent="-228600" algn="l" defTabSz="914400" rtl="0" eaLnBrk="1" latinLnBrk="0" hangingPunct="1">
+                  <a:lnSpc>
+                    <a:spcPct val="90000"/>
+                  </a:lnSpc>
+                  <a:spcBef>
+                    <a:spcPts val="500"/>
+                  </a:spcBef>
+                  <a:buFont typeface="Arial" panose="020B0604020202020204" pitchFamily="34" charset="0"/>
+                  <a:buChar char="•"/>
+                  <a:defRPr sz="1800" kern="1200">
+                    <a:solidFill>
+                      <a:schemeClr val="tx1"/>
+                    </a:solidFill>
+                    <a:latin typeface="+mn-lt"/>
+                    <a:ea typeface="+mn-ea"/>
+                    <a:cs typeface="+mn-cs"/>
+                  </a:defRPr>
+                </a:lvl5pPr>
+                <a:lvl6pPr marL="2514600" indent="-228600" algn="l" defTabSz="914400" rtl="0" eaLnBrk="1" latinLnBrk="0" hangingPunct="1">
+                  <a:lnSpc>
+                    <a:spcPct val="90000"/>
+                  </a:lnSpc>
+                  <a:spcBef>
+                    <a:spcPts val="500"/>
+                  </a:spcBef>
+                  <a:buFont typeface="Arial" panose="020B0604020202020204" pitchFamily="34" charset="0"/>
+                  <a:buChar char="•"/>
+                  <a:defRPr sz="1800" kern="1200">
+                    <a:solidFill>
+                      <a:schemeClr val="tx1"/>
+                    </a:solidFill>
+                    <a:latin typeface="+mn-lt"/>
+                    <a:ea typeface="+mn-ea"/>
+                    <a:cs typeface="+mn-cs"/>
+                  </a:defRPr>
+                </a:lvl6pPr>
+                <a:lvl7pPr marL="2971800" indent="-228600" algn="l" defTabSz="914400" rtl="0" eaLnBrk="1" latinLnBrk="0" hangingPunct="1">
+                  <a:lnSpc>
+                    <a:spcPct val="90000"/>
+                  </a:lnSpc>
+                  <a:spcBef>
+                    <a:spcPts val="500"/>
+                  </a:spcBef>
+                  <a:buFont typeface="Arial" panose="020B0604020202020204" pitchFamily="34" charset="0"/>
+                  <a:buChar char="•"/>
+                  <a:defRPr sz="1800" kern="1200">
+                    <a:solidFill>
+                      <a:schemeClr val="tx1"/>
+                    </a:solidFill>
+                    <a:latin typeface="+mn-lt"/>
+                    <a:ea typeface="+mn-ea"/>
+                    <a:cs typeface="+mn-cs"/>
+                  </a:defRPr>
+                </a:lvl7pPr>
+                <a:lvl8pPr marL="3429000" indent="-228600" algn="l" defTabSz="914400" rtl="0" eaLnBrk="1" latinLnBrk="0" hangingPunct="1">
+                  <a:lnSpc>
+                    <a:spcPct val="90000"/>
+                  </a:lnSpc>
+                  <a:spcBef>
+                    <a:spcPts val="500"/>
+                  </a:spcBef>
+                  <a:buFont typeface="Arial" panose="020B0604020202020204" pitchFamily="34" charset="0"/>
+                  <a:buChar char="•"/>
+                  <a:defRPr sz="1800" kern="1200">
+                    <a:solidFill>
+                      <a:schemeClr val="tx1"/>
+                    </a:solidFill>
+                    <a:latin typeface="+mn-lt"/>
+                    <a:ea typeface="+mn-ea"/>
+                    <a:cs typeface="+mn-cs"/>
+                  </a:defRPr>
+                </a:lvl8pPr>
+                <a:lvl9pPr marL="3886200" indent="-228600" algn="l" defTabSz="914400" rtl="0" eaLnBrk="1" latinLnBrk="0" hangingPunct="1">
+                  <a:lnSpc>
+                    <a:spcPct val="90000"/>
+                  </a:lnSpc>
+                  <a:spcBef>
+                    <a:spcPts val="500"/>
+                  </a:spcBef>
+                  <a:buFont typeface="Arial" panose="020B0604020202020204" pitchFamily="34" charset="0"/>
+                  <a:buChar char="•"/>
+                  <a:defRPr sz="1800" kern="1200">
+                    <a:solidFill>
+                      <a:schemeClr val="tx1"/>
+                    </a:solidFill>
+                    <a:latin typeface="+mn-lt"/>
+                    <a:ea typeface="+mn-ea"/>
+                    <a:cs typeface="+mn-cs"/>
+                  </a:defRPr>
+                </a:lvl9pPr>
+              </a:lstStyle>
               <a:p>
+                <a:r>
+                  <a:rPr lang="en-GB" sz="2400" dirty="0"/>
+                  <a:t>Therefore, any point </a:t>
+                </a:r>
+                <a14:m>
+                  <m:oMath xmlns:m="http://schemas.openxmlformats.org/officeDocument/2006/math">
+                    <m:r>
+                      <a:rPr lang="en-GB" sz="2400" b="1" i="1" smtClean="0">
+                        <a:latin typeface="Cambria Math" panose="02040503050406030204" pitchFamily="18" charset="0"/>
+                      </a:rPr>
+                      <m:t>𝒙</m:t>
+                    </m:r>
+                  </m:oMath>
+                </a14:m>
+                <a:r>
+                  <a:rPr lang="en-GB" sz="2400" dirty="0"/>
+                  <a:t> lying on the plane can be expressed as a linear combination of the two vectors, starting from any point </a:t>
+                </a:r>
+                <a14:m>
+                  <m:oMath xmlns:m="http://schemas.openxmlformats.org/officeDocument/2006/math">
+                    <m:r>
+                      <a:rPr lang="en-GB" sz="2400" b="1" i="1" smtClean="0">
+                        <a:latin typeface="Cambria Math" panose="02040503050406030204" pitchFamily="18" charset="0"/>
+                      </a:rPr>
+                      <m:t>𝒑</m:t>
+                    </m:r>
+                  </m:oMath>
+                </a14:m>
+                <a:r>
+                  <a:rPr lang="en-GB" sz="2400" dirty="0"/>
+                  <a:t> on the plane:</a:t>
+                </a:r>
+              </a:p>
+              <a:p>
+                <a:pPr marL="0" indent="0">
+                  <a:buFont typeface="Arial" panose="020B0604020202020204" pitchFamily="34" charset="0"/>
+                  <a:buNone/>
+                </a:pPr>
+                <a:endParaRPr lang="en-GB" sz="2400" b="1" i="1" dirty="0">
+                  <a:latin typeface="Cambria Math" panose="02040503050406030204" pitchFamily="18" charset="0"/>
+                </a:endParaRPr>
+              </a:p>
+              <a:p>
+                <a:pPr marL="0" indent="0">
+                  <a:buFont typeface="Arial" panose="020B0604020202020204" pitchFamily="34" charset="0"/>
+                  <a:buNone/>
+                </a:pPr>
                 <a14:m>
                   <m:oMathPara xmlns:m="http://schemas.openxmlformats.org/officeDocument/2006/math">
                     <m:oMathParaPr>
@@ -9062,28 +9366,143 @@
                     </m:oMathParaPr>
                     <m:oMath xmlns:m="http://schemas.openxmlformats.org/officeDocument/2006/math">
                       <m:r>
-                        <a:rPr lang="en-GB" sz="2000" b="0" i="1" smtClean="0">
+                        <a:rPr lang="en-GB" sz="2400" b="1" i="1" smtClean="0">
                           <a:solidFill>
-                            <a:schemeClr val="bg1">
-                              <a:lumMod val="50000"/>
-                            </a:schemeClr>
+                            <a:schemeClr val="accent6"/>
                           </a:solidFill>
                           <a:latin typeface="Cambria Math" panose="02040503050406030204" pitchFamily="18" charset="0"/>
-                          <a:cs typeface="Times New Roman" panose="02020603050405020304" pitchFamily="18" charset="0"/>
+                        </a:rPr>
+                        <m:t>𝒙</m:t>
+                      </m:r>
+                      <m:r>
+                        <a:rPr lang="en-GB" sz="2400" i="1" smtClean="0">
+                          <a:solidFill>
+                            <a:schemeClr val="accent6"/>
+                          </a:solidFill>
+                          <a:latin typeface="Cambria Math" panose="02040503050406030204" pitchFamily="18" charset="0"/>
+                        </a:rPr>
+                        <m:t>=</m:t>
+                      </m:r>
+                      <m:r>
+                        <a:rPr lang="en-GB" sz="2400" b="1" i="1" smtClean="0">
+                          <a:solidFill>
+                            <a:schemeClr val="accent6"/>
+                          </a:solidFill>
+                          <a:latin typeface="Cambria Math" panose="02040503050406030204" pitchFamily="18" charset="0"/>
+                        </a:rPr>
+                        <m:t>𝒑</m:t>
+                      </m:r>
+                      <m:r>
+                        <a:rPr lang="en-GB" sz="2400" i="1" smtClean="0">
+                          <a:solidFill>
+                            <a:schemeClr val="accent6"/>
+                          </a:solidFill>
+                          <a:latin typeface="Cambria Math" panose="02040503050406030204" pitchFamily="18" charset="0"/>
+                        </a:rPr>
+                        <m:t>+</m:t>
+                      </m:r>
+                      <m:r>
+                        <a:rPr lang="en-GB" sz="2400" i="1" smtClean="0">
+                          <a:solidFill>
+                            <a:schemeClr val="accent6"/>
+                          </a:solidFill>
+                          <a:latin typeface="Cambria Math" panose="02040503050406030204" pitchFamily="18" charset="0"/>
+                        </a:rPr>
+                        <m:t>𝑠</m:t>
+                      </m:r>
+                      <m:sSub>
+                        <m:sSubPr>
+                          <m:ctrlPr>
+                            <a:rPr lang="en-GB" sz="2400" i="1" smtClean="0">
+                              <a:solidFill>
+                                <a:schemeClr val="accent6"/>
+                              </a:solidFill>
+                              <a:latin typeface="Cambria Math" panose="02040503050406030204" pitchFamily="18" charset="0"/>
+                            </a:rPr>
+                          </m:ctrlPr>
+                        </m:sSubPr>
+                        <m:e>
+                          <m:r>
+                            <a:rPr lang="en-GB" sz="2400" b="1" i="1" smtClean="0">
+                              <a:solidFill>
+                                <a:schemeClr val="accent6"/>
+                              </a:solidFill>
+                              <a:latin typeface="Cambria Math" panose="02040503050406030204" pitchFamily="18" charset="0"/>
+                            </a:rPr>
+                            <m:t>𝒗</m:t>
+                          </m:r>
+                        </m:e>
+                        <m:sub>
+                          <m:r>
+                            <a:rPr lang="en-GB" sz="2400" i="1" smtClean="0">
+                              <a:solidFill>
+                                <a:schemeClr val="accent6"/>
+                              </a:solidFill>
+                              <a:latin typeface="Cambria Math" panose="02040503050406030204" pitchFamily="18" charset="0"/>
+                            </a:rPr>
+                            <m:t>1</m:t>
+                          </m:r>
+                        </m:sub>
+                      </m:sSub>
+                      <m:r>
+                        <a:rPr lang="en-GB" sz="2400" i="1" smtClean="0">
+                          <a:solidFill>
+                            <a:schemeClr val="accent6"/>
+                          </a:solidFill>
+                          <a:latin typeface="Cambria Math" panose="02040503050406030204" pitchFamily="18" charset="0"/>
+                        </a:rPr>
+                        <m:t>+</m:t>
+                      </m:r>
+                      <m:r>
+                        <a:rPr lang="en-GB" sz="2400" i="1" smtClean="0">
+                          <a:solidFill>
+                            <a:schemeClr val="accent6"/>
+                          </a:solidFill>
+                          <a:latin typeface="Cambria Math" panose="02040503050406030204" pitchFamily="18" charset="0"/>
                         </a:rPr>
                         <m:t>𝑡</m:t>
                       </m:r>
+                      <m:sSub>
+                        <m:sSubPr>
+                          <m:ctrlPr>
+                            <a:rPr lang="en-GB" sz="2400" i="1" smtClean="0">
+                              <a:solidFill>
+                                <a:schemeClr val="accent6"/>
+                              </a:solidFill>
+                              <a:latin typeface="Cambria Math" panose="02040503050406030204" pitchFamily="18" charset="0"/>
+                            </a:rPr>
+                          </m:ctrlPr>
+                        </m:sSubPr>
+                        <m:e>
+                          <m:r>
+                            <a:rPr lang="en-GB" sz="2400" b="1" i="1" smtClean="0">
+                              <a:solidFill>
+                                <a:schemeClr val="accent6"/>
+                              </a:solidFill>
+                              <a:latin typeface="Cambria Math" panose="02040503050406030204" pitchFamily="18" charset="0"/>
+                            </a:rPr>
+                            <m:t>𝒗</m:t>
+                          </m:r>
+                        </m:e>
+                        <m:sub>
+                          <m:r>
+                            <a:rPr lang="en-GB" sz="2400" i="1" smtClean="0">
+                              <a:solidFill>
+                                <a:schemeClr val="accent6"/>
+                              </a:solidFill>
+                              <a:latin typeface="Cambria Math" panose="02040503050406030204" pitchFamily="18" charset="0"/>
+                            </a:rPr>
+                            <m:t>2</m:t>
+                          </m:r>
+                        </m:sub>
+                      </m:sSub>
                     </m:oMath>
                   </m:oMathPara>
                 </a14:m>
-                <a:endParaRPr lang="en-GB" sz="2000" dirty="0">
+                <a:endParaRPr lang="en-GB" sz="2400" b="1" dirty="0">
                   <a:solidFill>
-                    <a:schemeClr val="bg1">
-                      <a:lumMod val="50000"/>
-                    </a:schemeClr>
+                    <a:schemeClr val="accent6"/>
                   </a:solidFill>
-                  <a:latin typeface="Times New Roman" panose="02020603050405020304" pitchFamily="18" charset="0"/>
-                  <a:cs typeface="Times New Roman" panose="02020603050405020304" pitchFamily="18" charset="0"/>
                 </a:endParaRPr>
               </a:p>
             </p:txBody>
@@ -9092,10 +9511,10 @@
         <mc:Fallback>
           <p:sp>
             <p:nvSpPr>
-              <p:cNvPr id="42" name="TextBox 41">
+              <p:cNvPr id="23" name="Content Placeholder 2">
                 <a:extLst>
                   <a:ext uri="{FF2B5EF4-FFF2-40B4-BE49-F238E27FC236}">
-                    <a16:creationId xmlns:a16="http://schemas.microsoft.com/office/drawing/2014/main" id="{A7F6C982-9EC1-46A1-867E-ED0F4D20E2C8}"/>
+                    <a16:creationId xmlns:a16="http://schemas.microsoft.com/office/drawing/2014/main" id="{C081B814-94AA-4CAC-8512-61AAE6CBB083}"/>
                   </a:ext>
                 </a:extLst>
               </p:cNvPr>
@@ -9106,125 +9525,16 @@
             </p:nvSpPr>
             <p:spPr>
               <a:xfrm>
-                <a:off x="3438969" y="5421979"/>
-                <a:ext cx="694258" cy="400110"/>
+                <a:off x="957288" y="3132679"/>
+                <a:ext cx="10277423" cy="3215749"/>
               </a:xfrm>
               <a:prstGeom prst="rect">
                 <a:avLst/>
               </a:prstGeom>
               <a:blipFill>
-                <a:blip r:embed="rId7"/>
+                <a:blip r:embed="rId9"/>
                 <a:stretch>
-                  <a:fillRect/>
-                </a:stretch>
-              </a:blipFill>
-            </p:spPr>
-            <p:txBody>
-              <a:bodyPr/>
-              <a:lstStyle/>
-              <a:p>
-                <a:r>
-                  <a:rPr lang="en-GB">
-                    <a:noFill/>
-                  </a:rPr>
-                  <a:t> </a:t>
-                </a:r>
-              </a:p>
-            </p:txBody>
-          </p:sp>
-        </mc:Fallback>
-      </mc:AlternateContent>
-      <mc:AlternateContent xmlns:mc="http://schemas.openxmlformats.org/markup-compatibility/2006">
-        <mc:Choice xmlns:a14="http://schemas.microsoft.com/office/drawing/2010/main" Requires="a14">
-          <p:sp>
-            <p:nvSpPr>
-              <p:cNvPr id="43" name="TextBox 42">
-                <a:extLst>
-                  <a:ext uri="{FF2B5EF4-FFF2-40B4-BE49-F238E27FC236}">
-                    <a16:creationId xmlns:a16="http://schemas.microsoft.com/office/drawing/2014/main" id="{8696B85C-DFE3-4602-8E40-59D749C7EC1D}"/>
-                  </a:ext>
-                </a:extLst>
-              </p:cNvPr>
-              <p:cNvSpPr txBox="1"/>
-              <p:nvPr/>
-            </p:nvSpPr>
-            <p:spPr>
-              <a:xfrm>
-                <a:off x="3032151" y="4963793"/>
-                <a:ext cx="694258" cy="400110"/>
-              </a:xfrm>
-              <a:prstGeom prst="rect">
-                <a:avLst/>
-              </a:prstGeom>
-              <a:noFill/>
-            </p:spPr>
-            <p:txBody>
-              <a:bodyPr wrap="square" rtlCol="0">
-                <a:spAutoFit/>
-              </a:bodyPr>
-              <a:lstStyle/>
-              <a:p>
-                <a14:m>
-                  <m:oMathPara xmlns:m="http://schemas.openxmlformats.org/officeDocument/2006/math">
-                    <m:oMathParaPr>
-                      <m:jc m:val="centerGroup"/>
-                    </m:oMathParaPr>
-                    <m:oMath xmlns:m="http://schemas.openxmlformats.org/officeDocument/2006/math">
-                      <m:r>
-                        <a:rPr lang="en-GB" sz="2000" b="0" i="1" smtClean="0">
-                          <a:solidFill>
-                            <a:schemeClr val="bg1">
-                              <a:lumMod val="50000"/>
-                            </a:schemeClr>
-                          </a:solidFill>
-                          <a:latin typeface="Cambria Math" panose="02040503050406030204" pitchFamily="18" charset="0"/>
-                          <a:cs typeface="Times New Roman" panose="02020603050405020304" pitchFamily="18" charset="0"/>
-                        </a:rPr>
-                        <m:t>𝑠</m:t>
-                      </m:r>
-                    </m:oMath>
-                  </m:oMathPara>
-                </a14:m>
-                <a:endParaRPr lang="en-GB" sz="2000" dirty="0">
-                  <a:solidFill>
-                    <a:schemeClr val="bg1">
-                      <a:lumMod val="50000"/>
-                    </a:schemeClr>
-                  </a:solidFill>
-                  <a:latin typeface="Times New Roman" panose="02020603050405020304" pitchFamily="18" charset="0"/>
-                  <a:cs typeface="Times New Roman" panose="02020603050405020304" pitchFamily="18" charset="0"/>
-                </a:endParaRPr>
-              </a:p>
-            </p:txBody>
-          </p:sp>
-        </mc:Choice>
-        <mc:Fallback>
-          <p:sp>
-            <p:nvSpPr>
-              <p:cNvPr id="43" name="TextBox 42">
-                <a:extLst>
-                  <a:ext uri="{FF2B5EF4-FFF2-40B4-BE49-F238E27FC236}">
-                    <a16:creationId xmlns:a16="http://schemas.microsoft.com/office/drawing/2014/main" id="{8696B85C-DFE3-4602-8E40-59D749C7EC1D}"/>
-                  </a:ext>
-                </a:extLst>
-              </p:cNvPr>
-              <p:cNvSpPr txBox="1">
-                <a:spLocks noRot="1" noChangeAspect="1" noMove="1" noResize="1" noEditPoints="1" noAdjustHandles="1" noChangeArrowheads="1" noChangeShapeType="1" noTextEdit="1"/>
-              </p:cNvSpPr>
-              <p:nvPr/>
-            </p:nvSpPr>
-            <p:spPr>
-              <a:xfrm>
-                <a:off x="3032151" y="4963793"/>
-                <a:ext cx="694258" cy="400110"/>
-              </a:xfrm>
-              <a:prstGeom prst="rect">
-                <a:avLst/>
-              </a:prstGeom>
-              <a:blipFill>
-                <a:blip r:embed="rId8"/>
-                <a:stretch>
-                  <a:fillRect/>
+                  <a:fillRect l="-771" t="-2657"/>
                 </a:stretch>
               </a:blipFill>
             </p:spPr>
@@ -9323,7 +9633,7 @@
                             </p:stCondLst>
                             <p:childTnLst>
                               <p:par>
-                                <p:cTn id="9" presetID="1" presetClass="entr" presetSubtype="0" fill="hold" grpId="0" nodeType="clickEffect">
+                                <p:cTn id="9" presetID="10" presetClass="entr" presetSubtype="0" fill="hold" nodeType="clickEffect">
                                   <p:stCondLst>
                                     <p:cond delay="0"/>
                                   </p:stCondLst>
@@ -9336,9 +9646,62 @@
                                           </p:stCondLst>
                                         </p:cTn>
                                         <p:tgtEl>
-                                          <p:spTgt spid="31">
+                                          <p:spTgt spid="5"/>
+                                        </p:tgtEl>
+                                        <p:attrNameLst>
+                                          <p:attrName>style.visibility</p:attrName>
+                                        </p:attrNameLst>
+                                      </p:cBhvr>
+                                      <p:to>
+                                        <p:strVal val="visible"/>
+                                      </p:to>
+                                    </p:set>
+                                    <p:animEffect transition="in" filter="fade">
+                                      <p:cBhvr>
+                                        <p:cTn id="11" dur="500"/>
+                                        <p:tgtEl>
+                                          <p:spTgt spid="5"/>
+                                        </p:tgtEl>
+                                      </p:cBhvr>
+                                    </p:animEffect>
+                                  </p:childTnLst>
+                                </p:cTn>
+                              </p:par>
+                            </p:childTnLst>
+                          </p:cTn>
+                        </p:par>
+                      </p:childTnLst>
+                    </p:cTn>
+                  </p:par>
+                  <p:par>
+                    <p:cTn id="12" fill="hold">
+                      <p:stCondLst>
+                        <p:cond delay="indefinite"/>
+                      </p:stCondLst>
+                      <p:childTnLst>
+                        <p:par>
+                          <p:cTn id="13" fill="hold">
+                            <p:stCondLst>
+                              <p:cond delay="0"/>
+                            </p:stCondLst>
+                            <p:childTnLst>
+                              <p:par>
+                                <p:cTn id="14" presetID="1" presetClass="entr" presetSubtype="0" fill="hold" grpId="0" nodeType="clickEffect">
+                                  <p:stCondLst>
+                                    <p:cond delay="0"/>
+                                  </p:stCondLst>
+                                  <p:childTnLst>
+                                    <p:set>
+                                      <p:cBhvr>
+                                        <p:cTn id="15" dur="1" fill="hold">
+                                          <p:stCondLst>
+                                            <p:cond delay="0"/>
+                                          </p:stCondLst>
+                                        </p:cTn>
+                                        <p:tgtEl>
+                                          <p:spTgt spid="23">
                                             <p:txEl>
-                                              <p:pRg st="1" end="1"/>
+                                              <p:pRg st="0" end="0"/>
                                             </p:txEl>
                                           </p:spTgt>
                                         </p:tgtEl>
@@ -9360,34 +9723,34 @@
                     </p:cTn>
                   </p:par>
                   <p:par>
-                    <p:cTn id="11" fill="hold">
+                    <p:cTn id="16" fill="hold">
                       <p:stCondLst>
                         <p:cond delay="indefinite"/>
                       </p:stCondLst>
                       <p:childTnLst>
                         <p:par>
-                          <p:cTn id="12" fill="hold">
+                          <p:cTn id="17" fill="hold">
                             <p:stCondLst>
                               <p:cond delay="0"/>
                             </p:stCondLst>
                             <p:childTnLst>
                               <p:par>
-                                <p:cTn id="13" presetID="1" presetClass="entr" presetSubtype="0" fill="hold" grpId="0" nodeType="clickEffect">
+                                <p:cTn id="18" presetID="1" presetClass="entr" presetSubtype="0" fill="hold" grpId="0" nodeType="clickEffect">
                                   <p:stCondLst>
                                     <p:cond delay="0"/>
                                   </p:stCondLst>
                                   <p:childTnLst>
                                     <p:set>
                                       <p:cBhvr>
-                                        <p:cTn id="14" dur="1" fill="hold">
+                                        <p:cTn id="19" dur="1" fill="hold">
                                           <p:stCondLst>
                                             <p:cond delay="0"/>
                                           </p:stCondLst>
                                         </p:cTn>
                                         <p:tgtEl>
-                                          <p:spTgt spid="31">
+                                          <p:spTgt spid="23">
                                             <p:txEl>
-                                              <p:pRg st="3" end="3"/>
+                                              <p:pRg st="2" end="2"/>
                                             </p:txEl>
                                           </p:spTgt>
                                         </p:tgtEl>
@@ -9409,32 +9772,32 @@
                     </p:cTn>
                   </p:par>
                   <p:par>
-                    <p:cTn id="15" fill="hold">
+                    <p:cTn id="20" fill="hold">
                       <p:stCondLst>
                         <p:cond delay="indefinite"/>
                       </p:stCondLst>
                       <p:childTnLst>
                         <p:par>
-                          <p:cTn id="16" fill="hold">
+                          <p:cTn id="21" fill="hold">
                             <p:stCondLst>
                               <p:cond delay="0"/>
                             </p:stCondLst>
                             <p:childTnLst>
                               <p:par>
-                                <p:cTn id="17" presetID="10" presetClass="entr" presetSubtype="0" fill="hold" nodeType="clickEffect">
+                                <p:cTn id="22" presetID="10" presetClass="entr" presetSubtype="0" fill="hold" nodeType="clickEffect">
                                   <p:stCondLst>
                                     <p:cond delay="0"/>
                                   </p:stCondLst>
                                   <p:childTnLst>
                                     <p:set>
                                       <p:cBhvr>
-                                        <p:cTn id="18" dur="1" fill="hold">
+                                        <p:cTn id="23" dur="1" fill="hold">
                                           <p:stCondLst>
                                             <p:cond delay="0"/>
                                           </p:stCondLst>
                                         </p:cTn>
                                         <p:tgtEl>
-                                          <p:spTgt spid="19"/>
+                                          <p:spTgt spid="7"/>
                                         </p:tgtEl>
                                         <p:attrNameLst>
                                           <p:attrName>style.visibility</p:attrName>
@@ -9446,9 +9809,9 @@
                                     </p:set>
                                     <p:animEffect transition="in" filter="fade">
                                       <p:cBhvr>
-                                        <p:cTn id="19" dur="500"/>
+                                        <p:cTn id="24" dur="500"/>
                                         <p:tgtEl>
-                                          <p:spTgt spid="19"/>
+                                          <p:spTgt spid="7"/>
                                         </p:tgtEl>
                                       </p:cBhvr>
                                     </p:animEffect>
@@ -9484,6 +9847,7 @@
     </p:tnLst>
     <p:bldLst>
       <p:bldP spid="31" grpId="0" uiExpand="1" build="p"/>
+      <p:bldP spid="23" grpId="0" uiExpand="1" build="p"/>
     </p:bldLst>
   </p:timing>
 </p:sld>
@@ -9544,7 +9908,7 @@
           <a:p>
             <a:r>
               <a:rPr lang="en-GB" sz="4400" dirty="0"/>
-              <a:t>Equation of a plane: alternative form </a:t>
+              <a:t>Implicit equation of a plane</a:t>
             </a:r>
           </a:p>
         </p:txBody>
@@ -9702,7 +10066,7 @@
                 </a14:m>
                 <a:r>
                   <a:rPr lang="en-GB" sz="2400" dirty="0"/>
-                  <a:t> define on a plane</a:t>
+                  <a:t> define a plane</a:t>
                 </a:r>
               </a:p>
               <a:p>
@@ -10330,10 +10694,9 @@
           <a:lstStyle/>
           <a:p>
             <a:r>
-              <a:rPr lang="en-GB" dirty="0"/>
-              <a:t>Equation of a plane: alternative form </a:t>
+              <a:rPr lang="en-GB" sz="4400" dirty="0"/>
+              <a:t>Geometric equation of a plane</a:t>
             </a:r>
-            <a:endParaRPr lang="en-GB" sz="4400" dirty="0"/>
           </a:p>
         </p:txBody>
       </p:sp>
@@ -10392,8 +10755,8 @@
           </a:fontRef>
         </p:style>
       </p:cxnSp>
-      <mc:AlternateContent xmlns:mc="http://schemas.openxmlformats.org/markup-compatibility/2006">
-        <mc:Choice xmlns:a14="http://schemas.microsoft.com/office/drawing/2010/main" Requires="a14">
+      <mc:AlternateContent xmlns:mc="http://schemas.openxmlformats.org/markup-compatibility/2006" xmlns:a14="http://schemas.microsoft.com/office/drawing/2010/main">
+        <mc:Choice Requires="a14">
           <p:sp>
             <p:nvSpPr>
               <p:cNvPr id="31" name="Content Placeholder 2">
@@ -11576,7 +11939,7 @@
             </p:txBody>
           </p:sp>
         </mc:Choice>
-        <mc:Fallback>
+        <mc:Fallback xmlns="">
           <p:sp>
             <p:nvSpPr>
               <p:cNvPr id="31" name="Content Placeholder 2">
@@ -11744,8 +12107,8 @@
             </a:fontRef>
           </p:style>
         </p:cxnSp>
-        <mc:AlternateContent xmlns:mc="http://schemas.openxmlformats.org/markup-compatibility/2006">
-          <mc:Choice xmlns:a14="http://schemas.microsoft.com/office/drawing/2010/main" Requires="a14">
+        <mc:AlternateContent xmlns:mc="http://schemas.openxmlformats.org/markup-compatibility/2006" xmlns:a14="http://schemas.microsoft.com/office/drawing/2010/main">
+          <mc:Choice Requires="a14">
             <p:sp>
               <p:nvSpPr>
                 <p:cNvPr id="11" name="TextBox 10">
@@ -11774,6 +12137,7 @@
                 </a:bodyPr>
                 <a:lstStyle/>
                 <a:p>
+                  <a:pPr/>
                   <a14:m>
                     <m:oMathPara xmlns:m="http://schemas.openxmlformats.org/officeDocument/2006/math">
                       <m:oMathParaPr>
@@ -11804,7 +12168,7 @@
               </p:txBody>
             </p:sp>
           </mc:Choice>
-          <mc:Fallback>
+          <mc:Fallback xmlns="">
             <p:sp>
               <p:nvSpPr>
                 <p:cNvPr id="11" name="TextBox 10">
@@ -11903,8 +12267,8 @@
             </a:p>
           </p:txBody>
         </p:sp>
-        <mc:AlternateContent xmlns:mc="http://schemas.openxmlformats.org/markup-compatibility/2006">
-          <mc:Choice xmlns:a14="http://schemas.microsoft.com/office/drawing/2010/main" Requires="a14">
+        <mc:AlternateContent xmlns:mc="http://schemas.openxmlformats.org/markup-compatibility/2006" xmlns:a14="http://schemas.microsoft.com/office/drawing/2010/main">
+          <mc:Choice Requires="a14">
             <p:sp>
               <p:nvSpPr>
                 <p:cNvPr id="13" name="TextBox 12">
@@ -11933,6 +12297,7 @@
                 </a:bodyPr>
                 <a:lstStyle/>
                 <a:p>
+                  <a:pPr/>
                   <a14:m>
                     <m:oMathPara xmlns:m="http://schemas.openxmlformats.org/officeDocument/2006/math">
                       <m:oMathParaPr>
@@ -11963,7 +12328,7 @@
               </p:txBody>
             </p:sp>
           </mc:Choice>
-          <mc:Fallback>
+          <mc:Fallback xmlns="">
             <p:sp>
               <p:nvSpPr>
                 <p:cNvPr id="13" name="TextBox 12">
@@ -12052,8 +12417,8 @@
             </a:fontRef>
           </p:style>
         </p:cxnSp>
-        <mc:AlternateContent xmlns:mc="http://schemas.openxmlformats.org/markup-compatibility/2006">
-          <mc:Choice xmlns:a14="http://schemas.microsoft.com/office/drawing/2010/main" Requires="a14">
+        <mc:AlternateContent xmlns:mc="http://schemas.openxmlformats.org/markup-compatibility/2006" xmlns:a14="http://schemas.microsoft.com/office/drawing/2010/main">
+          <mc:Choice Requires="a14">
             <p:sp>
               <p:nvSpPr>
                 <p:cNvPr id="16" name="TextBox 15">
@@ -12082,6 +12447,7 @@
                 </a:bodyPr>
                 <a:lstStyle/>
                 <a:p>
+                  <a:pPr/>
                   <a14:m>
                     <m:oMathPara xmlns:m="http://schemas.openxmlformats.org/officeDocument/2006/math">
                       <m:oMathParaPr>
@@ -12112,7 +12478,7 @@
               </p:txBody>
             </p:sp>
           </mc:Choice>
-          <mc:Fallback>
+          <mc:Fallback xmlns="">
             <p:sp>
               <p:nvSpPr>
                 <p:cNvPr id="16" name="TextBox 15">
@@ -12211,8 +12577,8 @@
             </a:p>
           </p:txBody>
         </p:sp>
-        <mc:AlternateContent xmlns:mc="http://schemas.openxmlformats.org/markup-compatibility/2006">
-          <mc:Choice xmlns:a14="http://schemas.microsoft.com/office/drawing/2010/main" Requires="a14">
+        <mc:AlternateContent xmlns:mc="http://schemas.openxmlformats.org/markup-compatibility/2006" xmlns:a14="http://schemas.microsoft.com/office/drawing/2010/main">
+          <mc:Choice Requires="a14">
             <p:sp>
               <p:nvSpPr>
                 <p:cNvPr id="19" name="TextBox 18">
@@ -12241,6 +12607,7 @@
                 </a:bodyPr>
                 <a:lstStyle/>
                 <a:p>
+                  <a:pPr/>
                   <a14:m>
                     <m:oMathPara xmlns:m="http://schemas.openxmlformats.org/officeDocument/2006/math">
                       <m:oMathParaPr>
@@ -12291,7 +12658,7 @@
               </p:txBody>
             </p:sp>
           </mc:Choice>
-          <mc:Fallback>
+          <mc:Fallback xmlns="">
             <p:sp>
               <p:nvSpPr>
                 <p:cNvPr id="19" name="TextBox 18">
@@ -12835,8 +13202,8 @@
           </a:fontRef>
         </p:style>
       </p:cxnSp>
-      <mc:AlternateContent xmlns:mc="http://schemas.openxmlformats.org/markup-compatibility/2006">
-        <mc:Choice xmlns:a14="http://schemas.microsoft.com/office/drawing/2010/main" Requires="a14">
+      <mc:AlternateContent xmlns:mc="http://schemas.openxmlformats.org/markup-compatibility/2006" xmlns:a14="http://schemas.microsoft.com/office/drawing/2010/main">
+        <mc:Choice Requires="a14">
           <p:sp>
             <p:nvSpPr>
               <p:cNvPr id="8" name="TextBox 7">
@@ -12865,6 +13232,7 @@
               </a:bodyPr>
               <a:lstStyle/>
               <a:p>
+                <a:pPr/>
                 <a14:m>
                   <m:oMathPara xmlns:m="http://schemas.openxmlformats.org/officeDocument/2006/math">
                     <m:oMathParaPr>
@@ -12895,7 +13263,7 @@
             </p:txBody>
           </p:sp>
         </mc:Choice>
-        <mc:Fallback>
+        <mc:Fallback xmlns="">
           <p:sp>
             <p:nvSpPr>
               <p:cNvPr id="8" name="TextBox 7">
@@ -13164,8 +13532,8 @@
             </a:p>
           </p:txBody>
         </p:sp>
-        <mc:AlternateContent xmlns:mc="http://schemas.openxmlformats.org/markup-compatibility/2006">
-          <mc:Choice xmlns:a14="http://schemas.microsoft.com/office/drawing/2010/main" Requires="a14">
+        <mc:AlternateContent xmlns:mc="http://schemas.openxmlformats.org/markup-compatibility/2006" xmlns:a14="http://schemas.microsoft.com/office/drawing/2010/main">
+          <mc:Choice Requires="a14">
             <p:sp>
               <p:nvSpPr>
                 <p:cNvPr id="10" name="TextBox 9">
@@ -13194,6 +13562,7 @@
                 </a:bodyPr>
                 <a:lstStyle/>
                 <a:p>
+                  <a:pPr/>
                   <a14:m>
                     <m:oMathPara xmlns:m="http://schemas.openxmlformats.org/officeDocument/2006/math">
                       <m:oMathParaPr>
@@ -13224,7 +13593,7 @@
               </p:txBody>
             </p:sp>
           </mc:Choice>
-          <mc:Fallback>
+          <mc:Fallback xmlns="">
             <p:sp>
               <p:nvSpPr>
                 <p:cNvPr id="10" name="TextBox 9">
@@ -13269,8 +13638,8 @@
             </p:sp>
           </mc:Fallback>
         </mc:AlternateContent>
-        <mc:AlternateContent xmlns:mc="http://schemas.openxmlformats.org/markup-compatibility/2006">
-          <mc:Choice xmlns:a14="http://schemas.microsoft.com/office/drawing/2010/main" Requires="a14">
+        <mc:AlternateContent xmlns:mc="http://schemas.openxmlformats.org/markup-compatibility/2006" xmlns:a14="http://schemas.microsoft.com/office/drawing/2010/main">
+          <mc:Choice Requires="a14">
             <p:sp>
               <p:nvSpPr>
                 <p:cNvPr id="12" name="TextBox 11">
@@ -13299,6 +13668,7 @@
                 </a:bodyPr>
                 <a:lstStyle/>
                 <a:p>
+                  <a:pPr/>
                   <a14:m>
                     <m:oMathPara xmlns:m="http://schemas.openxmlformats.org/officeDocument/2006/math">
                       <m:oMathParaPr>
@@ -13329,7 +13699,7 @@
               </p:txBody>
             </p:sp>
           </mc:Choice>
-          <mc:Fallback>
+          <mc:Fallback xmlns="">
             <p:sp>
               <p:nvSpPr>
                 <p:cNvPr id="12" name="TextBox 11">
@@ -13744,8 +14114,8 @@
             </a:fontRef>
           </p:style>
         </p:cxnSp>
-        <mc:AlternateContent xmlns:mc="http://schemas.openxmlformats.org/markup-compatibility/2006">
-          <mc:Choice xmlns:a14="http://schemas.microsoft.com/office/drawing/2010/main" Requires="a14">
+        <mc:AlternateContent xmlns:mc="http://schemas.openxmlformats.org/markup-compatibility/2006" xmlns:a14="http://schemas.microsoft.com/office/drawing/2010/main">
+          <mc:Choice Requires="a14">
             <p:sp>
               <p:nvSpPr>
                 <p:cNvPr id="47" name="TextBox 46">
@@ -13774,6 +14144,7 @@
                 </a:bodyPr>
                 <a:lstStyle/>
                 <a:p>
+                  <a:pPr/>
                   <a14:m>
                     <m:oMathPara xmlns:m="http://schemas.openxmlformats.org/officeDocument/2006/math">
                       <m:oMathParaPr>
@@ -13811,7 +14182,7 @@
               </p:txBody>
             </p:sp>
           </mc:Choice>
-          <mc:Fallback>
+          <mc:Fallback xmlns="">
             <p:sp>
               <p:nvSpPr>
                 <p:cNvPr id="47" name="TextBox 46">
@@ -13856,8 +14227,8 @@
             </p:sp>
           </mc:Fallback>
         </mc:AlternateContent>
-        <mc:AlternateContent xmlns:mc="http://schemas.openxmlformats.org/markup-compatibility/2006">
-          <mc:Choice xmlns:a14="http://schemas.microsoft.com/office/drawing/2010/main" Requires="a14">
+        <mc:AlternateContent xmlns:mc="http://schemas.openxmlformats.org/markup-compatibility/2006" xmlns:a14="http://schemas.microsoft.com/office/drawing/2010/main">
+          <mc:Choice Requires="a14">
             <p:sp>
               <p:nvSpPr>
                 <p:cNvPr id="48" name="TextBox 47">
@@ -13886,6 +14257,7 @@
                 </a:bodyPr>
                 <a:lstStyle/>
                 <a:p>
+                  <a:pPr/>
                   <a14:m>
                     <m:oMathPara xmlns:m="http://schemas.openxmlformats.org/officeDocument/2006/math">
                       <m:oMathParaPr>
@@ -13916,7 +14288,7 @@
               </p:txBody>
             </p:sp>
           </mc:Choice>
-          <mc:Fallback>
+          <mc:Fallback xmlns="">
             <p:sp>
               <p:nvSpPr>
                 <p:cNvPr id="48" name="TextBox 47">
@@ -13962,8 +14334,8 @@
           </mc:Fallback>
         </mc:AlternateContent>
       </p:grpSp>
-      <mc:AlternateContent xmlns:mc="http://schemas.openxmlformats.org/markup-compatibility/2006">
-        <mc:Choice xmlns:a14="http://schemas.microsoft.com/office/drawing/2010/main" Requires="a14">
+      <mc:AlternateContent xmlns:mc="http://schemas.openxmlformats.org/markup-compatibility/2006" xmlns:a14="http://schemas.microsoft.com/office/drawing/2010/main">
+        <mc:Choice Requires="a14">
           <p:sp>
             <p:nvSpPr>
               <p:cNvPr id="50" name="Content Placeholder 2">
@@ -14616,7 +14988,7 @@
             </p:txBody>
           </p:sp>
         </mc:Choice>
-        <mc:Fallback>
+        <mc:Fallback xmlns="">
           <p:sp>
             <p:nvSpPr>
               <p:cNvPr id="50" name="Content Placeholder 2">
@@ -15067,8 +15439,8 @@
           </a:fontRef>
         </p:style>
       </p:cxnSp>
-      <mc:AlternateContent xmlns:mc="http://schemas.openxmlformats.org/markup-compatibility/2006">
-        <mc:Choice xmlns:a14="http://schemas.microsoft.com/office/drawing/2010/main" Requires="a14">
+      <mc:AlternateContent xmlns:mc="http://schemas.openxmlformats.org/markup-compatibility/2006" xmlns:a14="http://schemas.microsoft.com/office/drawing/2010/main">
+        <mc:Choice Requires="a14">
           <p:sp>
             <p:nvSpPr>
               <p:cNvPr id="31" name="Content Placeholder 2">
@@ -15749,7 +16121,7 @@
             </p:txBody>
           </p:sp>
         </mc:Choice>
-        <mc:Fallback>
+        <mc:Fallback xmlns="">
           <p:sp>
             <p:nvSpPr>
               <p:cNvPr id="31" name="Content Placeholder 2">
@@ -15927,8 +16299,8 @@
             </a:p>
           </p:txBody>
         </p:sp>
-        <mc:AlternateContent xmlns:mc="http://schemas.openxmlformats.org/markup-compatibility/2006">
-          <mc:Choice xmlns:a14="http://schemas.microsoft.com/office/drawing/2010/main" Requires="a14">
+        <mc:AlternateContent xmlns:mc="http://schemas.openxmlformats.org/markup-compatibility/2006" xmlns:a14="http://schemas.microsoft.com/office/drawing/2010/main">
+          <mc:Choice Requires="a14">
             <p:sp>
               <p:nvSpPr>
                 <p:cNvPr id="10" name="TextBox 9">
@@ -15957,6 +16329,7 @@
                 </a:bodyPr>
                 <a:lstStyle/>
                 <a:p>
+                  <a:pPr/>
                   <a14:m>
                     <m:oMathPara xmlns:m="http://schemas.openxmlformats.org/officeDocument/2006/math">
                       <m:oMathParaPr>
@@ -15987,7 +16360,7 @@
               </p:txBody>
             </p:sp>
           </mc:Choice>
-          <mc:Fallback>
+          <mc:Fallback xmlns="">
             <p:sp>
               <p:nvSpPr>
                 <p:cNvPr id="10" name="TextBox 9">
@@ -16032,8 +16405,8 @@
             </p:sp>
           </mc:Fallback>
         </mc:AlternateContent>
-        <mc:AlternateContent xmlns:mc="http://schemas.openxmlformats.org/markup-compatibility/2006">
-          <mc:Choice xmlns:a14="http://schemas.microsoft.com/office/drawing/2010/main" Requires="a14">
+        <mc:AlternateContent xmlns:mc="http://schemas.openxmlformats.org/markup-compatibility/2006" xmlns:a14="http://schemas.microsoft.com/office/drawing/2010/main">
+          <mc:Choice Requires="a14">
             <p:sp>
               <p:nvSpPr>
                 <p:cNvPr id="12" name="TextBox 11">
@@ -16062,6 +16435,7 @@
                 </a:bodyPr>
                 <a:lstStyle/>
                 <a:p>
+                  <a:pPr/>
                   <a14:m>
                     <m:oMathPara xmlns:m="http://schemas.openxmlformats.org/officeDocument/2006/math">
                       <m:oMathParaPr>
@@ -16092,7 +16466,7 @@
               </p:txBody>
             </p:sp>
           </mc:Choice>
-          <mc:Fallback>
+          <mc:Fallback xmlns="">
             <p:sp>
               <p:nvSpPr>
                 <p:cNvPr id="12" name="TextBox 11">
@@ -16191,8 +16565,8 @@
             </a:p>
           </p:txBody>
         </p:sp>
-        <mc:AlternateContent xmlns:mc="http://schemas.openxmlformats.org/markup-compatibility/2006">
-          <mc:Choice xmlns:a14="http://schemas.microsoft.com/office/drawing/2010/main" Requires="a14">
+        <mc:AlternateContent xmlns:mc="http://schemas.openxmlformats.org/markup-compatibility/2006" xmlns:a14="http://schemas.microsoft.com/office/drawing/2010/main">
+          <mc:Choice Requires="a14">
             <p:sp>
               <p:nvSpPr>
                 <p:cNvPr id="17" name="TextBox 16">
@@ -16221,6 +16595,7 @@
                 </a:bodyPr>
                 <a:lstStyle/>
                 <a:p>
+                  <a:pPr/>
                   <a14:m>
                     <m:oMathPara xmlns:m="http://schemas.openxmlformats.org/officeDocument/2006/math">
                       <m:oMathParaPr>
@@ -16251,7 +16626,7 @@
               </p:txBody>
             </p:sp>
           </mc:Choice>
-          <mc:Fallback>
+          <mc:Fallback xmlns="">
             <p:sp>
               <p:nvSpPr>
                 <p:cNvPr id="17" name="TextBox 16">
@@ -16394,8 +16769,8 @@
             </a:fontRef>
           </p:style>
         </p:cxnSp>
-        <mc:AlternateContent xmlns:mc="http://schemas.openxmlformats.org/markup-compatibility/2006">
-          <mc:Choice xmlns:a14="http://schemas.microsoft.com/office/drawing/2010/main" Requires="a14">
+        <mc:AlternateContent xmlns:mc="http://schemas.openxmlformats.org/markup-compatibility/2006" xmlns:a14="http://schemas.microsoft.com/office/drawing/2010/main">
+          <mc:Choice Requires="a14">
             <p:sp>
               <p:nvSpPr>
                 <p:cNvPr id="20" name="TextBox 19">
@@ -16424,6 +16799,7 @@
                 </a:bodyPr>
                 <a:lstStyle/>
                 <a:p>
+                  <a:pPr/>
                   <a14:m>
                     <m:oMathPara xmlns:m="http://schemas.openxmlformats.org/officeDocument/2006/math">
                       <m:oMathParaPr>
@@ -16454,7 +16830,7 @@
               </p:txBody>
             </p:sp>
           </mc:Choice>
-          <mc:Fallback>
+          <mc:Fallback xmlns="">
             <p:sp>
               <p:nvSpPr>
                 <p:cNvPr id="20" name="TextBox 19">
@@ -16543,8 +16919,8 @@
             </a:fontRef>
           </p:style>
         </p:cxnSp>
-        <mc:AlternateContent xmlns:mc="http://schemas.openxmlformats.org/markup-compatibility/2006">
-          <mc:Choice xmlns:a14="http://schemas.microsoft.com/office/drawing/2010/main" Requires="a14">
+        <mc:AlternateContent xmlns:mc="http://schemas.openxmlformats.org/markup-compatibility/2006" xmlns:a14="http://schemas.microsoft.com/office/drawing/2010/main">
+          <mc:Choice Requires="a14">
             <p:sp>
               <p:nvSpPr>
                 <p:cNvPr id="23" name="TextBox 22">
@@ -16573,6 +16949,7 @@
                 </a:bodyPr>
                 <a:lstStyle/>
                 <a:p>
+                  <a:pPr/>
                   <a14:m>
                     <m:oMathPara xmlns:m="http://schemas.openxmlformats.org/officeDocument/2006/math">
                       <m:oMathParaPr>
@@ -16603,7 +16980,7 @@
               </p:txBody>
             </p:sp>
           </mc:Choice>
-          <mc:Fallback>
+          <mc:Fallback xmlns="">
             <p:sp>
               <p:nvSpPr>
                 <p:cNvPr id="23" name="TextBox 22">
@@ -17153,8 +17530,8 @@
           </a:fontRef>
         </p:style>
       </p:cxnSp>
-      <mc:AlternateContent xmlns:mc="http://schemas.openxmlformats.org/markup-compatibility/2006">
-        <mc:Choice xmlns:a14="http://schemas.microsoft.com/office/drawing/2010/main" Requires="a14">
+      <mc:AlternateContent xmlns:mc="http://schemas.openxmlformats.org/markup-compatibility/2006" xmlns:a14="http://schemas.microsoft.com/office/drawing/2010/main">
+        <mc:Choice Requires="a14">
           <p:sp>
             <p:nvSpPr>
               <p:cNvPr id="31" name="Content Placeholder 2">
@@ -18566,7 +18943,7 @@
             </p:txBody>
           </p:sp>
         </mc:Choice>
-        <mc:Fallback>
+        <mc:Fallback xmlns="">
           <p:sp>
             <p:nvSpPr>
               <p:cNvPr id="31" name="Content Placeholder 2">
@@ -23379,8 +23756,8 @@
           </a:prstGeom>
         </p:spPr>
       </p:pic>
-      <mc:AlternateContent xmlns:mc="http://schemas.openxmlformats.org/markup-compatibility/2006">
-        <mc:Choice xmlns:a14="http://schemas.microsoft.com/office/drawing/2010/main" Requires="a14">
+      <mc:AlternateContent xmlns:mc="http://schemas.openxmlformats.org/markup-compatibility/2006" xmlns:a14="http://schemas.microsoft.com/office/drawing/2010/main">
+        <mc:Choice Requires="a14">
           <p:sp>
             <p:nvSpPr>
               <p:cNvPr id="31" name="Content Placeholder 2">
@@ -24365,7 +24742,7 @@
             </p:txBody>
           </p:sp>
         </mc:Choice>
-        <mc:Fallback>
+        <mc:Fallback xmlns="">
           <p:sp>
             <p:nvSpPr>
               <p:cNvPr id="31" name="Content Placeholder 2">
@@ -24537,8 +24914,8 @@
           </a:fontRef>
         </p:style>
       </p:cxnSp>
-      <mc:AlternateContent xmlns:mc="http://schemas.openxmlformats.org/markup-compatibility/2006">
-        <mc:Choice xmlns:a14="http://schemas.microsoft.com/office/drawing/2010/main" Requires="a14">
+      <mc:AlternateContent xmlns:mc="http://schemas.openxmlformats.org/markup-compatibility/2006" xmlns:a14="http://schemas.microsoft.com/office/drawing/2010/main">
+        <mc:Choice Requires="a14">
           <p:sp>
             <p:nvSpPr>
               <p:cNvPr id="31" name="Content Placeholder 2">
@@ -25356,7 +25733,7 @@
             </p:txBody>
           </p:sp>
         </mc:Choice>
-        <mc:Fallback>
+        <mc:Fallback xmlns="">
           <p:sp>
             <p:nvSpPr>
               <p:cNvPr id="31" name="Content Placeholder 2">
@@ -25528,8 +25905,8 @@
           </a:fontRef>
         </p:style>
       </p:cxnSp>
-      <mc:AlternateContent xmlns:mc="http://schemas.openxmlformats.org/markup-compatibility/2006">
-        <mc:Choice xmlns:a14="http://schemas.microsoft.com/office/drawing/2010/main" Requires="a14">
+      <mc:AlternateContent xmlns:mc="http://schemas.openxmlformats.org/markup-compatibility/2006" xmlns:a14="http://schemas.microsoft.com/office/drawing/2010/main">
+        <mc:Choice Requires="a14">
           <p:sp>
             <p:nvSpPr>
               <p:cNvPr id="31" name="Content Placeholder 2">
@@ -25928,7 +26305,7 @@
             </p:txBody>
           </p:sp>
         </mc:Choice>
-        <mc:Fallback>
+        <mc:Fallback xmlns="">
           <p:sp>
             <p:nvSpPr>
               <p:cNvPr id="31" name="Content Placeholder 2">
@@ -26392,8 +26769,8 @@
             </a:fontRef>
           </p:style>
         </p:cxnSp>
-        <mc:AlternateContent xmlns:mc="http://schemas.openxmlformats.org/markup-compatibility/2006">
-          <mc:Choice xmlns:a14="http://schemas.microsoft.com/office/drawing/2010/main" Requires="a14">
+        <mc:AlternateContent xmlns:mc="http://schemas.openxmlformats.org/markup-compatibility/2006" xmlns:a14="http://schemas.microsoft.com/office/drawing/2010/main">
+          <mc:Choice Requires="a14">
             <p:sp>
               <p:nvSpPr>
                 <p:cNvPr id="25" name="TextBox 24">
@@ -26422,6 +26799,7 @@
                 </a:bodyPr>
                 <a:lstStyle/>
                 <a:p>
+                  <a:pPr/>
                   <a14:m>
                     <m:oMathPara xmlns:m="http://schemas.openxmlformats.org/officeDocument/2006/math">
                       <m:oMathParaPr>
@@ -26543,7 +26921,7 @@
               </p:txBody>
             </p:sp>
           </mc:Choice>
-          <mc:Fallback>
+          <mc:Fallback xmlns="">
             <p:sp>
               <p:nvSpPr>
                 <p:cNvPr id="25" name="TextBox 24">
@@ -26588,8 +26966,8 @@
             </p:sp>
           </mc:Fallback>
         </mc:AlternateContent>
-        <mc:AlternateContent xmlns:mc="http://schemas.openxmlformats.org/markup-compatibility/2006">
-          <mc:Choice xmlns:a14="http://schemas.microsoft.com/office/drawing/2010/main" Requires="a14">
+        <mc:AlternateContent xmlns:mc="http://schemas.openxmlformats.org/markup-compatibility/2006" xmlns:a14="http://schemas.microsoft.com/office/drawing/2010/main">
+          <mc:Choice Requires="a14">
             <p:sp>
               <p:nvSpPr>
                 <p:cNvPr id="26" name="TextBox 25">
@@ -26618,6 +26996,7 @@
                 </a:bodyPr>
                 <a:lstStyle/>
                 <a:p>
+                  <a:pPr/>
                   <a14:m>
                     <m:oMathPara xmlns:m="http://schemas.openxmlformats.org/officeDocument/2006/math">
                       <m:oMathParaPr>
@@ -26648,7 +27027,7 @@
               </p:txBody>
             </p:sp>
           </mc:Choice>
-          <mc:Fallback>
+          <mc:Fallback xmlns="">
             <p:sp>
               <p:nvSpPr>
                 <p:cNvPr id="26" name="TextBox 25">
@@ -26694,8 +27073,8 @@
           </mc:Fallback>
         </mc:AlternateContent>
       </p:grpSp>
-      <mc:AlternateContent xmlns:mc="http://schemas.openxmlformats.org/markup-compatibility/2006">
-        <mc:Choice xmlns:a14="http://schemas.microsoft.com/office/drawing/2010/main" Requires="a14">
+      <mc:AlternateContent xmlns:mc="http://schemas.openxmlformats.org/markup-compatibility/2006" xmlns:a14="http://schemas.microsoft.com/office/drawing/2010/main">
+        <mc:Choice Requires="a14">
           <p:sp>
             <p:nvSpPr>
               <p:cNvPr id="28" name="TextBox 27">
@@ -26724,6 +27103,7 @@
               </a:bodyPr>
               <a:lstStyle/>
               <a:p>
+                <a:pPr/>
                 <a14:m>
                   <m:oMathPara xmlns:m="http://schemas.openxmlformats.org/officeDocument/2006/math">
                     <m:oMathParaPr>
@@ -26936,7 +27316,7 @@
             </p:txBody>
           </p:sp>
         </mc:Choice>
-        <mc:Fallback>
+        <mc:Fallback xmlns="">
           <p:sp>
             <p:nvSpPr>
               <p:cNvPr id="28" name="TextBox 27">
@@ -27388,8 +27768,8 @@
           </a:fontRef>
         </p:style>
       </p:cxnSp>
-      <mc:AlternateContent xmlns:mc="http://schemas.openxmlformats.org/markup-compatibility/2006">
-        <mc:Choice xmlns:a14="http://schemas.microsoft.com/office/drawing/2010/main" Requires="a14">
+      <mc:AlternateContent xmlns:mc="http://schemas.openxmlformats.org/markup-compatibility/2006" xmlns:a14="http://schemas.microsoft.com/office/drawing/2010/main">
+        <mc:Choice Requires="a14">
           <p:sp>
             <p:nvSpPr>
               <p:cNvPr id="31" name="Content Placeholder 2">
@@ -27592,7 +27972,7 @@
             </p:txBody>
           </p:sp>
         </mc:Choice>
-        <mc:Fallback>
+        <mc:Fallback xmlns="">
           <p:sp>
             <p:nvSpPr>
               <p:cNvPr id="31" name="Content Placeholder 2">
@@ -27744,8 +28124,8 @@
             </a:fontRef>
           </p:style>
         </p:cxnSp>
-        <mc:AlternateContent xmlns:mc="http://schemas.openxmlformats.org/markup-compatibility/2006">
-          <mc:Choice xmlns:a14="http://schemas.microsoft.com/office/drawing/2010/main" Requires="a14">
+        <mc:AlternateContent xmlns:mc="http://schemas.openxmlformats.org/markup-compatibility/2006" xmlns:a14="http://schemas.microsoft.com/office/drawing/2010/main">
+          <mc:Choice Requires="a14">
             <p:sp>
               <p:nvSpPr>
                 <p:cNvPr id="9" name="TextBox 8">
@@ -27774,6 +28154,7 @@
                 </a:bodyPr>
                 <a:lstStyle/>
                 <a:p>
+                  <a:pPr/>
                   <a14:m>
                     <m:oMathPara xmlns:m="http://schemas.openxmlformats.org/officeDocument/2006/math">
                       <m:oMathParaPr>
@@ -27831,7 +28212,7 @@
               </p:txBody>
             </p:sp>
           </mc:Choice>
-          <mc:Fallback>
+          <mc:Fallback xmlns="">
             <p:sp>
               <p:nvSpPr>
                 <p:cNvPr id="9" name="TextBox 8">
@@ -27876,8 +28257,8 @@
             </p:sp>
           </mc:Fallback>
         </mc:AlternateContent>
-        <mc:AlternateContent xmlns:mc="http://schemas.openxmlformats.org/markup-compatibility/2006">
-          <mc:Choice xmlns:a14="http://schemas.microsoft.com/office/drawing/2010/main" Requires="a14">
+        <mc:AlternateContent xmlns:mc="http://schemas.openxmlformats.org/markup-compatibility/2006" xmlns:a14="http://schemas.microsoft.com/office/drawing/2010/main">
+          <mc:Choice Requires="a14">
             <p:sp>
               <p:nvSpPr>
                 <p:cNvPr id="14" name="TextBox 13">
@@ -27906,6 +28287,7 @@
                 </a:bodyPr>
                 <a:lstStyle/>
                 <a:p>
+                  <a:pPr/>
                   <a14:m>
                     <m:oMathPara xmlns:m="http://schemas.openxmlformats.org/officeDocument/2006/math">
                       <m:oMathParaPr>
@@ -27963,7 +28345,7 @@
               </p:txBody>
             </p:sp>
           </mc:Choice>
-          <mc:Fallback>
+          <mc:Fallback xmlns="">
             <p:sp>
               <p:nvSpPr>
                 <p:cNvPr id="14" name="TextBox 13">
@@ -28629,8 +29011,8 @@
           </a:fontRef>
         </p:style>
       </p:cxnSp>
-      <mc:AlternateContent xmlns:mc="http://schemas.openxmlformats.org/markup-compatibility/2006">
-        <mc:Choice xmlns:a14="http://schemas.microsoft.com/office/drawing/2010/main" Requires="a14">
+      <mc:AlternateContent xmlns:mc="http://schemas.openxmlformats.org/markup-compatibility/2006" xmlns:a14="http://schemas.microsoft.com/office/drawing/2010/main">
+        <mc:Choice Requires="a14">
           <p:sp>
             <p:nvSpPr>
               <p:cNvPr id="31" name="Content Placeholder 2">
@@ -29426,7 +29808,7 @@
             </p:txBody>
           </p:sp>
         </mc:Choice>
-        <mc:Fallback>
+        <mc:Fallback xmlns="">
           <p:sp>
             <p:nvSpPr>
               <p:cNvPr id="31" name="Content Placeholder 2">
@@ -29669,7 +30051,7 @@
                     <m:sSub>
                       <m:sSubPr>
                         <m:ctrlPr>
-                          <a:rPr lang="en-GB" sz="2400" i="1">
+                          <a:rPr lang="en-GB" sz="2400" i="1" smtClean="0">
                             <a:latin typeface="Cambria Math" panose="02040503050406030204" pitchFamily="18" charset="0"/>
                           </a:rPr>
                         </m:ctrlPr>
@@ -29792,6 +30174,99 @@
                                 <a:latin typeface="Cambria Math" panose="02040503050406030204" pitchFamily="18" charset="0"/>
                               </a:rPr>
                               <m:t>1</m:t>
+                            </m:r>
+                          </m:sub>
+                        </m:sSub>
+                      </m:e>
+                    </m:d>
+                    <m:r>
+                      <a:rPr lang="en-GB" sz="2400" b="0" i="1" smtClean="0">
+                        <a:latin typeface="Cambria Math" panose="02040503050406030204" pitchFamily="18" charset="0"/>
+                      </a:rPr>
+                      <m:t>=</m:t>
+                    </m:r>
+                    <m:r>
+                      <a:rPr lang="en-GB" sz="2400" i="1">
+                        <a:latin typeface="Cambria Math" panose="02040503050406030204" pitchFamily="18" charset="0"/>
+                      </a:rPr>
+                      <m:t>−</m:t>
+                    </m:r>
+                    <m:d>
+                      <m:dPr>
+                        <m:ctrlPr>
+                          <a:rPr lang="en-GB" sz="2400" i="1">
+                            <a:latin typeface="Cambria Math" panose="02040503050406030204" pitchFamily="18" charset="0"/>
+                          </a:rPr>
+                        </m:ctrlPr>
+                      </m:dPr>
+                      <m:e>
+                        <m:sSub>
+                          <m:sSubPr>
+                            <m:ctrlPr>
+                              <a:rPr lang="en-GB" sz="2400" i="1">
+                                <a:latin typeface="Cambria Math" panose="02040503050406030204" pitchFamily="18" charset="0"/>
+                              </a:rPr>
+                            </m:ctrlPr>
+                          </m:sSubPr>
+                          <m:e>
+                            <m:r>
+                              <a:rPr lang="en-GB" sz="2400" b="1" i="1">
+                                <a:latin typeface="Cambria Math" panose="02040503050406030204" pitchFamily="18" charset="0"/>
+                              </a:rPr>
+                              <m:t>𝒗</m:t>
+                            </m:r>
+                          </m:e>
+                          <m:sub>
+                            <m:r>
+                              <a:rPr lang="en-GB" sz="2400" b="0" i="1" smtClean="0">
+                                <a:latin typeface="Cambria Math" panose="02040503050406030204" pitchFamily="18" charset="0"/>
+                              </a:rPr>
+                              <m:t>1</m:t>
+                            </m:r>
+                          </m:sub>
+                        </m:sSub>
+                        <m:r>
+                          <a:rPr lang="en-GB" sz="2400" b="0" i="1" smtClean="0">
+                            <a:latin typeface="Cambria Math" panose="02040503050406030204" pitchFamily="18" charset="0"/>
+                          </a:rPr>
+                          <m:t>)</m:t>
+                        </m:r>
+                        <m:r>
+                          <a:rPr lang="en-GB" sz="2400" i="1">
+                            <a:latin typeface="Cambria Math" panose="02040503050406030204" pitchFamily="18" charset="0"/>
+                            <a:ea typeface="Cambria Math" panose="02040503050406030204" pitchFamily="18" charset="0"/>
+                          </a:rPr>
+                          <m:t>×</m:t>
+                        </m:r>
+                        <m:r>
+                          <a:rPr lang="en-GB" sz="2400" b="0" i="1" smtClean="0">
+                            <a:latin typeface="Cambria Math" panose="02040503050406030204" pitchFamily="18" charset="0"/>
+                            <a:ea typeface="Cambria Math" panose="02040503050406030204" pitchFamily="18" charset="0"/>
+                          </a:rPr>
+                          <m:t>−(</m:t>
+                        </m:r>
+                        <m:sSub>
+                          <m:sSubPr>
+                            <m:ctrlPr>
+                              <a:rPr lang="en-GB" sz="2400" i="1">
+                                <a:latin typeface="Cambria Math" panose="02040503050406030204" pitchFamily="18" charset="0"/>
+                              </a:rPr>
+                            </m:ctrlPr>
+                          </m:sSubPr>
+                          <m:e>
+                            <m:r>
+                              <a:rPr lang="en-GB" sz="2400" b="1" i="1">
+                                <a:latin typeface="Cambria Math" panose="02040503050406030204" pitchFamily="18" charset="0"/>
+                              </a:rPr>
+                              <m:t>𝒗</m:t>
+                            </m:r>
+                          </m:e>
+                          <m:sub>
+                            <m:r>
+                              <a:rPr lang="en-GB" sz="2400" b="0" i="1" smtClean="0">
+                                <a:latin typeface="Cambria Math" panose="02040503050406030204" pitchFamily="18" charset="0"/>
+                              </a:rPr>
+                              <m:t>2</m:t>
                             </m:r>
                           </m:sub>
                         </m:sSub>
@@ -29958,8 +30433,8 @@
             </a:fontRef>
           </p:style>
         </p:cxnSp>
-        <mc:AlternateContent xmlns:mc="http://schemas.openxmlformats.org/markup-compatibility/2006">
-          <mc:Choice xmlns:a14="http://schemas.microsoft.com/office/drawing/2010/main" Requires="a14">
+        <mc:AlternateContent xmlns:mc="http://schemas.openxmlformats.org/markup-compatibility/2006" xmlns:a14="http://schemas.microsoft.com/office/drawing/2010/main">
+          <mc:Choice Requires="a14">
             <p:sp>
               <p:nvSpPr>
                 <p:cNvPr id="23" name="TextBox 22">
@@ -29988,6 +30463,7 @@
                 </a:bodyPr>
                 <a:lstStyle/>
                 <a:p>
+                  <a:pPr/>
                   <a14:m>
                     <m:oMathPara xmlns:m="http://schemas.openxmlformats.org/officeDocument/2006/math">
                       <m:oMathParaPr>
@@ -30045,7 +30521,7 @@
               </p:txBody>
             </p:sp>
           </mc:Choice>
-          <mc:Fallback>
+          <mc:Fallback xmlns="">
             <p:sp>
               <p:nvSpPr>
                 <p:cNvPr id="23" name="TextBox 22">
@@ -30090,8 +30566,8 @@
             </p:sp>
           </mc:Fallback>
         </mc:AlternateContent>
-        <mc:AlternateContent xmlns:mc="http://schemas.openxmlformats.org/markup-compatibility/2006">
-          <mc:Choice xmlns:a14="http://schemas.microsoft.com/office/drawing/2010/main" Requires="a14">
+        <mc:AlternateContent xmlns:mc="http://schemas.openxmlformats.org/markup-compatibility/2006" xmlns:a14="http://schemas.microsoft.com/office/drawing/2010/main">
+          <mc:Choice Requires="a14">
             <p:sp>
               <p:nvSpPr>
                 <p:cNvPr id="24" name="TextBox 23">
@@ -30120,6 +30596,7 @@
                 </a:bodyPr>
                 <a:lstStyle/>
                 <a:p>
+                  <a:pPr/>
                   <a14:m>
                     <m:oMathPara xmlns:m="http://schemas.openxmlformats.org/officeDocument/2006/math">
                       <m:oMathParaPr>
@@ -30177,7 +30654,7 @@
               </p:txBody>
             </p:sp>
           </mc:Choice>
-          <mc:Fallback>
+          <mc:Fallback xmlns="">
             <p:sp>
               <p:nvSpPr>
                 <p:cNvPr id="24" name="TextBox 23">
@@ -30222,8 +30699,8 @@
             </p:sp>
           </mc:Fallback>
         </mc:AlternateContent>
-        <mc:AlternateContent xmlns:mc="http://schemas.openxmlformats.org/markup-compatibility/2006">
-          <mc:Choice xmlns:a14="http://schemas.microsoft.com/office/drawing/2010/main" Requires="a14">
+        <mc:AlternateContent xmlns:mc="http://schemas.openxmlformats.org/markup-compatibility/2006" xmlns:a14="http://schemas.microsoft.com/office/drawing/2010/main">
+          <mc:Choice Requires="a14">
             <p:sp>
               <p:nvSpPr>
                 <p:cNvPr id="25" name="TextBox 24">
@@ -30252,6 +30729,7 @@
                 </a:bodyPr>
                 <a:lstStyle/>
                 <a:p>
+                  <a:pPr/>
                   <a14:m>
                     <m:oMathPara xmlns:m="http://schemas.openxmlformats.org/officeDocument/2006/math">
                       <m:oMathParaPr>
@@ -30350,7 +30828,7 @@
               </p:txBody>
             </p:sp>
           </mc:Choice>
-          <mc:Fallback>
+          <mc:Fallback xmlns="">
             <p:sp>
               <p:nvSpPr>
                 <p:cNvPr id="25" name="TextBox 24">
@@ -30616,8 +31094,8 @@
           </p:style>
         </p:cxnSp>
       </p:grpSp>
-      <mc:AlternateContent xmlns:mc="http://schemas.openxmlformats.org/markup-compatibility/2006">
-        <mc:Choice xmlns:a14="http://schemas.microsoft.com/office/drawing/2010/main" Requires="a14">
+      <mc:AlternateContent xmlns:mc="http://schemas.openxmlformats.org/markup-compatibility/2006" xmlns:a14="http://schemas.microsoft.com/office/drawing/2010/main">
+        <mc:Choice Requires="a14">
           <p:sp>
             <p:nvSpPr>
               <p:cNvPr id="48" name="Content Placeholder 2">
@@ -30902,7 +31380,7 @@
             </p:txBody>
           </p:sp>
         </mc:Choice>
-        <mc:Fallback>
+        <mc:Fallback xmlns="">
           <p:sp>
             <p:nvSpPr>
               <p:cNvPr id="48" name="Content Placeholder 2">
@@ -31011,8 +31489,8 @@
             </a:fontRef>
           </p:style>
         </p:cxnSp>
-        <mc:AlternateContent xmlns:mc="http://schemas.openxmlformats.org/markup-compatibility/2006">
-          <mc:Choice xmlns:a14="http://schemas.microsoft.com/office/drawing/2010/main" Requires="a14">
+        <mc:AlternateContent xmlns:mc="http://schemas.openxmlformats.org/markup-compatibility/2006" xmlns:a14="http://schemas.microsoft.com/office/drawing/2010/main">
+          <mc:Choice Requires="a14">
             <p:sp>
               <p:nvSpPr>
                 <p:cNvPr id="50" name="TextBox 49">
@@ -31041,6 +31519,7 @@
                 </a:bodyPr>
                 <a:lstStyle/>
                 <a:p>
+                  <a:pPr/>
                   <a14:m>
                     <m:oMathPara xmlns:m="http://schemas.openxmlformats.org/officeDocument/2006/math">
                       <m:oMathParaPr>
@@ -31139,7 +31618,7 @@
               </p:txBody>
             </p:sp>
           </mc:Choice>
-          <mc:Fallback>
+          <mc:Fallback xmlns="">
             <p:sp>
               <p:nvSpPr>
                 <p:cNvPr id="50" name="TextBox 49">
@@ -31740,8 +32219,8 @@
           </a:fontRef>
         </p:style>
       </p:cxnSp>
-      <mc:AlternateContent xmlns:mc="http://schemas.openxmlformats.org/markup-compatibility/2006">
-        <mc:Choice xmlns:a14="http://schemas.microsoft.com/office/drawing/2010/main" Requires="a14">
+      <mc:AlternateContent xmlns:mc="http://schemas.openxmlformats.org/markup-compatibility/2006" xmlns:a14="http://schemas.microsoft.com/office/drawing/2010/main">
+        <mc:Choice Requires="a14">
           <p:sp>
             <p:nvSpPr>
               <p:cNvPr id="31" name="Content Placeholder 2">
@@ -32154,7 +32633,7 @@
             </p:txBody>
           </p:sp>
         </mc:Choice>
-        <mc:Fallback>
+        <mc:Fallback xmlns="">
           <p:sp>
             <p:nvSpPr>
               <p:cNvPr id="31" name="Content Placeholder 2">
@@ -32307,8 +32786,8 @@
             </a:fontRef>
           </p:style>
         </p:cxnSp>
-        <mc:AlternateContent xmlns:mc="http://schemas.openxmlformats.org/markup-compatibility/2006">
-          <mc:Choice xmlns:a14="http://schemas.microsoft.com/office/drawing/2010/main" Requires="a14">
+        <mc:AlternateContent xmlns:mc="http://schemas.openxmlformats.org/markup-compatibility/2006" xmlns:a14="http://schemas.microsoft.com/office/drawing/2010/main">
+          <mc:Choice Requires="a14">
             <p:sp>
               <p:nvSpPr>
                 <p:cNvPr id="23" name="TextBox 22">
@@ -32337,6 +32816,7 @@
                 </a:bodyPr>
                 <a:lstStyle/>
                 <a:p>
+                  <a:pPr/>
                   <a14:m>
                     <m:oMathPara xmlns:m="http://schemas.openxmlformats.org/officeDocument/2006/math">
                       <m:oMathParaPr>
@@ -32394,7 +32874,7 @@
               </p:txBody>
             </p:sp>
           </mc:Choice>
-          <mc:Fallback>
+          <mc:Fallback xmlns="">
             <p:sp>
               <p:nvSpPr>
                 <p:cNvPr id="23" name="TextBox 22">
@@ -32487,8 +32967,8 @@
             </a:p>
           </p:txBody>
         </p:sp>
-        <mc:AlternateContent xmlns:mc="http://schemas.openxmlformats.org/markup-compatibility/2006">
-          <mc:Choice xmlns:a14="http://schemas.microsoft.com/office/drawing/2010/main" Requires="a14">
+        <mc:AlternateContent xmlns:mc="http://schemas.openxmlformats.org/markup-compatibility/2006" xmlns:a14="http://schemas.microsoft.com/office/drawing/2010/main">
+          <mc:Choice Requires="a14">
             <p:sp>
               <p:nvSpPr>
                 <p:cNvPr id="25" name="TextBox 24">
@@ -32517,6 +32997,7 @@
                 </a:bodyPr>
                 <a:lstStyle/>
                 <a:p>
+                  <a:pPr/>
                   <a14:m>
                     <m:oMathPara xmlns:m="http://schemas.openxmlformats.org/officeDocument/2006/math">
                       <m:oMathParaPr>
@@ -32615,7 +33096,7 @@
               </p:txBody>
             </p:sp>
           </mc:Choice>
-          <mc:Fallback>
+          <mc:Fallback xmlns="">
             <p:sp>
               <p:nvSpPr>
                 <p:cNvPr id="25" name="TextBox 24">
@@ -32751,8 +33232,8 @@
             </a:p>
           </p:txBody>
         </p:sp>
-        <mc:AlternateContent xmlns:mc="http://schemas.openxmlformats.org/markup-compatibility/2006">
-          <mc:Choice xmlns:a14="http://schemas.microsoft.com/office/drawing/2010/main" Requires="a14">
+        <mc:AlternateContent xmlns:mc="http://schemas.openxmlformats.org/markup-compatibility/2006" xmlns:a14="http://schemas.microsoft.com/office/drawing/2010/main">
+          <mc:Choice Requires="a14">
             <p:sp>
               <p:nvSpPr>
                 <p:cNvPr id="26" name="TextBox 25">
@@ -32781,6 +33262,7 @@
                 </a:bodyPr>
                 <a:lstStyle/>
                 <a:p>
+                  <a:pPr/>
                   <a14:m>
                     <m:oMathPara xmlns:m="http://schemas.openxmlformats.org/officeDocument/2006/math">
                       <m:oMathParaPr>
@@ -32838,7 +33320,7 @@
               </p:txBody>
             </p:sp>
           </mc:Choice>
-          <mc:Fallback>
+          <mc:Fallback xmlns="">
             <p:sp>
               <p:nvSpPr>
                 <p:cNvPr id="26" name="TextBox 25">
@@ -32884,8 +33366,8 @@
           </mc:Fallback>
         </mc:AlternateContent>
       </p:grpSp>
-      <mc:AlternateContent xmlns:mc="http://schemas.openxmlformats.org/markup-compatibility/2006">
-        <mc:Choice xmlns:a14="http://schemas.microsoft.com/office/drawing/2010/main" Requires="a14">
+      <mc:AlternateContent xmlns:mc="http://schemas.openxmlformats.org/markup-compatibility/2006" xmlns:a14="http://schemas.microsoft.com/office/drawing/2010/main">
+        <mc:Choice Requires="a14">
           <p:sp>
             <p:nvSpPr>
               <p:cNvPr id="27" name="Content Placeholder 2">
@@ -33203,7 +33685,7 @@
             </p:txBody>
           </p:sp>
         </mc:Choice>
-        <mc:Fallback>
+        <mc:Fallback xmlns="">
           <p:sp>
             <p:nvSpPr>
               <p:cNvPr id="27" name="Content Placeholder 2">
@@ -33660,8 +34142,8 @@
           </a:fontRef>
         </p:style>
       </p:cxnSp>
-      <mc:AlternateContent xmlns:mc="http://schemas.openxmlformats.org/markup-compatibility/2006">
-        <mc:Choice xmlns:a14="http://schemas.microsoft.com/office/drawing/2010/main" Requires="a14">
+      <mc:AlternateContent xmlns:mc="http://schemas.openxmlformats.org/markup-compatibility/2006" xmlns:a14="http://schemas.microsoft.com/office/drawing/2010/main">
+        <mc:Choice Requires="a14">
           <p:sp>
             <p:nvSpPr>
               <p:cNvPr id="31" name="Content Placeholder 2">
@@ -33822,7 +34304,7 @@
             </p:txBody>
           </p:sp>
         </mc:Choice>
-        <mc:Fallback>
+        <mc:Fallback xmlns="">
           <p:sp>
             <p:nvSpPr>
               <p:cNvPr id="31" name="Content Placeholder 2">
@@ -33866,8 +34348,8 @@
           </p:sp>
         </mc:Fallback>
       </mc:AlternateContent>
-      <mc:AlternateContent xmlns:mc="http://schemas.openxmlformats.org/markup-compatibility/2006">
-        <mc:Choice xmlns:a14="http://schemas.microsoft.com/office/drawing/2010/main" Requires="a14">
+      <mc:AlternateContent xmlns:mc="http://schemas.openxmlformats.org/markup-compatibility/2006" xmlns:a14="http://schemas.microsoft.com/office/drawing/2010/main">
+        <mc:Choice Requires="a14">
           <p:sp>
             <p:nvSpPr>
               <p:cNvPr id="5" name="Content Placeholder 2">
@@ -35766,7 +36248,7 @@
             </p:txBody>
           </p:sp>
         </mc:Choice>
-        <mc:Fallback>
+        <mc:Fallback xmlns="">
           <p:sp>
             <p:nvSpPr>
               <p:cNvPr id="5" name="Content Placeholder 2">
@@ -37757,24 +38239,6 @@
 </file>
 
 <file path=customXml/item1.xml><?xml version="1.0" encoding="utf-8"?>
-<p:properties xmlns:p="http://schemas.microsoft.com/office/2006/metadata/properties" xmlns:xsi="http://www.w3.org/2001/XMLSchema-instance" xmlns:pc="http://schemas.microsoft.com/office/infopath/2007/PartnerControls">
-  <documentManagement>
-    <MediaServiceKeyPoints xmlns="71af3243-3dd4-4a8d-8c0d-dd76da1f02a5" xsi:nil="true"/>
-    <Status xmlns="71af3243-3dd4-4a8d-8c0d-dd76da1f02a5">Not started</Status>
-  </documentManagement>
-</p:properties>
-</file>
-
-<file path=customXml/item2.xml><?xml version="1.0" encoding="utf-8"?>
-<?mso-contentType ?>
-<FormTemplates xmlns="http://schemas.microsoft.com/sharepoint/v3/contenttype/forms">
-  <Display>DocumentLibraryForm</Display>
-  <Edit>DocumentLibraryForm</Edit>
-  <New>DocumentLibraryForm</New>
-</FormTemplates>
-</file>
-
-<file path=customXml/item3.xml><?xml version="1.0" encoding="utf-8"?>
 <ct:contentTypeSchema xmlns:ct="http://schemas.microsoft.com/office/2006/metadata/contentType" xmlns:ma="http://schemas.microsoft.com/office/2006/metadata/properties/metaAttributes" ct:_="" ma:_="" ma:contentTypeName="Document" ma:contentTypeID="0x01010079F111ED35F8CC479449609E8A0923A6" ma:contentTypeVersion="12" ma:contentTypeDescription="Create a new document." ma:contentTypeScope="" ma:versionID="b385d60f68dd989dca1fdc827799d853">
   <xsd:schema xmlns:xsd="http://www.w3.org/2001/XMLSchema" xmlns:xs="http://www.w3.org/2001/XMLSchema" xmlns:p="http://schemas.microsoft.com/office/2006/metadata/properties" xmlns:ns2="71af3243-3dd4-4a8d-8c0d-dd76da1f02a5" xmlns:ns3="16c05727-aa75-4e4a-9b5f-8a80a1165891" targetNamespace="http://schemas.microsoft.com/office/2006/metadata/properties" ma:root="true" ma:fieldsID="1911b479caf7b199da365455750e4572" ns2:_="" ns3:_="">
     <xsd:import namespace="71af3243-3dd4-4a8d-8c0d-dd76da1f02a5"/>
@@ -37995,32 +38459,25 @@
 </ct:contentTypeSchema>
 </file>
 
-<file path=customXml/itemProps1.xml><?xml version="1.0" encoding="utf-8"?>
-<ds:datastoreItem xmlns:ds="http://schemas.openxmlformats.org/officeDocument/2006/customXml" ds:itemID="{FF5C8BF1-B0E4-49A1-808F-40F2AD30E743}">
-  <ds:schemaRefs>
-    <ds:schemaRef ds:uri="16c05727-aa75-4e4a-9b5f-8a80a1165891"/>
-    <ds:schemaRef ds:uri="http://schemas.microsoft.com/office/2006/metadata/properties"/>
-    <ds:schemaRef ds:uri="http://schemas.microsoft.com/office/2006/documentManagement/types"/>
-    <ds:schemaRef ds:uri="http://purl.org/dc/dcmitype/"/>
-    <ds:schemaRef ds:uri="http://purl.org/dc/elements/1.1/"/>
-    <ds:schemaRef ds:uri="http://purl.org/dc/terms/"/>
-    <ds:schemaRef ds:uri="http://schemas.microsoft.com/office/infopath/2007/PartnerControls"/>
-    <ds:schemaRef ds:uri="http://schemas.openxmlformats.org/package/2006/metadata/core-properties"/>
-    <ds:schemaRef ds:uri="71af3243-3dd4-4a8d-8c0d-dd76da1f02a5"/>
-    <ds:schemaRef ds:uri="http://www.w3.org/XML/1998/namespace"/>
-  </ds:schemaRefs>
-</ds:datastoreItem>
+<file path=customXml/item2.xml><?xml version="1.0" encoding="utf-8"?>
+<?mso-contentType ?>
+<FormTemplates xmlns="http://schemas.microsoft.com/sharepoint/v3/contenttype/forms">
+  <Display>DocumentLibraryForm</Display>
+  <Edit>DocumentLibraryForm</Edit>
+  <New>DocumentLibraryForm</New>
+</FormTemplates>
 </file>
 
-<file path=customXml/itemProps2.xml><?xml version="1.0" encoding="utf-8"?>
-<ds:datastoreItem xmlns:ds="http://schemas.openxmlformats.org/officeDocument/2006/customXml" ds:itemID="{E3FC8A1C-A436-42C0-AC33-FAFFFAF219BC}">
-  <ds:schemaRefs>
-    <ds:schemaRef ds:uri="http://schemas.microsoft.com/sharepoint/v3/contenttype/forms"/>
-  </ds:schemaRefs>
-</ds:datastoreItem>
+<file path=customXml/item3.xml><?xml version="1.0" encoding="utf-8"?>
+<p:properties xmlns:p="http://schemas.microsoft.com/office/2006/metadata/properties" xmlns:xsi="http://www.w3.org/2001/XMLSchema-instance" xmlns:pc="http://schemas.microsoft.com/office/infopath/2007/PartnerControls">
+  <documentManagement>
+    <MediaServiceKeyPoints xmlns="71af3243-3dd4-4a8d-8c0d-dd76da1f02a5" xsi:nil="true"/>
+    <Status xmlns="71af3243-3dd4-4a8d-8c0d-dd76da1f02a5">Not started</Status>
+  </documentManagement>
+</p:properties>
 </file>
 
-<file path=customXml/itemProps3.xml><?xml version="1.0" encoding="utf-8"?>
+<file path=customXml/itemProps1.xml><?xml version="1.0" encoding="utf-8"?>
 <ds:datastoreItem xmlns:ds="http://schemas.openxmlformats.org/officeDocument/2006/customXml" ds:itemID="{E3852F5D-AAE7-473B-9767-8875B60BC63B}">
   <ds:schemaRefs>
     <ds:schemaRef ds:uri="http://schemas.microsoft.com/office/2006/metadata/contentType"/>
@@ -38037,4 +38494,29 @@
     <ds:schemaRef ds:uri="http://schemas.microsoft.com/internal/obd"/>
   </ds:schemaRefs>
 </ds:datastoreItem>
+</file>
+
+<file path=customXml/itemProps2.xml><?xml version="1.0" encoding="utf-8"?>
+<ds:datastoreItem xmlns:ds="http://schemas.openxmlformats.org/officeDocument/2006/customXml" ds:itemID="{E3FC8A1C-A436-42C0-AC33-FAFFFAF219BC}">
+  <ds:schemaRefs>
+    <ds:schemaRef ds:uri="http://schemas.microsoft.com/sharepoint/v3/contenttype/forms"/>
+  </ds:schemaRefs>
+</ds:datastoreItem>
+</file>
+
+<file path=customXml/itemProps3.xml><?xml version="1.0" encoding="utf-8"?>
+<ds:datastoreItem xmlns:ds="http://schemas.openxmlformats.org/officeDocument/2006/customXml" ds:itemID="{FF5C8BF1-B0E4-49A1-808F-40F2AD30E743}">
+  <ds:schemaRefs>
+    <ds:schemaRef ds:uri="16c05727-aa75-4e4a-9b5f-8a80a1165891"/>
+    <ds:schemaRef ds:uri="http://schemas.microsoft.com/office/2006/metadata/properties"/>
+    <ds:schemaRef ds:uri="http://schemas.microsoft.com/office/2006/documentManagement/types"/>
+    <ds:schemaRef ds:uri="http://purl.org/dc/dcmitype/"/>
+    <ds:schemaRef ds:uri="http://purl.org/dc/elements/1.1/"/>
+    <ds:schemaRef ds:uri="http://purl.org/dc/terms/"/>
+    <ds:schemaRef ds:uri="http://schemas.microsoft.com/office/infopath/2007/PartnerControls"/>
+    <ds:schemaRef ds:uri="http://schemas.openxmlformats.org/package/2006/metadata/core-properties"/>
+    <ds:schemaRef ds:uri="71af3243-3dd4-4a8d-8c0d-dd76da1f02a5"/>
+    <ds:schemaRef ds:uri="http://www.w3.org/XML/1998/namespace"/>
+  </ds:schemaRefs>
+</ds:datastoreItem>
 </file>
</xml_diff>

<commit_message>
COMP270 Week 8 lecture slides (and a small fix to week 7 slides).
</commit_message>
<xml_diff>
--- a/COMP270/07/2019-20-COMP270-07-lecture-materials.pptx
+++ b/COMP270/07/2019-20-COMP270-07-lecture-materials.pptx
@@ -236,7 +236,7 @@
           <a:p>
             <a:fld id="{4929A4FD-FAFB-4CDA-9DC5-D20CA18269A9}" type="datetimeFigureOut">
               <a:rPr lang="en-US" smtClean="0"/>
-              <a:t>11/4/2019</a:t>
+              <a:t>11/6/2019</a:t>
             </a:fld>
             <a:endParaRPr lang="en-US" dirty="0"/>
           </a:p>
@@ -413,7 +413,7 @@
           <a:p>
             <a:fld id="{CB91E35E-F34C-4F0E-B8A1-D9F5F49CB3AD}" type="datetimeFigureOut">
               <a:rPr lang="en-US" smtClean="0"/>
-              <a:t>11/3/2019</a:t>
+              <a:t>11/6/2019</a:t>
             </a:fld>
             <a:endParaRPr lang="en-US" dirty="0"/>
           </a:p>
@@ -914,7 +914,7 @@
             <a:fld id="{B61BEF0D-F0BB-DE4B-95CE-6DB70DBA9567}" type="datetimeFigureOut">
               <a:rPr lang="en-US" smtClean="0"/>
               <a:pPr/>
-              <a:t>11/3/2019</a:t>
+              <a:t>11/6/2019</a:t>
             </a:fld>
             <a:endParaRPr lang="en-US" dirty="0"/>
           </a:p>
@@ -1116,7 +1116,7 @@
             <a:fld id="{B61BEF0D-F0BB-DE4B-95CE-6DB70DBA9567}" type="datetimeFigureOut">
               <a:rPr lang="en-US" smtClean="0"/>
               <a:pPr/>
-              <a:t>11/3/2019</a:t>
+              <a:t>11/6/2019</a:t>
             </a:fld>
             <a:endParaRPr lang="en-US" dirty="0"/>
           </a:p>
@@ -1328,7 +1328,7 @@
             <a:fld id="{B61BEF0D-F0BB-DE4B-95CE-6DB70DBA9567}" type="datetimeFigureOut">
               <a:rPr lang="en-US" smtClean="0"/>
               <a:pPr/>
-              <a:t>11/3/2019</a:t>
+              <a:t>11/6/2019</a:t>
             </a:fld>
             <a:endParaRPr lang="en-US" dirty="0"/>
           </a:p>
@@ -1530,7 +1530,7 @@
             <a:fld id="{B61BEF0D-F0BB-DE4B-95CE-6DB70DBA9567}" type="datetimeFigureOut">
               <a:rPr lang="en-US" smtClean="0"/>
               <a:pPr/>
-              <a:t>11/3/2019</a:t>
+              <a:t>11/6/2019</a:t>
             </a:fld>
             <a:endParaRPr lang="en-US" dirty="0"/>
           </a:p>
@@ -1808,7 +1808,7 @@
             <a:fld id="{B61BEF0D-F0BB-DE4B-95CE-6DB70DBA9567}" type="datetimeFigureOut">
               <a:rPr lang="en-US" smtClean="0"/>
               <a:pPr/>
-              <a:t>11/3/2019</a:t>
+              <a:t>11/6/2019</a:t>
             </a:fld>
             <a:endParaRPr lang="en-US" dirty="0"/>
           </a:p>
@@ -2078,7 +2078,7 @@
             <a:fld id="{B61BEF0D-F0BB-DE4B-95CE-6DB70DBA9567}" type="datetimeFigureOut">
               <a:rPr lang="en-US" smtClean="0"/>
               <a:pPr/>
-              <a:t>11/3/2019</a:t>
+              <a:t>11/6/2019</a:t>
             </a:fld>
             <a:endParaRPr lang="en-US" dirty="0"/>
           </a:p>
@@ -2495,7 +2495,7 @@
             <a:fld id="{B61BEF0D-F0BB-DE4B-95CE-6DB70DBA9567}" type="datetimeFigureOut">
               <a:rPr lang="en-US" smtClean="0"/>
               <a:pPr/>
-              <a:t>11/3/2019</a:t>
+              <a:t>11/6/2019</a:t>
             </a:fld>
             <a:endParaRPr lang="en-US" dirty="0"/>
           </a:p>
@@ -2639,7 +2639,7 @@
             <a:fld id="{B61BEF0D-F0BB-DE4B-95CE-6DB70DBA9567}" type="datetimeFigureOut">
               <a:rPr lang="en-US" smtClean="0"/>
               <a:pPr/>
-              <a:t>11/3/2019</a:t>
+              <a:t>11/6/2019</a:t>
             </a:fld>
             <a:endParaRPr lang="en-US" dirty="0"/>
           </a:p>
@@ -2754,7 +2754,7 @@
             <a:fld id="{B61BEF0D-F0BB-DE4B-95CE-6DB70DBA9567}" type="datetimeFigureOut">
               <a:rPr lang="en-US" smtClean="0"/>
               <a:pPr/>
-              <a:t>11/3/2019</a:t>
+              <a:t>11/6/2019</a:t>
             </a:fld>
             <a:endParaRPr lang="en-US" dirty="0"/>
           </a:p>
@@ -3069,7 +3069,7 @@
             <a:fld id="{B61BEF0D-F0BB-DE4B-95CE-6DB70DBA9567}" type="datetimeFigureOut">
               <a:rPr lang="en-US" smtClean="0"/>
               <a:pPr/>
-              <a:t>11/3/2019</a:t>
+              <a:t>11/6/2019</a:t>
             </a:fld>
             <a:endParaRPr lang="en-US" dirty="0"/>
           </a:p>
@@ -3360,7 +3360,7 @@
             <a:fld id="{B61BEF0D-F0BB-DE4B-95CE-6DB70DBA9567}" type="datetimeFigureOut">
               <a:rPr lang="en-US" smtClean="0"/>
               <a:pPr/>
-              <a:t>11/3/2019</a:t>
+              <a:t>11/6/2019</a:t>
             </a:fld>
             <a:endParaRPr lang="en-US" dirty="0"/>
           </a:p>
@@ -3605,7 +3605,7 @@
             <a:fld id="{B61BEF0D-F0BB-DE4B-95CE-6DB70DBA9567}" type="datetimeFigureOut">
               <a:rPr lang="en-US" smtClean="0"/>
               <a:pPr/>
-              <a:t>11/3/2019</a:t>
+              <a:t>11/6/2019</a:t>
             </a:fld>
             <a:endParaRPr lang="en-US" dirty="0"/>
           </a:p>
@@ -4248,13 +4248,13 @@
                   <a:srgbClr val="75E4F7"/>
                 </a:solidFill>
               </a:rPr>
-              <a:t>COMP20: Mathematics for 3D Worlds &amp; Simulations</a:t>
+              <a:t>COMP270: Mathematics for 3D Worlds &amp; Simulations</a:t>
             </a:r>
           </a:p>
           <a:p>
             <a:pPr algn="l"/>
             <a:r>
-              <a:rPr lang="en-US" sz="800">
+              <a:rPr lang="en-US" sz="800" dirty="0">
                 <a:solidFill>
                   <a:srgbClr val="75E4F7"/>
                 </a:solidFill>
@@ -7835,8 +7835,8 @@
           </a:fontRef>
         </p:style>
       </p:cxnSp>
-      <mc:AlternateContent xmlns:mc="http://schemas.openxmlformats.org/markup-compatibility/2006">
-        <mc:Choice xmlns:a14="http://schemas.microsoft.com/office/drawing/2010/main" Requires="a14">
+      <mc:AlternateContent xmlns:mc="http://schemas.openxmlformats.org/markup-compatibility/2006" xmlns:a14="http://schemas.microsoft.com/office/drawing/2010/main">
+        <mc:Choice Requires="a14">
           <p:sp>
             <p:nvSpPr>
               <p:cNvPr id="31" name="Content Placeholder 2">
@@ -7939,7 +7939,7 @@
             </p:txBody>
           </p:sp>
         </mc:Choice>
-        <mc:Fallback>
+        <mc:Fallback xmlns="">
           <p:sp>
             <p:nvSpPr>
               <p:cNvPr id="31" name="Content Placeholder 2">
@@ -8003,8 +8003,8 @@
             <a:chExt cx="2985186" cy="2013952"/>
           </a:xfrm>
         </p:grpSpPr>
-        <mc:AlternateContent xmlns:mc="http://schemas.openxmlformats.org/markup-compatibility/2006">
-          <mc:Choice xmlns:a14="http://schemas.microsoft.com/office/drawing/2010/main" Requires="a14">
+        <mc:AlternateContent xmlns:mc="http://schemas.openxmlformats.org/markup-compatibility/2006" xmlns:a14="http://schemas.microsoft.com/office/drawing/2010/main">
+          <mc:Choice Requires="a14">
             <p:sp>
               <p:nvSpPr>
                 <p:cNvPr id="21" name="TextBox 20">
@@ -8091,7 +8091,7 @@
               </p:txBody>
             </p:sp>
           </mc:Choice>
-          <mc:Fallback>
+          <mc:Fallback xmlns="">
             <p:sp>
               <p:nvSpPr>
                 <p:cNvPr id="21" name="TextBox 20">
@@ -8896,8 +8896,8 @@
               </a:fontRef>
             </p:style>
           </p:cxnSp>
-          <mc:AlternateContent xmlns:mc="http://schemas.openxmlformats.org/markup-compatibility/2006">
-            <mc:Choice xmlns:a14="http://schemas.microsoft.com/office/drawing/2010/main" Requires="a14">
+          <mc:AlternateContent xmlns:mc="http://schemas.openxmlformats.org/markup-compatibility/2006" xmlns:a14="http://schemas.microsoft.com/office/drawing/2010/main">
+            <mc:Choice Requires="a14">
               <p:sp>
                 <p:nvSpPr>
                   <p:cNvPr id="42" name="TextBox 41">
@@ -8961,7 +8961,7 @@
                 </p:txBody>
               </p:sp>
             </mc:Choice>
-            <mc:Fallback>
+            <mc:Fallback xmlns="">
               <p:sp>
                 <p:nvSpPr>
                   <p:cNvPr id="42" name="TextBox 41">
@@ -9006,8 +9006,8 @@
               </p:sp>
             </mc:Fallback>
           </mc:AlternateContent>
-          <mc:AlternateContent xmlns:mc="http://schemas.openxmlformats.org/markup-compatibility/2006">
-            <mc:Choice xmlns:a14="http://schemas.microsoft.com/office/drawing/2010/main" Requires="a14">
+          <mc:AlternateContent xmlns:mc="http://schemas.openxmlformats.org/markup-compatibility/2006" xmlns:a14="http://schemas.microsoft.com/office/drawing/2010/main">
+            <mc:Choice Requires="a14">
               <p:sp>
                 <p:nvSpPr>
                   <p:cNvPr id="43" name="TextBox 42">
@@ -9071,7 +9071,7 @@
                 </p:txBody>
               </p:sp>
             </mc:Choice>
-            <mc:Fallback>
+            <mc:Fallback xmlns="">
               <p:sp>
                 <p:nvSpPr>
                   <p:cNvPr id="43" name="TextBox 42">
@@ -9118,8 +9118,8 @@
           </mc:AlternateContent>
         </p:grpSp>
       </p:grpSp>
-      <mc:AlternateContent xmlns:mc="http://schemas.openxmlformats.org/markup-compatibility/2006">
-        <mc:Choice xmlns:a14="http://schemas.microsoft.com/office/drawing/2010/main" Requires="a14">
+      <mc:AlternateContent xmlns:mc="http://schemas.openxmlformats.org/markup-compatibility/2006" xmlns:a14="http://schemas.microsoft.com/office/drawing/2010/main">
+        <mc:Choice Requires="a14">
           <p:sp>
             <p:nvSpPr>
               <p:cNvPr id="23" name="Content Placeholder 2">
@@ -9508,7 +9508,7 @@
             </p:txBody>
           </p:sp>
         </mc:Choice>
-        <mc:Fallback>
+        <mc:Fallback xmlns="">
           <p:sp>
             <p:nvSpPr>
               <p:cNvPr id="23" name="Content Placeholder 2">
@@ -9968,8 +9968,8 @@
           </a:fontRef>
         </p:style>
       </p:cxnSp>
-      <mc:AlternateContent xmlns:mc="http://schemas.openxmlformats.org/markup-compatibility/2006">
-        <mc:Choice xmlns:a14="http://schemas.microsoft.com/office/drawing/2010/main" Requires="a14">
+      <mc:AlternateContent xmlns:mc="http://schemas.openxmlformats.org/markup-compatibility/2006" xmlns:a14="http://schemas.microsoft.com/office/drawing/2010/main">
+        <mc:Choice Requires="a14">
           <p:sp>
             <p:nvSpPr>
               <p:cNvPr id="31" name="Content Placeholder 2">
@@ -10305,7 +10305,7 @@
             </p:txBody>
           </p:sp>
         </mc:Choice>
-        <mc:Fallback>
+        <mc:Fallback xmlns="">
           <p:sp>
             <p:nvSpPr>
               <p:cNvPr id="31" name="Content Placeholder 2">
@@ -29852,8 +29852,8 @@
           </p:sp>
         </mc:Fallback>
       </mc:AlternateContent>
-      <mc:AlternateContent xmlns:mc="http://schemas.openxmlformats.org/markup-compatibility/2006">
-        <mc:Choice xmlns:a14="http://schemas.microsoft.com/office/drawing/2010/main" Requires="a14">
+      <mc:AlternateContent xmlns:mc="http://schemas.openxmlformats.org/markup-compatibility/2006" xmlns:a14="http://schemas.microsoft.com/office/drawing/2010/main">
+        <mc:Choice Requires="a14">
           <p:sp>
             <p:nvSpPr>
               <p:cNvPr id="5" name="Content Placeholder 2">
@@ -30279,7 +30279,7 @@
             </p:txBody>
           </p:sp>
         </mc:Choice>
-        <mc:Fallback>
+        <mc:Fallback xmlns="">
           <p:sp>
             <p:nvSpPr>
               <p:cNvPr id="5" name="Content Placeholder 2">
@@ -38239,6 +38239,24 @@
 </file>
 
 <file path=customXml/item1.xml><?xml version="1.0" encoding="utf-8"?>
+<p:properties xmlns:p="http://schemas.microsoft.com/office/2006/metadata/properties" xmlns:xsi="http://www.w3.org/2001/XMLSchema-instance" xmlns:pc="http://schemas.microsoft.com/office/infopath/2007/PartnerControls">
+  <documentManagement>
+    <MediaServiceKeyPoints xmlns="71af3243-3dd4-4a8d-8c0d-dd76da1f02a5" xsi:nil="true"/>
+    <Status xmlns="71af3243-3dd4-4a8d-8c0d-dd76da1f02a5">Not started</Status>
+  </documentManagement>
+</p:properties>
+</file>
+
+<file path=customXml/item2.xml><?xml version="1.0" encoding="utf-8"?>
+<?mso-contentType ?>
+<FormTemplates xmlns="http://schemas.microsoft.com/sharepoint/v3/contenttype/forms">
+  <Display>DocumentLibraryForm</Display>
+  <Edit>DocumentLibraryForm</Edit>
+  <New>DocumentLibraryForm</New>
+</FormTemplates>
+</file>
+
+<file path=customXml/item3.xml><?xml version="1.0" encoding="utf-8"?>
 <ct:contentTypeSchema xmlns:ct="http://schemas.microsoft.com/office/2006/metadata/contentType" xmlns:ma="http://schemas.microsoft.com/office/2006/metadata/properties/metaAttributes" ct:_="" ma:_="" ma:contentTypeName="Document" ma:contentTypeID="0x01010079F111ED35F8CC479449609E8A0923A6" ma:contentTypeVersion="12" ma:contentTypeDescription="Create a new document." ma:contentTypeScope="" ma:versionID="b385d60f68dd989dca1fdc827799d853">
   <xsd:schema xmlns:xsd="http://www.w3.org/2001/XMLSchema" xmlns:xs="http://www.w3.org/2001/XMLSchema" xmlns:p="http://schemas.microsoft.com/office/2006/metadata/properties" xmlns:ns2="71af3243-3dd4-4a8d-8c0d-dd76da1f02a5" xmlns:ns3="16c05727-aa75-4e4a-9b5f-8a80a1165891" targetNamespace="http://schemas.microsoft.com/office/2006/metadata/properties" ma:root="true" ma:fieldsID="1911b479caf7b199da365455750e4572" ns2:_="" ns3:_="">
     <xsd:import namespace="71af3243-3dd4-4a8d-8c0d-dd76da1f02a5"/>
@@ -38459,25 +38477,32 @@
 </ct:contentTypeSchema>
 </file>
 
-<file path=customXml/item2.xml><?xml version="1.0" encoding="utf-8"?>
-<?mso-contentType ?>
-<FormTemplates xmlns="http://schemas.microsoft.com/sharepoint/v3/contenttype/forms">
-  <Display>DocumentLibraryForm</Display>
-  <Edit>DocumentLibraryForm</Edit>
-  <New>DocumentLibraryForm</New>
-</FormTemplates>
+<file path=customXml/itemProps1.xml><?xml version="1.0" encoding="utf-8"?>
+<ds:datastoreItem xmlns:ds="http://schemas.openxmlformats.org/officeDocument/2006/customXml" ds:itemID="{FF5C8BF1-B0E4-49A1-808F-40F2AD30E743}">
+  <ds:schemaRefs>
+    <ds:schemaRef ds:uri="16c05727-aa75-4e4a-9b5f-8a80a1165891"/>
+    <ds:schemaRef ds:uri="http://schemas.microsoft.com/office/2006/metadata/properties"/>
+    <ds:schemaRef ds:uri="http://schemas.microsoft.com/office/2006/documentManagement/types"/>
+    <ds:schemaRef ds:uri="http://purl.org/dc/dcmitype/"/>
+    <ds:schemaRef ds:uri="http://purl.org/dc/elements/1.1/"/>
+    <ds:schemaRef ds:uri="http://purl.org/dc/terms/"/>
+    <ds:schemaRef ds:uri="http://schemas.microsoft.com/office/infopath/2007/PartnerControls"/>
+    <ds:schemaRef ds:uri="http://schemas.openxmlformats.org/package/2006/metadata/core-properties"/>
+    <ds:schemaRef ds:uri="71af3243-3dd4-4a8d-8c0d-dd76da1f02a5"/>
+    <ds:schemaRef ds:uri="http://www.w3.org/XML/1998/namespace"/>
+  </ds:schemaRefs>
+</ds:datastoreItem>
 </file>
 
-<file path=customXml/item3.xml><?xml version="1.0" encoding="utf-8"?>
-<p:properties xmlns:p="http://schemas.microsoft.com/office/2006/metadata/properties" xmlns:xsi="http://www.w3.org/2001/XMLSchema-instance" xmlns:pc="http://schemas.microsoft.com/office/infopath/2007/PartnerControls">
-  <documentManagement>
-    <MediaServiceKeyPoints xmlns="71af3243-3dd4-4a8d-8c0d-dd76da1f02a5" xsi:nil="true"/>
-    <Status xmlns="71af3243-3dd4-4a8d-8c0d-dd76da1f02a5">Not started</Status>
-  </documentManagement>
-</p:properties>
+<file path=customXml/itemProps2.xml><?xml version="1.0" encoding="utf-8"?>
+<ds:datastoreItem xmlns:ds="http://schemas.openxmlformats.org/officeDocument/2006/customXml" ds:itemID="{E3FC8A1C-A436-42C0-AC33-FAFFFAF219BC}">
+  <ds:schemaRefs>
+    <ds:schemaRef ds:uri="http://schemas.microsoft.com/sharepoint/v3/contenttype/forms"/>
+  </ds:schemaRefs>
+</ds:datastoreItem>
 </file>
 
-<file path=customXml/itemProps1.xml><?xml version="1.0" encoding="utf-8"?>
+<file path=customXml/itemProps3.xml><?xml version="1.0" encoding="utf-8"?>
 <ds:datastoreItem xmlns:ds="http://schemas.openxmlformats.org/officeDocument/2006/customXml" ds:itemID="{E3852F5D-AAE7-473B-9767-8875B60BC63B}">
   <ds:schemaRefs>
     <ds:schemaRef ds:uri="http://schemas.microsoft.com/office/2006/metadata/contentType"/>
@@ -38494,29 +38519,4 @@
     <ds:schemaRef ds:uri="http://schemas.microsoft.com/internal/obd"/>
   </ds:schemaRefs>
 </ds:datastoreItem>
-</file>
-
-<file path=customXml/itemProps2.xml><?xml version="1.0" encoding="utf-8"?>
-<ds:datastoreItem xmlns:ds="http://schemas.openxmlformats.org/officeDocument/2006/customXml" ds:itemID="{E3FC8A1C-A436-42C0-AC33-FAFFFAF219BC}">
-  <ds:schemaRefs>
-    <ds:schemaRef ds:uri="http://schemas.microsoft.com/sharepoint/v3/contenttype/forms"/>
-  </ds:schemaRefs>
-</ds:datastoreItem>
-</file>
-
-<file path=customXml/itemProps3.xml><?xml version="1.0" encoding="utf-8"?>
-<ds:datastoreItem xmlns:ds="http://schemas.openxmlformats.org/officeDocument/2006/customXml" ds:itemID="{FF5C8BF1-B0E4-49A1-808F-40F2AD30E743}">
-  <ds:schemaRefs>
-    <ds:schemaRef ds:uri="16c05727-aa75-4e4a-9b5f-8a80a1165891"/>
-    <ds:schemaRef ds:uri="http://schemas.microsoft.com/office/2006/metadata/properties"/>
-    <ds:schemaRef ds:uri="http://schemas.microsoft.com/office/2006/documentManagement/types"/>
-    <ds:schemaRef ds:uri="http://purl.org/dc/dcmitype/"/>
-    <ds:schemaRef ds:uri="http://purl.org/dc/elements/1.1/"/>
-    <ds:schemaRef ds:uri="http://purl.org/dc/terms/"/>
-    <ds:schemaRef ds:uri="http://schemas.microsoft.com/office/infopath/2007/PartnerControls"/>
-    <ds:schemaRef ds:uri="http://schemas.openxmlformats.org/package/2006/metadata/core-properties"/>
-    <ds:schemaRef ds:uri="71af3243-3dd4-4a8d-8c0d-dd76da1f02a5"/>
-    <ds:schemaRef ds:uri="http://www.w3.org/XML/1998/namespace"/>
-  </ds:schemaRefs>
-</ds:datastoreItem>
 </file>
</xml_diff>